<commit_message>
Mentioning Bernoulli explicitly in the slides.
</commit_message>
<xml_diff>
--- a/Presentation/CS286 - Ensemble Classifier on AWS.pptx
+++ b/Presentation/CS286 - Ensemble Classifier on AWS.pptx
@@ -3964,9 +3964,6 @@
               </a:rPr>
               <a:t>If you need to do the system administration yourself, do not despair as you learn a lot of new (and unexpected) things along the way.</a:t>
             </a:r>
-            <a:endParaRPr lang="en-US" dirty="0" smtClean="0">
-              <a:latin typeface="+mj-lt"/>
-            </a:endParaRPr>
           </a:p>
         </p:txBody>
       </p:sp>
@@ -4250,9 +4247,6 @@
               </a:rPr>
               <a:t>-FS, and you probably do not realize what you take for granted.</a:t>
             </a:r>
-            <a:endParaRPr lang="en-US" dirty="0" smtClean="0">
-              <a:latin typeface="+mj-lt"/>
-            </a:endParaRPr>
           </a:p>
         </p:txBody>
       </p:sp>
@@ -5256,13 +5250,7 @@
               <a:rPr lang="en-US" sz="3600" dirty="0" smtClean="0">
                 <a:latin typeface="+mj-lt"/>
               </a:rPr>
-              <a:t>Project </a:t>
-            </a:r>
-            <a:r>
-              <a:rPr lang="en-US" sz="3600" dirty="0" smtClean="0">
-                <a:latin typeface="+mj-lt"/>
-              </a:rPr>
-              <a:t>Overview</a:t>
+              <a:t>Project Overview</a:t>
             </a:r>
             <a:endParaRPr lang="en-US" sz="3600" dirty="0">
               <a:latin typeface="+mj-lt"/>
@@ -5296,13 +5284,7 @@
               <a:rPr lang="en-US" sz="2800" b="1" dirty="0" err="1" smtClean="0">
                 <a:latin typeface="+mj-lt"/>
               </a:rPr>
-              <a:t>Kagg</a:t>
-            </a:r>
-            <a:r>
-              <a:rPr lang="en-US" sz="2800" b="1" dirty="0" err="1" smtClean="0">
-                <a:latin typeface="+mj-lt"/>
-              </a:rPr>
-              <a:t>le</a:t>
+              <a:t>Kaggle</a:t>
             </a:r>
             <a:r>
               <a:rPr lang="en-US" sz="2800" b="1" dirty="0" smtClean="0">
@@ -5351,9 +5333,6 @@
               </a:rPr>
               <a:t>Develop a faster, Hadoop-based version of the original classifier and deploy it to Amazon AWS.</a:t>
             </a:r>
-            <a:endParaRPr lang="en-US" sz="2800" dirty="0" smtClean="0">
-              <a:latin typeface="+mj-lt"/>
-            </a:endParaRPr>
           </a:p>
         </p:txBody>
       </p:sp>
@@ -6316,7 +6295,13 @@
               <a:rPr lang="en-US" dirty="0" smtClean="0">
                 <a:latin typeface="+mj-lt"/>
               </a:rPr>
-              <a:t>Naïve Bayes</a:t>
+              <a:t>Bernoulli Naïve </a:t>
+            </a:r>
+            <a:r>
+              <a:rPr lang="en-US" dirty="0" smtClean="0">
+                <a:latin typeface="+mj-lt"/>
+              </a:rPr>
+              <a:t>Bayes</a:t>
             </a:r>
             <a:endParaRPr lang="en-US" dirty="0">
               <a:latin typeface="+mj-lt"/>
@@ -6566,7 +6551,13 @@
               <a:rPr lang="en-US" dirty="0" smtClean="0">
                 <a:latin typeface="+mj-lt"/>
               </a:rPr>
-              <a:t>K-Nearest Neighbors</a:t>
+              <a:t>K-Nearest </a:t>
+            </a:r>
+            <a:r>
+              <a:rPr lang="en-US" dirty="0" smtClean="0">
+                <a:latin typeface="+mj-lt"/>
+              </a:rPr>
+              <a:t>Neighbors (KNN)</a:t>
             </a:r>
             <a:endParaRPr lang="en-US" dirty="0">
               <a:latin typeface="+mj-lt"/>
@@ -6637,7 +6628,7 @@
                   <m:oMath xmlns:m="http://schemas.openxmlformats.org/officeDocument/2006/math">
                     <m:r>
                       <a:rPr lang="en-US" b="0" i="1" smtClean="0">
-                        <a:latin typeface="+mj-lt"/>
+                        <a:latin typeface="Cambria Math"/>
                       </a:rPr>
                       <m:t>𝑂</m:t>
                     </m:r>
@@ -6645,14 +6636,14 @@
                       <m:dPr>
                         <m:ctrlPr>
                           <a:rPr lang="en-US" b="0" i="1" smtClean="0">
-                            <a:latin typeface="+mj-lt"/>
+                            <a:latin typeface="Cambria Math"/>
                           </a:rPr>
                         </m:ctrlPr>
                       </m:dPr>
                       <m:e>
                         <m:r>
                           <a:rPr lang="en-US" b="0" i="1" smtClean="0">
-                            <a:latin typeface="+mj-lt"/>
+                            <a:latin typeface="Cambria Math"/>
                           </a:rPr>
                           <m:t>𝑁</m:t>
                         </m:r>
@@ -6670,7 +6661,7 @@
                   <m:oMath xmlns:m="http://schemas.openxmlformats.org/officeDocument/2006/math">
                     <m:r>
                       <a:rPr lang="en-US" b="0" i="1" smtClean="0">
-                        <a:latin typeface="+mj-lt"/>
+                        <a:latin typeface="Cambria Math"/>
                       </a:rPr>
                       <m:t>𝑁</m:t>
                     </m:r>
@@ -6732,7 +6723,7 @@
                   <a:t>To simplify code design and testing, we used the </a:t>
                 </a:r>
                 <a:r>
-                  <a:rPr lang="en-US" i="1" dirty="0" smtClean="0">
+                  <a:rPr lang="en-US" b="1" i="1" dirty="0" smtClean="0">
                     <a:solidFill>
                       <a:srgbClr val="008000"/>
                     </a:solidFill>
@@ -6741,7 +6732,7 @@
                   <a:t>strategy pattern</a:t>
                 </a:r>
                 <a:r>
-                  <a:rPr lang="en-US" dirty="0" smtClean="0">
+                  <a:rPr lang="en-US" b="1" dirty="0" smtClean="0">
                     <a:solidFill>
                       <a:srgbClr val="008000"/>
                     </a:solidFill>

</xml_diff>

<commit_message>
Updates to the slides including adding both Bernoulli and Multinomial NB. Updates to the list of references in the presentation. Mentioning explicitly the use of maven for the preprocessor. Mentioning the use of strategy pattern for Bernoulli and Multinomial NB. Updating the Oozie workflow to include both Bernoulli and Multinomail NB.
</commit_message>
<xml_diff>
--- a/Presentation/CS286 - Ensemble Classifier on AWS.pptx
+++ b/Presentation/CS286 - Ensemble Classifier on AWS.pptx
@@ -1141,7 +1141,7 @@
         <p:spPr bwMode="auto">
           <a:xfrm>
             <a:off x="0" y="-1588"/>
-            <a:ext cx="9144000" cy="6858001"/>
+            <a:ext cx="9144000" cy="6859588"/>
           </a:xfrm>
           <a:prstGeom prst="rect">
             <a:avLst/>
@@ -1390,7 +1390,13 @@
           <a:bodyPr>
             <a:normAutofit/>
           </a:bodyPr>
-          <a:lstStyle/>
+          <a:lstStyle>
+            <a:lvl1pPr>
+              <a:defRPr>
+                <a:latin typeface="+mj-lt"/>
+              </a:defRPr>
+            </a:lvl1pPr>
+          </a:lstStyle>
           <a:p>
             <a:r>
               <a:rPr lang="en-US" dirty="0" smtClean="0"/>
@@ -1415,7 +1421,33 @@
           <a:bodyPr>
             <a:normAutofit/>
           </a:bodyPr>
-          <a:lstStyle/>
+          <a:lstStyle>
+            <a:lvl1pPr>
+              <a:defRPr>
+                <a:latin typeface="+mn-lt"/>
+              </a:defRPr>
+            </a:lvl1pPr>
+            <a:lvl2pPr>
+              <a:defRPr>
+                <a:latin typeface="+mn-lt"/>
+              </a:defRPr>
+            </a:lvl2pPr>
+            <a:lvl3pPr>
+              <a:defRPr>
+                <a:latin typeface="+mn-lt"/>
+              </a:defRPr>
+            </a:lvl3pPr>
+            <a:lvl4pPr>
+              <a:defRPr>
+                <a:latin typeface="+mn-lt"/>
+              </a:defRPr>
+            </a:lvl4pPr>
+            <a:lvl5pPr>
+              <a:defRPr>
+                <a:latin typeface="+mn-lt"/>
+              </a:defRPr>
+            </a:lvl5pPr>
+          </a:lstStyle>
           <a:p>
             <a:pPr lvl="0"/>
             <a:r>
@@ -2341,7 +2373,7 @@
           <a:solidFill>
             <a:schemeClr val="tx1"/>
           </a:solidFill>
-          <a:latin typeface="Palatino Linotype" panose="02040502050505030304" pitchFamily="18" charset="0"/>
+          <a:latin typeface="+mj-lt"/>
           <a:ea typeface="+mj-ea"/>
           <a:cs typeface="+mj-cs"/>
         </a:defRPr>
@@ -2473,7 +2505,7 @@
           <a:solidFill>
             <a:schemeClr val="tx1"/>
           </a:solidFill>
-          <a:latin typeface="Palatino Linotype" panose="02040502050505030304" pitchFamily="18" charset="0"/>
+          <a:latin typeface="+mn-lt"/>
           <a:ea typeface="+mn-ea"/>
           <a:cs typeface="+mn-cs"/>
         </a:defRPr>
@@ -2491,7 +2523,7 @@
           <a:solidFill>
             <a:schemeClr val="tx1"/>
           </a:solidFill>
-          <a:latin typeface="Palatino Linotype" panose="02040502050505030304" pitchFamily="18" charset="0"/>
+          <a:latin typeface="+mn-lt"/>
         </a:defRPr>
       </a:lvl2pPr>
       <a:lvl3pPr marL="1143000" indent="-228600" algn="l" defTabSz="457200" rtl="0" eaLnBrk="0" fontAlgn="base" hangingPunct="0">
@@ -2507,7 +2539,7 @@
           <a:solidFill>
             <a:schemeClr val="tx1"/>
           </a:solidFill>
-          <a:latin typeface="Palatino Linotype" panose="02040502050505030304" pitchFamily="18" charset="0"/>
+          <a:latin typeface="+mn-lt"/>
         </a:defRPr>
       </a:lvl3pPr>
       <a:lvl4pPr marL="1600200" indent="-228600" algn="l" defTabSz="457200" rtl="0" eaLnBrk="0" fontAlgn="base" hangingPunct="0">
@@ -2523,7 +2555,7 @@
           <a:solidFill>
             <a:schemeClr val="tx1"/>
           </a:solidFill>
-          <a:latin typeface="Palatino Linotype" panose="02040502050505030304" pitchFamily="18" charset="0"/>
+          <a:latin typeface="+mn-lt"/>
         </a:defRPr>
       </a:lvl4pPr>
       <a:lvl5pPr marL="2057400" indent="-228600" algn="l" defTabSz="457200" rtl="0" eaLnBrk="0" fontAlgn="base" hangingPunct="0">
@@ -2539,7 +2571,7 @@
           <a:solidFill>
             <a:schemeClr val="tx1"/>
           </a:solidFill>
-          <a:latin typeface="Palatino Linotype" panose="02040502050505030304" pitchFamily="18" charset="0"/>
+          <a:latin typeface="+mn-lt"/>
         </a:defRPr>
       </a:lvl5pPr>
       <a:lvl6pPr marL="2514600" indent="-228600" algn="l" defTabSz="457200" rtl="0" fontAlgn="base">
@@ -4589,7 +4621,7 @@
         <p:spPr/>
         <p:txBody>
           <a:bodyPr>
-            <a:normAutofit/>
+            <a:normAutofit fontScale="92500" lnSpcReduction="10000"/>
           </a:bodyPr>
           <a:lstStyle/>
           <a:p>
@@ -4622,7 +4654,13 @@
               <a:rPr lang="en-US" sz="1800" dirty="0" smtClean="0">
                 <a:latin typeface="+mj-lt"/>
               </a:rPr>
-              <a:t>Oct-2015].</a:t>
+              <a:t>2015</a:t>
+            </a:r>
+            <a:r>
+              <a:rPr lang="en-US" sz="1800" dirty="0" smtClean="0">
+                <a:latin typeface="+mj-lt"/>
+              </a:rPr>
+              <a:t>].</a:t>
             </a:r>
           </a:p>
           <a:p>
@@ -4672,7 +4710,13 @@
               <a:rPr lang="en-US" sz="1800" dirty="0">
                 <a:latin typeface="+mj-lt"/>
               </a:rPr>
-              <a:t>. [Accessed: Nov-2015</a:t>
+              <a:t>. [Accessed: </a:t>
+            </a:r>
+            <a:r>
+              <a:rPr lang="en-US" sz="1800" dirty="0" smtClean="0">
+                <a:latin typeface="+mj-lt"/>
+              </a:rPr>
+              <a:t>2015</a:t>
             </a:r>
             <a:r>
               <a:rPr lang="en-US" sz="1800" dirty="0" smtClean="0">
@@ -4697,13 +4741,25 @@
               <a:rPr lang="en-US" sz="1800" i="1" dirty="0">
                 <a:latin typeface="+mj-lt"/>
               </a:rPr>
-              <a:t>Introduction to data mining</a:t>
+              <a:t>Introduction to </a:t>
+            </a:r>
+            <a:r>
+              <a:rPr lang="en-US" sz="1800" i="1" dirty="0" smtClean="0">
+                <a:latin typeface="+mj-lt"/>
+              </a:rPr>
+              <a:t>Data Mining</a:t>
             </a:r>
             <a:r>
               <a:rPr lang="en-US" sz="1800" dirty="0">
                 <a:latin typeface="+mj-lt"/>
               </a:rPr>
-              <a:t>. Boston: Pearson Addison Wesley, 2005.</a:t>
+              <a:t>. Boston: Pearson Addison Wesley, 2005</a:t>
+            </a:r>
+            <a:r>
+              <a:rPr lang="en-US" sz="1800" dirty="0" smtClean="0">
+                <a:latin typeface="+mj-lt"/>
+              </a:rPr>
+              <a:t>.</a:t>
             </a:r>
           </a:p>
           <a:p>
@@ -4712,9 +4768,236 @@
             </a:endParaRPr>
           </a:p>
           <a:p>
+            <a:r>
+              <a:rPr lang="en-US" sz="1800" dirty="0">
+                <a:latin typeface="+mj-lt"/>
+              </a:rPr>
+              <a:t>“google-</a:t>
+            </a:r>
+            <a:r>
+              <a:rPr lang="en-US" sz="1800" dirty="0" err="1">
+                <a:latin typeface="+mj-lt"/>
+              </a:rPr>
+              <a:t>gson</a:t>
+            </a:r>
+            <a:r>
+              <a:rPr lang="en-US" sz="1800" dirty="0">
+                <a:latin typeface="+mj-lt"/>
+              </a:rPr>
+              <a:t>,” </a:t>
+            </a:r>
+            <a:r>
+              <a:rPr lang="en-US" sz="1800" i="1" dirty="0">
+                <a:latin typeface="+mj-lt"/>
+              </a:rPr>
+              <a:t>GitHub</a:t>
+            </a:r>
+            <a:r>
+              <a:rPr lang="en-US" sz="1800" dirty="0">
+                <a:latin typeface="+mj-lt"/>
+              </a:rPr>
+              <a:t>. [Online]. </a:t>
+            </a:r>
+            <a:r>
+              <a:rPr lang="en-US" sz="1800" dirty="0">
+                <a:latin typeface="+mj-lt"/>
+              </a:rPr>
+              <a:t>Available at: </a:t>
+            </a:r>
+            <a:r>
+              <a:rPr lang="en-US" sz="1800" dirty="0">
+                <a:latin typeface="+mj-lt"/>
+                <a:hlinkClick r:id="rId4"/>
+              </a:rPr>
+              <a:t>https://</a:t>
+            </a:r>
+            <a:r>
+              <a:rPr lang="en-US" sz="1800" dirty="0" smtClean="0">
+                <a:latin typeface="+mj-lt"/>
+                <a:hlinkClick r:id="rId4"/>
+              </a:rPr>
+              <a:t>github.com/google/gson</a:t>
+            </a:r>
+            <a:r>
+              <a:rPr lang="en-US" sz="1800" dirty="0" smtClean="0">
+                <a:latin typeface="+mj-lt"/>
+              </a:rPr>
+              <a:t>. </a:t>
+            </a:r>
+            <a:r>
+              <a:rPr lang="en-US" sz="1800" dirty="0">
+                <a:latin typeface="+mj-lt"/>
+              </a:rPr>
+              <a:t>[Accessed: 2015</a:t>
+            </a:r>
+            <a:r>
+              <a:rPr lang="en-US" sz="1800" dirty="0" smtClean="0">
+                <a:latin typeface="+mj-lt"/>
+              </a:rPr>
+              <a:t>].</a:t>
+            </a:r>
+          </a:p>
+          <a:p>
             <a:endParaRPr lang="en-US" sz="1800" dirty="0">
               <a:latin typeface="+mj-lt"/>
             </a:endParaRPr>
+          </a:p>
+          <a:p>
+            <a:r>
+              <a:rPr lang="en-US" sz="1800" dirty="0">
+                <a:latin typeface="+mj-lt"/>
+              </a:rPr>
+              <a:t>W. </a:t>
+            </a:r>
+            <a:r>
+              <a:rPr lang="en-US" sz="1800" dirty="0" err="1">
+                <a:latin typeface="+mj-lt"/>
+              </a:rPr>
+              <a:t>Ochandarena</a:t>
+            </a:r>
+            <a:r>
+              <a:rPr lang="en-US" sz="1800" dirty="0">
+                <a:latin typeface="+mj-lt"/>
+              </a:rPr>
+              <a:t>, “Spinning Up a Hadoop Cluster in the Cloud | </a:t>
+            </a:r>
+            <a:r>
+              <a:rPr lang="en-US" sz="1800" dirty="0" err="1">
+                <a:latin typeface="+mj-lt"/>
+              </a:rPr>
+              <a:t>MapR</a:t>
+            </a:r>
+            <a:r>
+              <a:rPr lang="en-US" sz="1800" dirty="0" smtClean="0">
+                <a:latin typeface="+mj-lt"/>
+              </a:rPr>
+              <a:t>,” </a:t>
+            </a:r>
+            <a:r>
+              <a:rPr lang="en-US" sz="1800" i="1" dirty="0" err="1" smtClean="0">
+                <a:latin typeface="+mj-lt"/>
+              </a:rPr>
+              <a:t>MapR</a:t>
+            </a:r>
+            <a:r>
+              <a:rPr lang="en-US" sz="1800" i="1" dirty="0" smtClean="0">
+                <a:latin typeface="+mj-lt"/>
+              </a:rPr>
+              <a:t> </a:t>
+            </a:r>
+            <a:r>
+              <a:rPr lang="en-US" sz="1800" i="1" dirty="0">
+                <a:latin typeface="+mj-lt"/>
+              </a:rPr>
+              <a:t>Blog</a:t>
+            </a:r>
+            <a:r>
+              <a:rPr lang="en-US" sz="1800" dirty="0">
+                <a:latin typeface="+mj-lt"/>
+              </a:rPr>
+              <a:t>. </a:t>
+            </a:r>
+            <a:r>
+              <a:rPr lang="en-US" sz="1800" dirty="0">
+                <a:latin typeface="+mj-lt"/>
+              </a:rPr>
+              <a:t>[Online]. </a:t>
+            </a:r>
+            <a:r>
+              <a:rPr lang="en-US" sz="1800" dirty="0">
+                <a:latin typeface="+mj-lt"/>
+              </a:rPr>
+              <a:t>Available at: </a:t>
+            </a:r>
+            <a:r>
+              <a:rPr lang="en-US" sz="1800" dirty="0">
+                <a:latin typeface="+mj-lt"/>
+                <a:hlinkClick r:id="rId5"/>
+              </a:rPr>
+              <a:t>https://</a:t>
+            </a:r>
+            <a:r>
+              <a:rPr lang="en-US" sz="1800" dirty="0" smtClean="0">
+                <a:latin typeface="+mj-lt"/>
+                <a:hlinkClick r:id="rId5"/>
+              </a:rPr>
+              <a:t>www.mapr.com/blog/spinning-hadoop-cluster-cloud</a:t>
+            </a:r>
+            <a:r>
+              <a:rPr lang="en-US" sz="1800" dirty="0" smtClean="0">
+                <a:latin typeface="+mj-lt"/>
+              </a:rPr>
+              <a:t>. </a:t>
+            </a:r>
+            <a:r>
+              <a:rPr lang="en-US" sz="1800" dirty="0">
+                <a:latin typeface="+mj-lt"/>
+              </a:rPr>
+              <a:t>[Accessed: 2015</a:t>
+            </a:r>
+            <a:r>
+              <a:rPr lang="en-US" sz="1800" dirty="0" smtClean="0">
+                <a:latin typeface="+mj-lt"/>
+              </a:rPr>
+              <a:t>].</a:t>
+            </a:r>
+          </a:p>
+          <a:p>
+            <a:endParaRPr lang="en-US" sz="1800" dirty="0">
+              <a:latin typeface="+mj-lt"/>
+            </a:endParaRPr>
+          </a:p>
+          <a:p>
+            <a:r>
+              <a:rPr lang="en-US" sz="1800" dirty="0">
+                <a:latin typeface="+mj-lt"/>
+              </a:rPr>
+              <a:t>“Maven in 5 Minutes,” </a:t>
+            </a:r>
+            <a:r>
+              <a:rPr lang="en-US" sz="1800" i="1" dirty="0">
+                <a:latin typeface="+mj-lt"/>
+              </a:rPr>
+              <a:t>Apache Maven Project</a:t>
+            </a:r>
+            <a:r>
+              <a:rPr lang="en-US" sz="1800" dirty="0">
+                <a:latin typeface="+mj-lt"/>
+              </a:rPr>
+              <a:t>. [Online]. </a:t>
+            </a:r>
+            <a:r>
+              <a:rPr lang="en-US" sz="1800" dirty="0">
+                <a:latin typeface="+mj-lt"/>
+              </a:rPr>
+              <a:t>Available at: </a:t>
+            </a:r>
+            <a:r>
+              <a:rPr lang="en-US" sz="1800" dirty="0">
+                <a:latin typeface="+mj-lt"/>
+                <a:hlinkClick r:id="rId6"/>
+              </a:rPr>
+              <a:t>https://</a:t>
+            </a:r>
+            <a:r>
+              <a:rPr lang="en-US" sz="1800" dirty="0" smtClean="0">
+                <a:latin typeface="+mj-lt"/>
+                <a:hlinkClick r:id="rId6"/>
+              </a:rPr>
+              <a:t>maven.apache.org/guides/getting-started/maven-in-five-minutes.html</a:t>
+            </a:r>
+            <a:r>
+              <a:rPr lang="en-US" sz="1800" dirty="0" smtClean="0">
+                <a:latin typeface="+mj-lt"/>
+              </a:rPr>
+              <a:t>. </a:t>
+            </a:r>
+            <a:r>
+              <a:rPr lang="en-US" sz="1800" dirty="0">
+                <a:latin typeface="+mj-lt"/>
+              </a:rPr>
+              <a:t>[Accessed: 2015].</a:t>
+            </a:r>
           </a:p>
         </p:txBody>
       </p:sp>
@@ -4968,8 +5251,17 @@
               <a:rPr lang="en-US" sz="2000" dirty="0" smtClean="0">
                 <a:latin typeface="+mj-lt"/>
               </a:rPr>
-              <a:t>Zayd Hammoudeh</a:t>
-            </a:r>
+              <a:t>Zayd </a:t>
+            </a:r>
+            <a:r>
+              <a:rPr lang="en-US" sz="2000" dirty="0" smtClean="0">
+                <a:latin typeface="+mj-lt"/>
+              </a:rPr>
+              <a:t>Hammoudeh, Shubhangi Rakhonde</a:t>
+            </a:r>
+            <a:endParaRPr lang="en-US" sz="2000" dirty="0" smtClean="0">
+              <a:latin typeface="+mj-lt"/>
+            </a:endParaRPr>
           </a:p>
           <a:p>
             <a:endParaRPr lang="en-US" sz="2000" dirty="0">
@@ -5639,9 +5931,50 @@
           </a:p>
         </p:txBody>
       </p:sp>
+      <p:sp>
+        <p:nvSpPr>
+          <p:cNvPr id="5" name="TextBox 4"/>
+          <p:cNvSpPr txBox="1"/>
+          <p:nvPr/>
+        </p:nvSpPr>
+        <p:spPr>
+          <a:xfrm>
+            <a:off x="1171575" y="6416159"/>
+            <a:ext cx="6816290" cy="369332"/>
+          </a:xfrm>
+          <a:prstGeom prst="rect">
+            <a:avLst/>
+          </a:prstGeom>
+          <a:noFill/>
+        </p:spPr>
+        <p:txBody>
+          <a:bodyPr wrap="none" rtlCol="0">
+            <a:spAutoFit/>
+          </a:bodyPr>
+          <a:lstStyle/>
+          <a:p>
+            <a:pPr algn="ctr"/>
+            <a:r>
+              <a:rPr lang="en-US" dirty="0" smtClean="0">
+                <a:latin typeface="Palatino Linotype" panose="02040502050505030304" pitchFamily="18" charset="0"/>
+              </a:rPr>
+              <a:t>Note: </a:t>
+            </a:r>
+            <a:r>
+              <a:rPr lang="en-US" b="0" dirty="0" smtClean="0">
+                <a:latin typeface="Palatino Linotype" panose="02040502050505030304" pitchFamily="18" charset="0"/>
+              </a:rPr>
+              <a:t>KNN approaches #1 and #2 use different distance metrics</a:t>
+            </a:r>
+            <a:endParaRPr lang="en-US" b="0" dirty="0">
+              <a:latin typeface="Palatino Linotype" panose="02040502050505030304" pitchFamily="18" charset="0"/>
+            </a:endParaRPr>
+          </a:p>
+        </p:txBody>
+      </p:sp>
       <p:pic>
         <p:nvPicPr>
-          <p:cNvPr id="2050" name="Picture 2"/>
+          <p:cNvPr id="1026" name="Picture 2"/>
           <p:cNvPicPr>
             <a:picLocks noChangeAspect="1" noChangeArrowheads="1"/>
           </p:cNvPicPr>
@@ -5662,8 +5995,8 @@
         </p:blipFill>
         <p:spPr bwMode="auto">
           <a:xfrm>
-            <a:off x="152401" y="1263229"/>
-            <a:ext cx="8877300" cy="4575595"/>
+            <a:off x="47626" y="1514476"/>
+            <a:ext cx="9072644" cy="4048124"/>
           </a:xfrm>
           <a:prstGeom prst="rect">
             <a:avLst/>
@@ -5693,47 +6026,6 @@
           </a:extLst>
         </p:spPr>
       </p:pic>
-      <p:sp>
-        <p:nvSpPr>
-          <p:cNvPr id="5" name="TextBox 4"/>
-          <p:cNvSpPr txBox="1"/>
-          <p:nvPr/>
-        </p:nvSpPr>
-        <p:spPr>
-          <a:xfrm>
-            <a:off x="1171575" y="6416159"/>
-            <a:ext cx="6816290" cy="369332"/>
-          </a:xfrm>
-          <a:prstGeom prst="rect">
-            <a:avLst/>
-          </a:prstGeom>
-          <a:noFill/>
-        </p:spPr>
-        <p:txBody>
-          <a:bodyPr wrap="none" rtlCol="0">
-            <a:spAutoFit/>
-          </a:bodyPr>
-          <a:lstStyle/>
-          <a:p>
-            <a:pPr algn="ctr"/>
-            <a:r>
-              <a:rPr lang="en-US" dirty="0" smtClean="0">
-                <a:latin typeface="Palatino Linotype" panose="02040502050505030304" pitchFamily="18" charset="0"/>
-              </a:rPr>
-              <a:t>Note: </a:t>
-            </a:r>
-            <a:r>
-              <a:rPr lang="en-US" b="0" dirty="0" smtClean="0">
-                <a:latin typeface="Palatino Linotype" panose="02040502050505030304" pitchFamily="18" charset="0"/>
-              </a:rPr>
-              <a:t>KNN approaches #1 and #2 use different distance metrics</a:t>
-            </a:r>
-            <a:endParaRPr lang="en-US" b="0" dirty="0">
-              <a:latin typeface="Palatino Linotype" panose="02040502050505030304" pitchFamily="18" charset="0"/>
-            </a:endParaRPr>
-          </a:p>
-        </p:txBody>
-      </p:sp>
     </p:spTree>
     <p:extLst>
       <p:ext uri="{BB962C8B-B14F-4D97-AF65-F5344CB8AC3E}">
@@ -5835,9 +6127,50 @@
           </a:p>
         </p:txBody>
       </p:sp>
+      <p:sp>
+        <p:nvSpPr>
+          <p:cNvPr id="7" name="TextBox 6"/>
+          <p:cNvSpPr txBox="1"/>
+          <p:nvPr/>
+        </p:nvSpPr>
+        <p:spPr>
+          <a:xfrm>
+            <a:off x="1171575" y="6416159"/>
+            <a:ext cx="6816290" cy="369332"/>
+          </a:xfrm>
+          <a:prstGeom prst="rect">
+            <a:avLst/>
+          </a:prstGeom>
+          <a:noFill/>
+        </p:spPr>
+        <p:txBody>
+          <a:bodyPr wrap="none" rtlCol="0">
+            <a:spAutoFit/>
+          </a:bodyPr>
+          <a:lstStyle/>
+          <a:p>
+            <a:pPr algn="ctr"/>
+            <a:r>
+              <a:rPr lang="en-US" dirty="0" smtClean="0">
+                <a:latin typeface="Palatino Linotype" panose="02040502050505030304" pitchFamily="18" charset="0"/>
+              </a:rPr>
+              <a:t>Note: </a:t>
+            </a:r>
+            <a:r>
+              <a:rPr lang="en-US" b="0" dirty="0" smtClean="0">
+                <a:latin typeface="Palatino Linotype" panose="02040502050505030304" pitchFamily="18" charset="0"/>
+              </a:rPr>
+              <a:t>KNN approaches #1 and #2 use different distance metrics</a:t>
+            </a:r>
+            <a:endParaRPr lang="en-US" b="0" dirty="0">
+              <a:latin typeface="Palatino Linotype" panose="02040502050505030304" pitchFamily="18" charset="0"/>
+            </a:endParaRPr>
+          </a:p>
+        </p:txBody>
+      </p:sp>
       <p:pic>
         <p:nvPicPr>
-          <p:cNvPr id="1026" name="Picture 2"/>
+          <p:cNvPr id="2050" name="Picture 2"/>
           <p:cNvPicPr>
             <a:picLocks noGrp="1" noChangeAspect="1" noChangeArrowheads="1"/>
           </p:cNvPicPr>
@@ -5860,8 +6193,8 @@
         </p:blipFill>
         <p:spPr bwMode="auto">
           <a:xfrm>
-            <a:off x="80924" y="1358900"/>
-            <a:ext cx="8973680" cy="4375150"/>
+            <a:off x="9526" y="1524001"/>
+            <a:ext cx="9051168" cy="3848100"/>
           </a:xfrm>
           <a:prstGeom prst="rect">
             <a:avLst/>
@@ -5891,47 +6224,6 @@
           </a:extLst>
         </p:spPr>
       </p:pic>
-      <p:sp>
-        <p:nvSpPr>
-          <p:cNvPr id="7" name="TextBox 6"/>
-          <p:cNvSpPr txBox="1"/>
-          <p:nvPr/>
-        </p:nvSpPr>
-        <p:spPr>
-          <a:xfrm>
-            <a:off x="1171575" y="6416159"/>
-            <a:ext cx="6816290" cy="369332"/>
-          </a:xfrm>
-          <a:prstGeom prst="rect">
-            <a:avLst/>
-          </a:prstGeom>
-          <a:noFill/>
-        </p:spPr>
-        <p:txBody>
-          <a:bodyPr wrap="none" rtlCol="0">
-            <a:spAutoFit/>
-          </a:bodyPr>
-          <a:lstStyle/>
-          <a:p>
-            <a:pPr algn="ctr"/>
-            <a:r>
-              <a:rPr lang="en-US" dirty="0" smtClean="0">
-                <a:latin typeface="Palatino Linotype" panose="02040502050505030304" pitchFamily="18" charset="0"/>
-              </a:rPr>
-              <a:t>Note: </a:t>
-            </a:r>
-            <a:r>
-              <a:rPr lang="en-US" b="0" dirty="0" smtClean="0">
-                <a:latin typeface="Palatino Linotype" panose="02040502050505030304" pitchFamily="18" charset="0"/>
-              </a:rPr>
-              <a:t>KNN approaches #1 and #2 use different distance metrics</a:t>
-            </a:r>
-            <a:endParaRPr lang="en-US" b="0" dirty="0">
-              <a:latin typeface="Palatino Linotype" panose="02040502050505030304" pitchFamily="18" charset="0"/>
-            </a:endParaRPr>
-          </a:p>
-        </p:txBody>
-      </p:sp>
     </p:spTree>
     <p:extLst>
       <p:ext uri="{BB962C8B-B14F-4D97-AF65-F5344CB8AC3E}">
@@ -6024,8 +6316,17 @@
               <a:rPr lang="en-US" dirty="0" smtClean="0">
                 <a:latin typeface="+mj-lt"/>
               </a:rPr>
-              <a:t>Implemented in standard Java</a:t>
-            </a:r>
+              <a:t>Implemented in standard </a:t>
+            </a:r>
+            <a:r>
+              <a:rPr lang="en-US" dirty="0" smtClean="0">
+                <a:latin typeface="+mj-lt"/>
+              </a:rPr>
+              <a:t>Java with the GSON library and Maven</a:t>
+            </a:r>
+            <a:endParaRPr lang="en-US" dirty="0" smtClean="0">
+              <a:latin typeface="+mj-lt"/>
+            </a:endParaRPr>
           </a:p>
           <a:p>
             <a:pPr>
@@ -6295,13 +6596,13 @@
               <a:rPr lang="en-US" dirty="0" smtClean="0">
                 <a:latin typeface="+mj-lt"/>
               </a:rPr>
-              <a:t>Bernoulli Naïve </a:t>
+              <a:t>Multinomial &amp; Bernoulli </a:t>
             </a:r>
             <a:r>
               <a:rPr lang="en-US" dirty="0" smtClean="0">
                 <a:latin typeface="+mj-lt"/>
               </a:rPr>
-              <a:t>Bayes</a:t>
+              <a:t>Naïve Bayes</a:t>
             </a:r>
             <a:endParaRPr lang="en-US" dirty="0">
               <a:latin typeface="+mj-lt"/>
@@ -6322,7 +6623,7 @@
         <p:spPr/>
         <p:txBody>
           <a:bodyPr>
-            <a:normAutofit lnSpcReduction="10000"/>
+            <a:normAutofit fontScale="92500" lnSpcReduction="20000"/>
           </a:bodyPr>
           <a:lstStyle/>
           <a:p>
@@ -6335,8 +6636,17 @@
               <a:rPr lang="en-US" dirty="0" smtClean="0">
                 <a:latin typeface="+mj-lt"/>
               </a:rPr>
-              <a:t>Implemented in MapReduce</a:t>
-            </a:r>
+              <a:t>Implemented in </a:t>
+            </a:r>
+            <a:r>
+              <a:rPr lang="en-US" dirty="0" smtClean="0">
+                <a:latin typeface="+mj-lt"/>
+              </a:rPr>
+              <a:t>standard MapReduce</a:t>
+            </a:r>
+            <a:endParaRPr lang="en-US" dirty="0" smtClean="0">
+              <a:latin typeface="+mj-lt"/>
+            </a:endParaRPr>
           </a:p>
           <a:p>
             <a:pPr>
@@ -6358,7 +6668,13 @@
               <a:rPr lang="en-US" dirty="0" smtClean="0">
                 <a:latin typeface="+mj-lt"/>
               </a:rPr>
-              <a:t>Calculates the prior probability of each ingredient for each cuisine type using the input training set.</a:t>
+              <a:t>Calculates </a:t>
+            </a:r>
+            <a:r>
+              <a:rPr lang="en-US" dirty="0" smtClean="0">
+                <a:latin typeface="+mj-lt"/>
+              </a:rPr>
+              <a:t>the prior probability of each ingredient for each cuisine type using the input training set.</a:t>
             </a:r>
           </a:p>
           <a:p>
@@ -6381,7 +6697,13 @@
               <a:rPr lang="en-US" dirty="0" smtClean="0">
                 <a:latin typeface="+mj-lt"/>
               </a:rPr>
-              <a:t>Calculates the class probability of each record in the testing set.  Returns each record’s class probability to the ensemble classifier.</a:t>
+              <a:t>Calculates the class probability of each record in the testing set.  Returns each record’s class probability to the ensemble classifier</a:t>
+            </a:r>
+            <a:r>
+              <a:rPr lang="en-US" dirty="0" smtClean="0">
+                <a:latin typeface="+mj-lt"/>
+              </a:rPr>
+              <a:t>.</a:t>
             </a:r>
           </a:p>
           <a:p>
@@ -6389,6 +6711,54 @@
               <a:lnSpc>
                 <a:spcPct val="110000"/>
               </a:lnSpc>
+            </a:pPr>
+            <a:endParaRPr lang="en-US" dirty="0">
+              <a:latin typeface="+mj-lt"/>
+            </a:endParaRPr>
+          </a:p>
+          <a:p>
+            <a:pPr lvl="1">
+              <a:lnSpc>
+                <a:spcPct val="110000"/>
+              </a:lnSpc>
+            </a:pPr>
+            <a:r>
+              <a:rPr lang="en-US" dirty="0">
+                <a:latin typeface="+mn-lt"/>
+              </a:rPr>
+              <a:t>To simplify code design and testing, we used the </a:t>
+            </a:r>
+            <a:r>
+              <a:rPr lang="en-US" b="1" i="1" dirty="0">
+                <a:solidFill>
+                  <a:srgbClr val="008000"/>
+                </a:solidFill>
+                <a:latin typeface="+mn-lt"/>
+              </a:rPr>
+              <a:t>strategy pattern</a:t>
+            </a:r>
+            <a:r>
+              <a:rPr lang="en-US" b="1" dirty="0">
+                <a:solidFill>
+                  <a:srgbClr val="008000"/>
+                </a:solidFill>
+                <a:latin typeface="+mn-lt"/>
+              </a:rPr>
+              <a:t> </a:t>
+            </a:r>
+            <a:r>
+              <a:rPr lang="en-US" dirty="0">
+                <a:latin typeface="+mn-lt"/>
+              </a:rPr>
+              <a:t>for calculating the distance.</a:t>
+            </a:r>
+          </a:p>
+          <a:p>
+            <a:pPr marL="0" indent="0">
+              <a:lnSpc>
+                <a:spcPct val="110000"/>
+              </a:lnSpc>
+              <a:buNone/>
             </a:pPr>
             <a:endParaRPr lang="en-US" dirty="0">
               <a:latin typeface="+mj-lt"/>
@@ -6551,13 +6921,7 @@
               <a:rPr lang="en-US" dirty="0" smtClean="0">
                 <a:latin typeface="+mj-lt"/>
               </a:rPr>
-              <a:t>K-Nearest </a:t>
-            </a:r>
-            <a:r>
-              <a:rPr lang="en-US" dirty="0" smtClean="0">
-                <a:latin typeface="+mj-lt"/>
-              </a:rPr>
-              <a:t>Neighbors (KNN)</a:t>
+              <a:t>K-Nearest Neighbors (KNN)</a:t>
             </a:r>
             <a:endParaRPr lang="en-US" dirty="0">
               <a:latin typeface="+mj-lt"/>
@@ -6580,7 +6944,7 @@
             <p:spPr/>
             <p:txBody>
               <a:bodyPr>
-                <a:normAutofit fontScale="92500"/>
+                <a:normAutofit lnSpcReduction="10000"/>
               </a:bodyPr>
               <a:lstStyle/>
               <a:p>
@@ -6720,31 +7084,22 @@
                   <a:rPr lang="en-US" dirty="0" smtClean="0">
                     <a:latin typeface="+mj-lt"/>
                   </a:rPr>
-                  <a:t>To simplify code design and testing, we used the </a:t>
+                  <a:t>Also uses the </a:t>
                 </a:r>
                 <a:r>
-                  <a:rPr lang="en-US" b="1" i="1" dirty="0" smtClean="0">
+                  <a:rPr lang="en-US" sz="2000" b="1" i="1" dirty="0">
                     <a:solidFill>
                       <a:srgbClr val="008000"/>
                     </a:solidFill>
-                    <a:latin typeface="+mj-lt"/>
+                    <a:latin typeface="+mn-lt"/>
                   </a:rPr>
-                  <a:t>strategy pattern</a:t>
-                </a:r>
-                <a:r>
-                  <a:rPr lang="en-US" b="1" dirty="0" smtClean="0">
-                    <a:solidFill>
-                      <a:srgbClr val="008000"/>
-                    </a:solidFill>
-                    <a:latin typeface="+mj-lt"/>
-                  </a:rPr>
-                  <a:t> </a:t>
+                  <a:t>strategy pattern </a:t>
                 </a:r>
                 <a:r>
                   <a:rPr lang="en-US" dirty="0" smtClean="0">
                     <a:latin typeface="+mj-lt"/>
                   </a:rPr>
-                  <a:t>for calculating the distance.</a:t>
+                  <a:t>to specify the distance metric.</a:t>
                 </a:r>
                 <a:endParaRPr lang="en-US" b="0" dirty="0" smtClean="0">
                   <a:latin typeface="+mj-lt"/>
@@ -6799,7 +7154,7 @@
               <a:blipFill rotWithShape="1">
                 <a:blip r:embed="rId2"/>
                 <a:stretch>
-                  <a:fillRect l="-815" t="-474"/>
+                  <a:fillRect l="-963" t="-949" r="-1111"/>
                 </a:stretch>
               </a:blipFill>
             </p:spPr>

</xml_diff>

<commit_message>
Updating the presentation file with an example of a custom oozie workflow on the slides.
</commit_message>
<xml_diff>
--- a/Presentation/CS286 - Ensemble Classifier on AWS.pptx
+++ b/Presentation/CS286 - Ensemble Classifier on AWS.pptx
@@ -1030,10 +1030,7 @@
           <a:bodyPr/>
           <a:lstStyle/>
           <a:p>
-            <a:r>
-              <a:rPr lang="en-US" smtClean="0"/>
-              <a:t>Tree can be very large</a:t>
-            </a:r>
+            <a:endParaRPr lang="en-US" dirty="0" smtClean="0"/>
           </a:p>
         </p:txBody>
       </p:sp>
@@ -4366,12 +4363,7 @@
             <p:ph type="title"/>
           </p:nvPr>
         </p:nvSpPr>
-        <p:spPr>
-          <a:xfrm>
-            <a:off x="2152650" y="85147"/>
-            <a:ext cx="6838950" cy="550863"/>
-          </a:xfrm>
-        </p:spPr>
+        <p:spPr/>
         <p:txBody>
           <a:bodyPr>
             <a:noAutofit/>
@@ -4411,79 +4403,135 @@
             <a:spLocks noGrp="1"/>
           </p:cNvSpPr>
           <p:nvPr>
-            <p:ph idx="1"/>
+            <p:ph sz="half" idx="1"/>
           </p:nvPr>
         </p:nvSpPr>
         <p:spPr>
           <a:xfrm>
-            <a:off x="457200" y="989013"/>
-            <a:ext cx="8186738" cy="5404167"/>
+            <a:off x="73890" y="1081373"/>
+            <a:ext cx="4608945" cy="5135562"/>
           </a:xfrm>
           <a:noFill/>
         </p:spPr>
         <p:txBody>
           <a:bodyPr>
-            <a:normAutofit/>
+            <a:normAutofit fontScale="70000" lnSpcReduction="20000"/>
           </a:bodyPr>
           <a:lstStyle/>
           <a:p>
+            <a:pPr>
+              <a:lnSpc>
+                <a:spcPct val="120000"/>
+              </a:lnSpc>
+            </a:pPr>
             <a:r>
               <a:rPr lang="en-US" dirty="0" smtClean="0">
                 <a:latin typeface="+mj-lt"/>
               </a:rPr>
-              <a:t>While we covered custom MapReduce configurations in class, we did not use them in our assignments.</a:t>
-            </a:r>
-          </a:p>
-          <a:p>
+              <a:t>In our class lab exercises, we did not have to use custom MapReduce configurations.</a:t>
+            </a:r>
+            <a:endParaRPr lang="en-US" dirty="0" smtClean="0">
+              <a:latin typeface="+mj-lt"/>
+            </a:endParaRPr>
+          </a:p>
+          <a:p>
+            <a:pPr>
+              <a:lnSpc>
+                <a:spcPct val="120000"/>
+              </a:lnSpc>
+            </a:pPr>
             <a:endParaRPr lang="en-US" dirty="0">
               <a:latin typeface="+mj-lt"/>
             </a:endParaRPr>
           </a:p>
           <a:p>
+            <a:pPr>
+              <a:lnSpc>
+                <a:spcPct val="120000"/>
+              </a:lnSpc>
+            </a:pPr>
             <a:r>
               <a:rPr lang="en-US" dirty="0" smtClean="0">
                 <a:latin typeface="+mj-lt"/>
               </a:rPr>
-              <a:t>Custom MapReduce configurations through XML or </a:t>
-            </a:r>
-            <a:r>
-              <a:rPr lang="en-US" dirty="0" err="1" smtClean="0">
-                <a:latin typeface="+mj-lt"/>
-              </a:rPr>
-              <a:t>Oozie</a:t>
+              <a:t>Custom MapReduce </a:t>
             </a:r>
             <a:r>
               <a:rPr lang="en-US" dirty="0" smtClean="0">
                 <a:latin typeface="+mj-lt"/>
               </a:rPr>
-              <a:t> are very powerful.  Specific uses of them in our project include:</a:t>
-            </a:r>
-          </a:p>
-          <a:p>
-            <a:pPr lvl="1"/>
+              <a:t>are </a:t>
+            </a:r>
             <a:r>
               <a:rPr lang="en-US" dirty="0" smtClean="0">
                 <a:latin typeface="+mj-lt"/>
               </a:rPr>
-              <a:t>Passing the location of a training set file</a:t>
-            </a:r>
-          </a:p>
-          <a:p>
-            <a:pPr lvl="1"/>
+              <a:t>very powerful.  Specific uses of them in our project include:</a:t>
+            </a:r>
+          </a:p>
+          <a:p>
+            <a:pPr lvl="1">
+              <a:lnSpc>
+                <a:spcPct val="120000"/>
+              </a:lnSpc>
+            </a:pPr>
             <a:r>
               <a:rPr lang="en-US" dirty="0" smtClean="0">
                 <a:latin typeface="+mj-lt"/>
               </a:rPr>
+              <a:t>Passing the </a:t>
+            </a:r>
+            <a:r>
+              <a:rPr lang="en-US" dirty="0" smtClean="0">
+                <a:latin typeface="+mj-lt"/>
+              </a:rPr>
+              <a:t>training </a:t>
+            </a:r>
+            <a:r>
+              <a:rPr lang="en-US" dirty="0" smtClean="0">
+                <a:latin typeface="+mj-lt"/>
+              </a:rPr>
+              <a:t>set </a:t>
+            </a:r>
+            <a:r>
+              <a:rPr lang="en-US" dirty="0" smtClean="0">
+                <a:latin typeface="+mj-lt"/>
+              </a:rPr>
+              <a:t>file location</a:t>
+            </a:r>
+            <a:endParaRPr lang="en-US" dirty="0" smtClean="0">
+              <a:latin typeface="+mj-lt"/>
+            </a:endParaRPr>
+          </a:p>
+          <a:p>
+            <a:pPr lvl="1">
+              <a:lnSpc>
+                <a:spcPct val="120000"/>
+              </a:lnSpc>
+            </a:pPr>
+            <a:r>
+              <a:rPr lang="en-US" dirty="0" smtClean="0">
+                <a:latin typeface="+mj-lt"/>
+              </a:rPr>
               <a:t>Strategy pattern selection of distance metric for KNN</a:t>
             </a:r>
           </a:p>
           <a:p>
-            <a:pPr lvl="1"/>
+            <a:pPr lvl="1">
+              <a:lnSpc>
+                <a:spcPct val="120000"/>
+              </a:lnSpc>
+            </a:pPr>
             <a:endParaRPr lang="en-US" dirty="0">
               <a:latin typeface="+mj-lt"/>
             </a:endParaRPr>
           </a:p>
           <a:p>
+            <a:pPr>
+              <a:lnSpc>
+                <a:spcPct val="120000"/>
+              </a:lnSpc>
+            </a:pPr>
             <a:r>
               <a:rPr lang="en-US" b="1" dirty="0" smtClean="0">
                 <a:solidFill>
@@ -4495,13 +4543,223 @@
             </a:r>
           </a:p>
           <a:p>
-            <a:pPr lvl="1"/>
+            <a:pPr lvl="1">
+              <a:lnSpc>
+                <a:spcPct val="120000"/>
+              </a:lnSpc>
+            </a:pPr>
             <a:r>
               <a:rPr lang="en-US" dirty="0" smtClean="0">
                 <a:latin typeface="+mj-lt"/>
               </a:rPr>
-              <a:t>It is important to learn how to use this powerful tool as it makes passing custom information to your MapReduce job very easy. </a:t>
-            </a:r>
+              <a:t>Custom configurations can streamline implementation schemes and enable significant flexibility.</a:t>
+            </a:r>
+            <a:endParaRPr lang="en-US" dirty="0" smtClean="0">
+              <a:latin typeface="+mj-lt"/>
+            </a:endParaRPr>
+          </a:p>
+        </p:txBody>
+      </p:sp>
+      <p:sp>
+        <p:nvSpPr>
+          <p:cNvPr id="5" name="Content Placeholder 4"/>
+          <p:cNvSpPr>
+            <a:spLocks noGrp="1"/>
+          </p:cNvSpPr>
+          <p:nvPr>
+            <p:ph sz="half" idx="2"/>
+          </p:nvPr>
+        </p:nvSpPr>
+        <p:spPr>
+          <a:xfrm>
+            <a:off x="4999183" y="1857230"/>
+            <a:ext cx="4038600" cy="2807132"/>
+          </a:xfrm>
+          <a:solidFill>
+            <a:schemeClr val="bg1"/>
+          </a:solidFill>
+          <a:ln w="25400">
+            <a:solidFill>
+              <a:srgbClr val="008000"/>
+            </a:solidFill>
+          </a:ln>
+        </p:spPr>
+        <p:txBody>
+          <a:bodyPr/>
+          <a:lstStyle/>
+          <a:p>
+            <a:pPr marL="0" indent="0">
+              <a:buNone/>
+              <a:tabLst>
+                <a:tab pos="461963" algn="l"/>
+              </a:tabLst>
+            </a:pPr>
+            <a:r>
+              <a:rPr lang="en-US" sz="1600" b="1" dirty="0" smtClean="0">
+                <a:latin typeface="Palatino Linotype" panose="02040502050505030304" pitchFamily="18" charset="0"/>
+              </a:rPr>
+              <a:t>&lt;property&gt;</a:t>
+            </a:r>
+          </a:p>
+          <a:p>
+            <a:pPr marL="0" indent="0">
+              <a:buNone/>
+              <a:tabLst>
+                <a:tab pos="461963" algn="l"/>
+              </a:tabLst>
+            </a:pPr>
+            <a:r>
+              <a:rPr lang="en-US" sz="1600" b="1" dirty="0" smtClean="0">
+                <a:latin typeface="Palatino Linotype" panose="02040502050505030304" pitchFamily="18" charset="0"/>
+              </a:rPr>
+              <a:t>	&lt;name&gt;</a:t>
+            </a:r>
+            <a:r>
+              <a:rPr lang="en-US" sz="1600" b="1" dirty="0" err="1" smtClean="0">
+                <a:latin typeface="Palatino Linotype" panose="02040502050505030304" pitchFamily="18" charset="0"/>
+              </a:rPr>
+              <a:t>trainingFile</a:t>
+            </a:r>
+            <a:r>
+              <a:rPr lang="en-US" sz="1600" b="1" dirty="0" smtClean="0">
+                <a:latin typeface="Palatino Linotype" panose="02040502050505030304" pitchFamily="18" charset="0"/>
+              </a:rPr>
+              <a:t>&lt;/name&gt;</a:t>
+            </a:r>
+          </a:p>
+          <a:p>
+            <a:pPr marL="0" indent="0">
+              <a:buNone/>
+              <a:tabLst>
+                <a:tab pos="461963" algn="l"/>
+              </a:tabLst>
+            </a:pPr>
+            <a:r>
+              <a:rPr lang="en-US" sz="1600" b="1" dirty="0" smtClean="0">
+                <a:latin typeface="Palatino Linotype" panose="02040502050505030304" pitchFamily="18" charset="0"/>
+              </a:rPr>
+              <a:t>	&lt;value&gt;${</a:t>
+            </a:r>
+            <a:r>
+              <a:rPr lang="en-US" sz="1600" b="1" dirty="0" err="1" smtClean="0">
+                <a:latin typeface="Palatino Linotype" panose="02040502050505030304" pitchFamily="18" charset="0"/>
+              </a:rPr>
+              <a:t>trainingSetFile</a:t>
+            </a:r>
+            <a:r>
+              <a:rPr lang="en-US" sz="1600" b="1" dirty="0" smtClean="0">
+                <a:latin typeface="Palatino Linotype" panose="02040502050505030304" pitchFamily="18" charset="0"/>
+              </a:rPr>
+              <a:t>}&lt;/value&gt;</a:t>
+            </a:r>
+          </a:p>
+          <a:p>
+            <a:pPr marL="0" indent="0">
+              <a:buNone/>
+              <a:tabLst>
+                <a:tab pos="461963" algn="l"/>
+              </a:tabLst>
+            </a:pPr>
+            <a:r>
+              <a:rPr lang="en-US" sz="1600" b="1" dirty="0" smtClean="0">
+                <a:latin typeface="Palatino Linotype" panose="02040502050505030304" pitchFamily="18" charset="0"/>
+              </a:rPr>
+              <a:t>&lt;/property&gt;</a:t>
+            </a:r>
+          </a:p>
+          <a:p>
+            <a:pPr marL="0" indent="0">
+              <a:buNone/>
+              <a:tabLst>
+                <a:tab pos="461963" algn="l"/>
+              </a:tabLst>
+            </a:pPr>
+            <a:endParaRPr lang="en-US" sz="1600" b="1" dirty="0" smtClean="0">
+              <a:latin typeface="Palatino Linotype" panose="02040502050505030304" pitchFamily="18" charset="0"/>
+            </a:endParaRPr>
+          </a:p>
+          <a:p>
+            <a:pPr marL="0" indent="0">
+              <a:buNone/>
+              <a:tabLst>
+                <a:tab pos="461963" algn="l"/>
+              </a:tabLst>
+            </a:pPr>
+            <a:r>
+              <a:rPr lang="en-US" sz="1600" b="1" dirty="0" smtClean="0">
+                <a:latin typeface="Palatino Linotype" panose="02040502050505030304" pitchFamily="18" charset="0"/>
+              </a:rPr>
+              <a:t>&lt;property&gt;</a:t>
+            </a:r>
+          </a:p>
+          <a:p>
+            <a:pPr marL="0" indent="0">
+              <a:buNone/>
+              <a:tabLst>
+                <a:tab pos="461963" algn="l"/>
+              </a:tabLst>
+            </a:pPr>
+            <a:r>
+              <a:rPr lang="en-US" sz="1600" b="1" dirty="0" smtClean="0">
+                <a:latin typeface="Palatino Linotype" panose="02040502050505030304" pitchFamily="18" charset="0"/>
+              </a:rPr>
+              <a:t>	&lt;name&gt;</a:t>
+            </a:r>
+            <a:r>
+              <a:rPr lang="en-US" sz="1600" b="1" dirty="0" err="1" smtClean="0">
+                <a:latin typeface="Palatino Linotype" panose="02040502050505030304" pitchFamily="18" charset="0"/>
+              </a:rPr>
+              <a:t>NaiveBayesModel</a:t>
+            </a:r>
+            <a:r>
+              <a:rPr lang="en-US" sz="1600" b="1" dirty="0" smtClean="0">
+                <a:latin typeface="Palatino Linotype" panose="02040502050505030304" pitchFamily="18" charset="0"/>
+              </a:rPr>
+              <a:t>&lt;/name&gt;</a:t>
+            </a:r>
+          </a:p>
+          <a:p>
+            <a:pPr marL="0" indent="0">
+              <a:buNone/>
+              <a:tabLst>
+                <a:tab pos="461963" algn="l"/>
+              </a:tabLst>
+            </a:pPr>
+            <a:r>
+              <a:rPr lang="en-US" sz="1600" b="1" dirty="0" smtClean="0">
+                <a:latin typeface="Palatino Linotype" panose="02040502050505030304" pitchFamily="18" charset="0"/>
+              </a:rPr>
+              <a:t>	&lt;value&gt;</a:t>
+            </a:r>
+            <a:r>
+              <a:rPr lang="en-US" sz="1600" b="1" dirty="0" err="1" smtClean="0">
+                <a:latin typeface="Palatino Linotype" panose="02040502050505030304" pitchFamily="18" charset="0"/>
+              </a:rPr>
+              <a:t>bernoulli</a:t>
+            </a:r>
+            <a:r>
+              <a:rPr lang="en-US" sz="1600" b="1" dirty="0" smtClean="0">
+                <a:latin typeface="Palatino Linotype" panose="02040502050505030304" pitchFamily="18" charset="0"/>
+              </a:rPr>
+              <a:t>&lt;/value&gt;</a:t>
+            </a:r>
+          </a:p>
+          <a:p>
+            <a:pPr marL="0" indent="0">
+              <a:buNone/>
+              <a:tabLst>
+                <a:tab pos="461963" algn="l"/>
+              </a:tabLst>
+            </a:pPr>
+            <a:r>
+              <a:rPr lang="en-US" sz="1600" b="1" dirty="0" smtClean="0">
+                <a:latin typeface="Palatino Linotype" panose="02040502050505030304" pitchFamily="18" charset="0"/>
+              </a:rPr>
+              <a:t>&lt;/property&gt;</a:t>
+            </a:r>
+            <a:endParaRPr lang="en-US" sz="1600" b="1" dirty="0">
+              <a:latin typeface="Palatino Linotype" panose="02040502050505030304" pitchFamily="18" charset="0"/>
+            </a:endParaRPr>
           </a:p>
         </p:txBody>
       </p:sp>
@@ -4530,7 +4788,65 @@
               </a:pPr>
               <a:t>15</a:t>
             </a:fld>
-            <a:endParaRPr lang="en-US"/>
+            <a:endParaRPr lang="en-US" dirty="0"/>
+          </a:p>
+        </p:txBody>
+      </p:sp>
+      <p:sp>
+        <p:nvSpPr>
+          <p:cNvPr id="6" name="TextBox 5"/>
+          <p:cNvSpPr txBox="1"/>
+          <p:nvPr/>
+        </p:nvSpPr>
+        <p:spPr>
+          <a:xfrm>
+            <a:off x="4986845" y="4881465"/>
+            <a:ext cx="4025180" cy="584775"/>
+          </a:xfrm>
+          <a:prstGeom prst="rect">
+            <a:avLst/>
+          </a:prstGeom>
+          <a:noFill/>
+        </p:spPr>
+        <p:txBody>
+          <a:bodyPr wrap="square" rtlCol="0">
+            <a:spAutoFit/>
+          </a:bodyPr>
+          <a:lstStyle/>
+          <a:p>
+            <a:pPr algn="ctr"/>
+            <a:r>
+              <a:rPr lang="en-US" sz="1600" b="0" dirty="0" smtClean="0"/>
+              <a:t>Custom MapReduce Configuration</a:t>
+            </a:r>
+          </a:p>
+          <a:p>
+            <a:pPr algn="ctr"/>
+            <a:r>
+              <a:rPr lang="en-US" sz="1600" b="0" dirty="0" smtClean="0"/>
+              <a:t>from our </a:t>
+            </a:r>
+            <a:r>
+              <a:rPr lang="en-US" sz="1600" dirty="0" err="1" smtClean="0">
+                <a:solidFill>
+                  <a:srgbClr val="008000"/>
+                </a:solidFill>
+              </a:rPr>
+              <a:t>Oozie</a:t>
+            </a:r>
+            <a:r>
+              <a:rPr lang="en-US" sz="1600" dirty="0" smtClean="0">
+                <a:solidFill>
+                  <a:srgbClr val="008000"/>
+                </a:solidFill>
+              </a:rPr>
+              <a:t> XML Workflow</a:t>
+            </a:r>
+            <a:r>
+              <a:rPr lang="en-US" sz="1600" b="0" dirty="0" smtClean="0"/>
+              <a:t> file</a:t>
+            </a:r>
+            <a:endParaRPr lang="en-US" sz="1600" b="0" dirty="0"/>
           </a:p>
         </p:txBody>
       </p:sp>
@@ -4654,13 +4970,7 @@
               <a:rPr lang="en-US" sz="1800" dirty="0" smtClean="0">
                 <a:latin typeface="+mj-lt"/>
               </a:rPr>
-              <a:t>2015</a:t>
-            </a:r>
-            <a:r>
-              <a:rPr lang="en-US" sz="1800" dirty="0" smtClean="0">
-                <a:latin typeface="+mj-lt"/>
-              </a:rPr>
-              <a:t>].</a:t>
+              <a:t>2015].</a:t>
             </a:r>
           </a:p>
           <a:p>
@@ -4716,13 +5026,7 @@
               <a:rPr lang="en-US" sz="1800" dirty="0" smtClean="0">
                 <a:latin typeface="+mj-lt"/>
               </a:rPr>
-              <a:t>2015</a:t>
-            </a:r>
-            <a:r>
-              <a:rPr lang="en-US" sz="1800" dirty="0" smtClean="0">
-                <a:latin typeface="+mj-lt"/>
-              </a:rPr>
-              <a:t>].</a:t>
+              <a:t>2015].</a:t>
             </a:r>
           </a:p>
           <a:p>
@@ -4796,13 +5100,7 @@
               <a:rPr lang="en-US" sz="1800" dirty="0">
                 <a:latin typeface="+mj-lt"/>
               </a:rPr>
-              <a:t>. [Online]. </a:t>
-            </a:r>
-            <a:r>
-              <a:rPr lang="en-US" sz="1800" dirty="0">
-                <a:latin typeface="+mj-lt"/>
-              </a:rPr>
-              <a:t>Available at: </a:t>
+              <a:t>. [Online]. Available at: </a:t>
             </a:r>
             <a:r>
               <a:rPr lang="en-US" sz="1800" dirty="0">
@@ -4895,19 +5193,7 @@
               <a:rPr lang="en-US" sz="1800" dirty="0">
                 <a:latin typeface="+mj-lt"/>
               </a:rPr>
-              <a:t>. </a:t>
-            </a:r>
-            <a:r>
-              <a:rPr lang="en-US" sz="1800" dirty="0">
-                <a:latin typeface="+mj-lt"/>
-              </a:rPr>
-              <a:t>[Online]. </a:t>
-            </a:r>
-            <a:r>
-              <a:rPr lang="en-US" sz="1800" dirty="0">
-                <a:latin typeface="+mj-lt"/>
-              </a:rPr>
-              <a:t>Available at: </a:t>
+              <a:t>. [Online]. Available at: </a:t>
             </a:r>
             <a:r>
               <a:rPr lang="en-US" sz="1800" dirty="0">
@@ -4964,13 +5250,7 @@
               <a:rPr lang="en-US" sz="1800" dirty="0">
                 <a:latin typeface="+mj-lt"/>
               </a:rPr>
-              <a:t>. [Online]. </a:t>
-            </a:r>
-            <a:r>
-              <a:rPr lang="en-US" sz="1800" dirty="0">
-                <a:latin typeface="+mj-lt"/>
-              </a:rPr>
-              <a:t>Available at: </a:t>
+              <a:t>. [Online]. Available at: </a:t>
             </a:r>
             <a:r>
               <a:rPr lang="en-US" sz="1800" dirty="0">
@@ -5251,17 +5531,8 @@
               <a:rPr lang="en-US" sz="2000" dirty="0" smtClean="0">
                 <a:latin typeface="+mj-lt"/>
               </a:rPr>
-              <a:t>Zayd </a:t>
-            </a:r>
-            <a:r>
-              <a:rPr lang="en-US" sz="2000" dirty="0" smtClean="0">
-                <a:latin typeface="+mj-lt"/>
-              </a:rPr>
-              <a:t>Hammoudeh, Shubhangi Rakhonde</a:t>
-            </a:r>
-            <a:endParaRPr lang="en-US" sz="2000" dirty="0" smtClean="0">
-              <a:latin typeface="+mj-lt"/>
-            </a:endParaRPr>
+              <a:t>Zayd Hammoudeh, Shubhangi Rakhonde</a:t>
+            </a:r>
           </a:p>
           <a:p>
             <a:endParaRPr lang="en-US" sz="2000" dirty="0">
@@ -6316,17 +6587,8 @@
               <a:rPr lang="en-US" dirty="0" smtClean="0">
                 <a:latin typeface="+mj-lt"/>
               </a:rPr>
-              <a:t>Implemented in standard </a:t>
-            </a:r>
-            <a:r>
-              <a:rPr lang="en-US" dirty="0" smtClean="0">
-                <a:latin typeface="+mj-lt"/>
-              </a:rPr>
-              <a:t>Java with the GSON library and Maven</a:t>
-            </a:r>
-            <a:endParaRPr lang="en-US" dirty="0" smtClean="0">
-              <a:latin typeface="+mj-lt"/>
-            </a:endParaRPr>
+              <a:t>Implemented in standard Java with the GSON library and Maven</a:t>
+            </a:r>
           </a:p>
           <a:p>
             <a:pPr>
@@ -6596,13 +6858,7 @@
               <a:rPr lang="en-US" dirty="0" smtClean="0">
                 <a:latin typeface="+mj-lt"/>
               </a:rPr>
-              <a:t>Multinomial &amp; Bernoulli </a:t>
-            </a:r>
-            <a:r>
-              <a:rPr lang="en-US" dirty="0" smtClean="0">
-                <a:latin typeface="+mj-lt"/>
-              </a:rPr>
-              <a:t>Naïve Bayes</a:t>
+              <a:t>Multinomial &amp; Bernoulli Naïve Bayes</a:t>
             </a:r>
             <a:endParaRPr lang="en-US" dirty="0">
               <a:latin typeface="+mj-lt"/>
@@ -6636,17 +6892,8 @@
               <a:rPr lang="en-US" dirty="0" smtClean="0">
                 <a:latin typeface="+mj-lt"/>
               </a:rPr>
-              <a:t>Implemented in </a:t>
-            </a:r>
-            <a:r>
-              <a:rPr lang="en-US" dirty="0" smtClean="0">
-                <a:latin typeface="+mj-lt"/>
-              </a:rPr>
-              <a:t>standard MapReduce</a:t>
-            </a:r>
-            <a:endParaRPr lang="en-US" dirty="0" smtClean="0">
-              <a:latin typeface="+mj-lt"/>
-            </a:endParaRPr>
+              <a:t>Implemented in standard MapReduce</a:t>
+            </a:r>
           </a:p>
           <a:p>
             <a:pPr>
@@ -6668,13 +6915,7 @@
               <a:rPr lang="en-US" dirty="0" smtClean="0">
                 <a:latin typeface="+mj-lt"/>
               </a:rPr>
-              <a:t>Calculates </a:t>
-            </a:r>
-            <a:r>
-              <a:rPr lang="en-US" dirty="0" smtClean="0">
-                <a:latin typeface="+mj-lt"/>
-              </a:rPr>
-              <a:t>the prior probability of each ingredient for each cuisine type using the input training set.</a:t>
+              <a:t>Calculates the prior probability of each ingredient for each cuisine type using the input training set.</a:t>
             </a:r>
           </a:p>
           <a:p>
@@ -6697,13 +6938,7 @@
               <a:rPr lang="en-US" dirty="0" smtClean="0">
                 <a:latin typeface="+mj-lt"/>
               </a:rPr>
-              <a:t>Calculates the class probability of each record in the testing set.  Returns each record’s class probability to the ensemble classifier</a:t>
-            </a:r>
-            <a:r>
-              <a:rPr lang="en-US" dirty="0" smtClean="0">
-                <a:latin typeface="+mj-lt"/>
-              </a:rPr>
-              <a:t>.</a:t>
+              <a:t>Calculates the class probability of each record in the testing set.  Returns each record’s class probability to the ensemble classifier.</a:t>
             </a:r>
           </a:p>
           <a:p>
@@ -6929,8 +7164,8 @@
           </a:p>
         </p:txBody>
       </p:sp>
-      <mc:AlternateContent xmlns:mc="http://schemas.openxmlformats.org/markup-compatibility/2006">
-        <mc:Choice xmlns:a14="http://schemas.microsoft.com/office/drawing/2010/main" Requires="a14">
+      <mc:AlternateContent xmlns:mc="http://schemas.openxmlformats.org/markup-compatibility/2006" xmlns:a14="http://schemas.microsoft.com/office/drawing/2010/main">
+        <mc:Choice Requires="a14">
           <p:sp>
             <p:nvSpPr>
               <p:cNvPr id="3" name="Content Placeholder 2"/>
@@ -7139,7 +7374,7 @@
             </p:txBody>
           </p:sp>
         </mc:Choice>
-        <mc:Fallback>
+        <mc:Fallback xmlns="">
           <p:sp>
             <p:nvSpPr>
               <p:cNvPr id="3" name="Content Placeholder 2"/>

</xml_diff>

<commit_message>
More improvements to the slides Changing the successive execution Visio image to mention Maven.
</commit_message>
<xml_diff>
--- a/Presentation/CS286 - Ensemble Classifier on AWS.pptx
+++ b/Presentation/CS286 - Ensemble Classifier on AWS.pptx
@@ -2815,7 +2815,38 @@
                 <a:latin typeface="Palatino Linotype" pitchFamily="18" charset="0"/>
                 <a:cs typeface="Times New Roman" pitchFamily="18" charset="0"/>
               </a:rPr>
-              <a:t>Speeding Up an Ensemble Classifier using Amazon AWS</a:t>
+              <a:t>Speeding Up an Ensemble Classifier using </a:t>
+            </a:r>
+            <a:r>
+              <a:rPr lang="en-US" sz="3600" dirty="0" err="1" smtClean="0">
+                <a:latin typeface="Palatino Linotype" pitchFamily="18" charset="0"/>
+                <a:cs typeface="Times New Roman" pitchFamily="18" charset="0"/>
+              </a:rPr>
+              <a:t>Oozie</a:t>
+            </a:r>
+            <a:r>
+              <a:rPr lang="en-US" sz="3600" smtClean="0">
+                <a:latin typeface="Palatino Linotype" pitchFamily="18" charset="0"/>
+                <a:cs typeface="Times New Roman" pitchFamily="18" charset="0"/>
+              </a:rPr>
+              <a:t> </a:t>
+            </a:r>
+          </a:p>
+          <a:p>
+            <a:pPr algn="ctr"/>
+            <a:r>
+              <a:rPr lang="en-US" sz="3600" smtClean="0">
+                <a:latin typeface="Palatino Linotype" pitchFamily="18" charset="0"/>
+                <a:cs typeface="Times New Roman" pitchFamily="18" charset="0"/>
+              </a:rPr>
+              <a:t>and Amazon </a:t>
+            </a:r>
+            <a:r>
+              <a:rPr lang="en-US" sz="3600" dirty="0" smtClean="0">
+                <a:latin typeface="Palatino Linotype" pitchFamily="18" charset="0"/>
+                <a:cs typeface="Times New Roman" pitchFamily="18" charset="0"/>
+              </a:rPr>
+              <a:t>AWS</a:t>
             </a:r>
             <a:endParaRPr lang="en-US" sz="3600" dirty="0">
               <a:latin typeface="Palatino Linotype" pitchFamily="18" charset="0"/>
@@ -3124,7 +3155,13 @@
               <a:rPr lang="en-US" dirty="0" smtClean="0">
                 <a:latin typeface="+mj-lt"/>
               </a:rPr>
-              <a:t>Execution Time Comparison</a:t>
+              <a:t>Algorithm Execution </a:t>
+            </a:r>
+            <a:r>
+              <a:rPr lang="en-US" dirty="0" smtClean="0">
+                <a:latin typeface="+mj-lt"/>
+              </a:rPr>
+              <a:t>Time Comparison</a:t>
             </a:r>
             <a:endParaRPr lang="en-US" dirty="0">
               <a:latin typeface="+mj-lt"/>
@@ -3193,8 +3230,14 @@
                 </a:solidFill>
                 <a:latin typeface="+mj-lt"/>
               </a:rPr>
-              <a:t>46%</a:t>
-            </a:r>
+              <a:t>48%</a:t>
+            </a:r>
+            <a:endParaRPr lang="en-US" sz="2400" b="1" dirty="0" smtClean="0">
+              <a:solidFill>
+                <a:srgbClr val="C00000"/>
+              </a:solidFill>
+              <a:latin typeface="+mj-lt"/>
+            </a:endParaRPr>
           </a:p>
           <a:p>
             <a:endParaRPr lang="en-US" sz="2400" dirty="0">
@@ -3215,8 +3258,17 @@
               <a:rPr lang="en-US" sz="1800" dirty="0" smtClean="0">
                 <a:latin typeface="+mj-lt"/>
               </a:rPr>
-              <a:t>On a cluster with more nodes, we expect we could reduce the execution time an additional 20% or more.</a:t>
-            </a:r>
+              <a:t>On a cluster with more nodes, we expect we could reduce the execution time an additional </a:t>
+            </a:r>
+            <a:r>
+              <a:rPr lang="en-US" sz="1800" dirty="0" smtClean="0">
+                <a:latin typeface="+mj-lt"/>
+              </a:rPr>
+              <a:t>15-20%.</a:t>
+            </a:r>
+            <a:endParaRPr lang="en-US" sz="1800" dirty="0" smtClean="0">
+              <a:latin typeface="+mj-lt"/>
+            </a:endParaRPr>
           </a:p>
           <a:p>
             <a:endParaRPr lang="en-US" sz="2400" dirty="0">
@@ -3317,7 +3369,7 @@
           <p:nvPr>
             <p:extLst>
               <p:ext uri="{D42A27DB-BD31-4B8C-83A1-F6EECF244321}">
-                <p14:modId xmlns:p14="http://schemas.microsoft.com/office/powerpoint/2010/main" val="1582436892"/>
+                <p14:modId xmlns:p14="http://schemas.microsoft.com/office/powerpoint/2010/main" val="813018543"/>
               </p:ext>
             </p:extLst>
           </p:nvPr>
@@ -3600,7 +3652,7 @@
                             <a:srgbClr val="C00000"/>
                           </a:solidFill>
                         </a:rPr>
-                        <a:t>99</a:t>
+                        <a:t>95</a:t>
                       </a:r>
                       <a:endParaRPr lang="en-US" sz="2000" b="1" dirty="0">
                         <a:solidFill>
@@ -4430,9 +4482,6 @@
               </a:rPr>
               <a:t>In our class lab exercises, we did not have to use custom MapReduce configurations.</a:t>
             </a:r>
-            <a:endParaRPr lang="en-US" dirty="0" smtClean="0">
-              <a:latin typeface="+mj-lt"/>
-            </a:endParaRPr>
           </a:p>
           <a:p>
             <a:pPr>
@@ -4460,7 +4509,7 @@
               <a:rPr lang="en-US" dirty="0" smtClean="0">
                 <a:latin typeface="+mj-lt"/>
               </a:rPr>
-              <a:t>are </a:t>
+              <a:t>configurations are </a:t>
             </a:r>
             <a:r>
               <a:rPr lang="en-US" dirty="0" smtClean="0">
@@ -4479,29 +4528,8 @@
               <a:rPr lang="en-US" dirty="0" smtClean="0">
                 <a:latin typeface="+mj-lt"/>
               </a:rPr>
-              <a:t>Passing the </a:t>
-            </a:r>
-            <a:r>
-              <a:rPr lang="en-US" dirty="0" smtClean="0">
-                <a:latin typeface="+mj-lt"/>
-              </a:rPr>
-              <a:t>training </a:t>
-            </a:r>
-            <a:r>
-              <a:rPr lang="en-US" dirty="0" smtClean="0">
-                <a:latin typeface="+mj-lt"/>
-              </a:rPr>
-              <a:t>set </a:t>
-            </a:r>
-            <a:r>
-              <a:rPr lang="en-US" dirty="0" smtClean="0">
-                <a:latin typeface="+mj-lt"/>
-              </a:rPr>
-              <a:t>file location</a:t>
-            </a:r>
-            <a:endParaRPr lang="en-US" dirty="0" smtClean="0">
-              <a:latin typeface="+mj-lt"/>
-            </a:endParaRPr>
+              <a:t>Passing the training set file location</a:t>
+            </a:r>
           </a:p>
           <a:p>
             <a:pPr lvl="1">
@@ -4539,24 +4567,20 @@
                 </a:solidFill>
                 <a:latin typeface="+mj-lt"/>
               </a:rPr>
-              <a:t>Takeaway:</a:t>
-            </a:r>
-          </a:p>
-          <a:p>
-            <a:pPr lvl="1">
-              <a:lnSpc>
-                <a:spcPct val="120000"/>
-              </a:lnSpc>
-            </a:pPr>
+              <a:t>Takeaway: </a:t>
+            </a:r>
             <a:r>
               <a:rPr lang="en-US" dirty="0" smtClean="0">
                 <a:latin typeface="+mj-lt"/>
               </a:rPr>
-              <a:t>Custom configurations can streamline implementation schemes and enable significant flexibility.</a:t>
-            </a:r>
-            <a:endParaRPr lang="en-US" dirty="0" smtClean="0">
-              <a:latin typeface="+mj-lt"/>
-            </a:endParaRPr>
+              <a:t>Custom </a:t>
+            </a:r>
+            <a:r>
+              <a:rPr lang="en-US" dirty="0" smtClean="0">
+                <a:latin typeface="+mj-lt"/>
+              </a:rPr>
+              <a:t>configurations can streamline implementation schemes and enable significant flexibility.</a:t>
+            </a:r>
           </a:p>
         </p:txBody>
       </p:sp>
@@ -4612,7 +4636,13 @@
               <a:rPr lang="en-US" sz="1600" b="1" dirty="0" smtClean="0">
                 <a:latin typeface="Palatino Linotype" panose="02040502050505030304" pitchFamily="18" charset="0"/>
               </a:rPr>
-              <a:t>	&lt;name&gt;</a:t>
+              <a:t>	&lt;name</a:t>
+            </a:r>
+            <a:r>
+              <a:rPr lang="en-US" sz="1600" b="1" dirty="0" smtClean="0">
+                <a:latin typeface="Palatino Linotype" panose="02040502050505030304" pitchFamily="18" charset="0"/>
+              </a:rPr>
+              <a:t>&gt; </a:t>
             </a:r>
             <a:r>
               <a:rPr lang="en-US" sz="1600" b="1" dirty="0" err="1" smtClean="0">
@@ -4624,7 +4654,13 @@
               <a:rPr lang="en-US" sz="1600" b="1" dirty="0" smtClean="0">
                 <a:latin typeface="Palatino Linotype" panose="02040502050505030304" pitchFamily="18" charset="0"/>
               </a:rPr>
-              <a:t>&lt;/name&gt;</a:t>
+              <a:t> &lt;/</a:t>
+            </a:r>
+            <a:r>
+              <a:rPr lang="en-US" sz="1600" b="1" dirty="0" smtClean="0">
+                <a:latin typeface="Palatino Linotype" panose="02040502050505030304" pitchFamily="18" charset="0"/>
+              </a:rPr>
+              <a:t>name&gt;</a:t>
             </a:r>
           </a:p>
           <a:p>
@@ -4638,7 +4674,13 @@
               <a:rPr lang="en-US" sz="1600" b="1" dirty="0" smtClean="0">
                 <a:latin typeface="Palatino Linotype" panose="02040502050505030304" pitchFamily="18" charset="0"/>
               </a:rPr>
-              <a:t>	&lt;value&gt;${</a:t>
+              <a:t>	&lt;value</a:t>
+            </a:r>
+            <a:r>
+              <a:rPr lang="en-US" sz="1600" b="1" dirty="0" smtClean="0">
+                <a:latin typeface="Palatino Linotype" panose="02040502050505030304" pitchFamily="18" charset="0"/>
+              </a:rPr>
+              <a:t>&gt; ${</a:t>
             </a:r>
             <a:r>
               <a:rPr lang="en-US" sz="1600" b="1" dirty="0" err="1" smtClean="0">
@@ -4650,7 +4692,13 @@
               <a:rPr lang="en-US" sz="1600" b="1" dirty="0" smtClean="0">
                 <a:latin typeface="Palatino Linotype" panose="02040502050505030304" pitchFamily="18" charset="0"/>
               </a:rPr>
-              <a:t>}&lt;/value&gt;</a:t>
+              <a:t>} &lt;/</a:t>
+            </a:r>
+            <a:r>
+              <a:rPr lang="en-US" sz="1600" b="1" dirty="0" smtClean="0">
+                <a:latin typeface="Palatino Linotype" panose="02040502050505030304" pitchFamily="18" charset="0"/>
+              </a:rPr>
+              <a:t>value&gt;</a:t>
             </a:r>
           </a:p>
           <a:p>
@@ -4703,7 +4751,13 @@
               <a:rPr lang="en-US" sz="1600" b="1" dirty="0" smtClean="0">
                 <a:latin typeface="Palatino Linotype" panose="02040502050505030304" pitchFamily="18" charset="0"/>
               </a:rPr>
-              <a:t>	&lt;name&gt;</a:t>
+              <a:t>	&lt;</a:t>
+            </a:r>
+            <a:r>
+              <a:rPr lang="en-US" sz="1600" b="1" dirty="0" smtClean="0">
+                <a:latin typeface="Palatino Linotype" panose="02040502050505030304" pitchFamily="18" charset="0"/>
+              </a:rPr>
+              <a:t>name&gt; </a:t>
             </a:r>
             <a:r>
               <a:rPr lang="en-US" sz="1600" b="1" dirty="0" err="1" smtClean="0">
@@ -4715,7 +4769,13 @@
               <a:rPr lang="en-US" sz="1600" b="1" dirty="0" smtClean="0">
                 <a:latin typeface="Palatino Linotype" panose="02040502050505030304" pitchFamily="18" charset="0"/>
               </a:rPr>
-              <a:t>&lt;/name&gt;</a:t>
+              <a:t> &lt;/</a:t>
+            </a:r>
+            <a:r>
+              <a:rPr lang="en-US" sz="1600" b="1" dirty="0" smtClean="0">
+                <a:latin typeface="Palatino Linotype" panose="02040502050505030304" pitchFamily="18" charset="0"/>
+              </a:rPr>
+              <a:t>name&gt;</a:t>
             </a:r>
           </a:p>
           <a:p>
@@ -4729,7 +4789,13 @@
               <a:rPr lang="en-US" sz="1600" b="1" dirty="0" smtClean="0">
                 <a:latin typeface="Palatino Linotype" panose="02040502050505030304" pitchFamily="18" charset="0"/>
               </a:rPr>
-              <a:t>	&lt;value&gt;</a:t>
+              <a:t>	&lt;value</a:t>
+            </a:r>
+            <a:r>
+              <a:rPr lang="en-US" sz="1600" b="1" dirty="0" smtClean="0">
+                <a:latin typeface="Palatino Linotype" panose="02040502050505030304" pitchFamily="18" charset="0"/>
+              </a:rPr>
+              <a:t>&gt; </a:t>
             </a:r>
             <a:r>
               <a:rPr lang="en-US" sz="1600" b="1" dirty="0" err="1" smtClean="0">
@@ -4741,7 +4807,13 @@
               <a:rPr lang="en-US" sz="1600" b="1" dirty="0" smtClean="0">
                 <a:latin typeface="Palatino Linotype" panose="02040502050505030304" pitchFamily="18" charset="0"/>
               </a:rPr>
-              <a:t>&lt;/value&gt;</a:t>
+              <a:t> &lt;/</a:t>
+            </a:r>
+            <a:r>
+              <a:rPr lang="en-US" sz="1600" b="1" dirty="0" smtClean="0">
+                <a:latin typeface="Palatino Linotype" panose="02040502050505030304" pitchFamily="18" charset="0"/>
+              </a:rPr>
+              <a:t>value&gt;</a:t>
             </a:r>
           </a:p>
           <a:p>
@@ -4840,11 +4912,15 @@
                   <a:srgbClr val="008000"/>
                 </a:solidFill>
               </a:rPr>
-              <a:t> XML Workflow</a:t>
-            </a:r>
-            <a:r>
-              <a:rPr lang="en-US" sz="1600" b="0" dirty="0" smtClean="0"/>
-              <a:t> file</a:t>
+              <a:t> XML </a:t>
+            </a:r>
+            <a:r>
+              <a:rPr lang="en-US" sz="1600" dirty="0" smtClean="0">
+                <a:solidFill>
+                  <a:srgbClr val="008000"/>
+                </a:solidFill>
+              </a:rPr>
+              <a:t>Workflow</a:t>
             </a:r>
             <a:endParaRPr lang="en-US" sz="1600" b="0" dirty="0"/>
           </a:p>
@@ -6199,47 +6275,6 @@
               <a:t>4</a:t>
             </a:fld>
             <a:endParaRPr lang="en-US"/>
-          </a:p>
-        </p:txBody>
-      </p:sp>
-      <p:sp>
-        <p:nvSpPr>
-          <p:cNvPr id="5" name="TextBox 4"/>
-          <p:cNvSpPr txBox="1"/>
-          <p:nvPr/>
-        </p:nvSpPr>
-        <p:spPr>
-          <a:xfrm>
-            <a:off x="1171575" y="6416159"/>
-            <a:ext cx="6816290" cy="369332"/>
-          </a:xfrm>
-          <a:prstGeom prst="rect">
-            <a:avLst/>
-          </a:prstGeom>
-          <a:noFill/>
-        </p:spPr>
-        <p:txBody>
-          <a:bodyPr wrap="none" rtlCol="0">
-            <a:spAutoFit/>
-          </a:bodyPr>
-          <a:lstStyle/>
-          <a:p>
-            <a:pPr algn="ctr"/>
-            <a:r>
-              <a:rPr lang="en-US" dirty="0" smtClean="0">
-                <a:latin typeface="Palatino Linotype" panose="02040502050505030304" pitchFamily="18" charset="0"/>
-              </a:rPr>
-              <a:t>Note: </a:t>
-            </a:r>
-            <a:r>
-              <a:rPr lang="en-US" b="0" dirty="0" smtClean="0">
-                <a:latin typeface="Palatino Linotype" panose="02040502050505030304" pitchFamily="18" charset="0"/>
-              </a:rPr>
-              <a:t>KNN approaches #1 and #2 use different distance metrics</a:t>
-            </a:r>
-            <a:endParaRPr lang="en-US" b="0" dirty="0">
-              <a:latin typeface="Palatino Linotype" panose="02040502050505030304" pitchFamily="18" charset="0"/>
-            </a:endParaRPr>
           </a:p>
         </p:txBody>
       </p:sp>
@@ -6297,6 +6332,59 @@
           </a:extLst>
         </p:spPr>
       </p:pic>
+      <p:sp>
+        <p:nvSpPr>
+          <p:cNvPr id="6" name="TextBox 5"/>
+          <p:cNvSpPr txBox="1"/>
+          <p:nvPr/>
+        </p:nvSpPr>
+        <p:spPr>
+          <a:xfrm>
+            <a:off x="1226431" y="6416159"/>
+            <a:ext cx="6706580" cy="369332"/>
+          </a:xfrm>
+          <a:prstGeom prst="rect">
+            <a:avLst/>
+          </a:prstGeom>
+          <a:noFill/>
+        </p:spPr>
+        <p:txBody>
+          <a:bodyPr wrap="none" rtlCol="0">
+            <a:spAutoFit/>
+          </a:bodyPr>
+          <a:lstStyle/>
+          <a:p>
+            <a:pPr algn="ctr"/>
+            <a:r>
+              <a:rPr lang="en-US" dirty="0" smtClean="0">
+                <a:latin typeface="+mn-lt"/>
+              </a:rPr>
+              <a:t>Note: </a:t>
+            </a:r>
+            <a:r>
+              <a:rPr lang="en-US" b="0" dirty="0" smtClean="0">
+                <a:latin typeface="+mn-lt"/>
+              </a:rPr>
+              <a:t>KNN approaches #1 and #2 </a:t>
+            </a:r>
+            <a:r>
+              <a:rPr lang="en-US" b="0" dirty="0" smtClean="0">
+                <a:latin typeface="+mn-lt"/>
+              </a:rPr>
+              <a:t>above use </a:t>
+            </a:r>
+            <a:r>
+              <a:rPr lang="en-US" b="0" dirty="0" smtClean="0">
+                <a:latin typeface="+mn-lt"/>
+              </a:rPr>
+              <a:t>different distance metrics</a:t>
+            </a:r>
+            <a:endParaRPr lang="en-US" b="0" dirty="0">
+              <a:latin typeface="+mn-lt"/>
+            </a:endParaRPr>
+          </a:p>
+        </p:txBody>
+      </p:sp>
     </p:spTree>
     <p:extLst>
       <p:ext uri="{BB962C8B-B14F-4D97-AF65-F5344CB8AC3E}">
@@ -6406,8 +6494,8 @@
         </p:nvSpPr>
         <p:spPr>
           <a:xfrm>
-            <a:off x="1171575" y="6416159"/>
-            <a:ext cx="6816290" cy="369332"/>
+            <a:off x="1226431" y="6416159"/>
+            <a:ext cx="6706580" cy="369332"/>
           </a:xfrm>
           <a:prstGeom prst="rect">
             <a:avLst/>
@@ -6423,31 +6511,41 @@
             <a:pPr algn="ctr"/>
             <a:r>
               <a:rPr lang="en-US" dirty="0" smtClean="0">
-                <a:latin typeface="Palatino Linotype" panose="02040502050505030304" pitchFamily="18" charset="0"/>
+                <a:latin typeface="+mn-lt"/>
               </a:rPr>
               <a:t>Note: </a:t>
             </a:r>
             <a:r>
               <a:rPr lang="en-US" b="0" dirty="0" smtClean="0">
-                <a:latin typeface="Palatino Linotype" panose="02040502050505030304" pitchFamily="18" charset="0"/>
-              </a:rPr>
-              <a:t>KNN approaches #1 and #2 use different distance metrics</a:t>
+                <a:latin typeface="+mn-lt"/>
+              </a:rPr>
+              <a:t>KNN approaches #1 and #2 </a:t>
+            </a:r>
+            <a:r>
+              <a:rPr lang="en-US" b="0" dirty="0" smtClean="0">
+                <a:latin typeface="+mn-lt"/>
+              </a:rPr>
+              <a:t>above use </a:t>
+            </a:r>
+            <a:r>
+              <a:rPr lang="en-US" b="0" dirty="0" smtClean="0">
+                <a:latin typeface="+mn-lt"/>
+              </a:rPr>
+              <a:t>different distance metrics</a:t>
             </a:r>
             <a:endParaRPr lang="en-US" b="0" dirty="0">
-              <a:latin typeface="Palatino Linotype" panose="02040502050505030304" pitchFamily="18" charset="0"/>
+              <a:latin typeface="+mn-lt"/>
             </a:endParaRPr>
           </a:p>
         </p:txBody>
       </p:sp>
       <p:pic>
         <p:nvPicPr>
-          <p:cNvPr id="2050" name="Picture 2"/>
+          <p:cNvPr id="1026" name="Picture 2"/>
           <p:cNvPicPr>
-            <a:picLocks noGrp="1" noChangeAspect="1" noChangeArrowheads="1"/>
+            <a:picLocks noChangeAspect="1" noChangeArrowheads="1"/>
           </p:cNvPicPr>
-          <p:nvPr>
-            <p:ph idx="1"/>
-          </p:nvPr>
+          <p:nvPr/>
         </p:nvPicPr>
         <p:blipFill>
           <a:blip r:embed="rId2">
@@ -6464,8 +6562,8 @@
         </p:blipFill>
         <p:spPr bwMode="auto">
           <a:xfrm>
-            <a:off x="9526" y="1524001"/>
-            <a:ext cx="9051168" cy="3848100"/>
+            <a:off x="76200" y="1562100"/>
+            <a:ext cx="8961549" cy="3810000"/>
           </a:xfrm>
           <a:prstGeom prst="rect">
             <a:avLst/>
@@ -6892,7 +6990,19 @@
               <a:rPr lang="en-US" dirty="0" smtClean="0">
                 <a:latin typeface="+mj-lt"/>
               </a:rPr>
-              <a:t>Implemented in standard MapReduce</a:t>
+              <a:t>Implemented </a:t>
+            </a:r>
+            <a:r>
+              <a:rPr lang="en-US" dirty="0" smtClean="0">
+                <a:latin typeface="+mj-lt"/>
+              </a:rPr>
+              <a:t>using standard </a:t>
+            </a:r>
+            <a:r>
+              <a:rPr lang="en-US" dirty="0" smtClean="0">
+                <a:latin typeface="+mj-lt"/>
+              </a:rPr>
+              <a:t>MapReduce</a:t>
             </a:r>
           </a:p>
           <a:p>
@@ -7164,8 +7274,8 @@
           </a:p>
         </p:txBody>
       </p:sp>
-      <mc:AlternateContent xmlns:mc="http://schemas.openxmlformats.org/markup-compatibility/2006" xmlns:a14="http://schemas.microsoft.com/office/drawing/2010/main">
-        <mc:Choice Requires="a14">
+      <mc:AlternateContent xmlns:mc="http://schemas.openxmlformats.org/markup-compatibility/2006">
+        <mc:Choice xmlns:a14="http://schemas.microsoft.com/office/drawing/2010/main" Requires="a14">
           <p:sp>
             <p:nvSpPr>
               <p:cNvPr id="3" name="Content Placeholder 2"/>
@@ -7192,8 +7302,21 @@
                   <a:rPr lang="en-US" dirty="0" smtClean="0">
                     <a:latin typeface="+mj-lt"/>
                   </a:rPr>
-                  <a:t>Implemented using MapReduce</a:t>
+                  <a:t>Implemented </a:t>
                 </a:r>
+                <a:r>
+                  <a:rPr lang="en-US" dirty="0"/>
+                  <a:t>using standard </a:t>
+                </a:r>
+                <a:r>
+                  <a:rPr lang="en-US" dirty="0" smtClean="0">
+                    <a:latin typeface="+mj-lt"/>
+                  </a:rPr>
+                  <a:t>MapReduce</a:t>
+                </a:r>
+                <a:endParaRPr lang="en-US" dirty="0" smtClean="0">
+                  <a:latin typeface="+mj-lt"/>
+                </a:endParaRPr>
               </a:p>
               <a:p>
                 <a:pPr>
@@ -7374,7 +7497,7 @@
             </p:txBody>
           </p:sp>
         </mc:Choice>
-        <mc:Fallback xmlns="">
+        <mc:Fallback>
           <p:sp>
             <p:nvSpPr>
               <p:cNvPr id="3" name="Content Placeholder 2"/>

</xml_diff>

<commit_message>
Updating the AWS algorithm runtime with fork using Yashi's code.
</commit_message>
<xml_diff>
--- a/Presentation/CS286 - Ensemble Classifier on AWS.pptx
+++ b/Presentation/CS286 - Ensemble Classifier on AWS.pptx
@@ -3155,13 +3155,7 @@
               <a:rPr lang="en-US" dirty="0" smtClean="0">
                 <a:latin typeface="+mj-lt"/>
               </a:rPr>
-              <a:t>Algorithm Execution </a:t>
-            </a:r>
-            <a:r>
-              <a:rPr lang="en-US" dirty="0" smtClean="0">
-                <a:latin typeface="+mj-lt"/>
-              </a:rPr>
-              <a:t>Time Comparison</a:t>
+              <a:t>Algorithm Execution Time Comparison</a:t>
             </a:r>
             <a:endParaRPr lang="en-US" dirty="0">
               <a:latin typeface="+mj-lt"/>
@@ -3232,12 +3226,6 @@
               </a:rPr>
               <a:t>48%</a:t>
             </a:r>
-            <a:endParaRPr lang="en-US" sz="2400" b="1" dirty="0" smtClean="0">
-              <a:solidFill>
-                <a:srgbClr val="C00000"/>
-              </a:solidFill>
-              <a:latin typeface="+mj-lt"/>
-            </a:endParaRPr>
           </a:p>
           <a:p>
             <a:endParaRPr lang="en-US" sz="2400" dirty="0">
@@ -3258,17 +3246,8 @@
               <a:rPr lang="en-US" sz="1800" dirty="0" smtClean="0">
                 <a:latin typeface="+mj-lt"/>
               </a:rPr>
-              <a:t>On a cluster with more nodes, we expect we could reduce the execution time an additional </a:t>
-            </a:r>
-            <a:r>
-              <a:rPr lang="en-US" sz="1800" dirty="0" smtClean="0">
-                <a:latin typeface="+mj-lt"/>
-              </a:rPr>
-              <a:t>15-20%.</a:t>
-            </a:r>
-            <a:endParaRPr lang="en-US" sz="1800" dirty="0" smtClean="0">
-              <a:latin typeface="+mj-lt"/>
-            </a:endParaRPr>
+              <a:t>On a cluster with more nodes, we expect we could reduce the execution time an additional 15-20%.</a:t>
+            </a:r>
           </a:p>
           <a:p>
             <a:endParaRPr lang="en-US" sz="2400" dirty="0">
@@ -3292,16 +3271,22 @@
               <a:rPr lang="en-US" sz="2000" dirty="0" smtClean="0">
                 <a:latin typeface="+mj-lt"/>
               </a:rPr>
-              <a:t> fork was about </a:t>
-            </a:r>
-            <a:r>
-              <a:rPr lang="en-US" sz="2000" b="1" dirty="0" smtClean="0">
+              <a:t> fork was </a:t>
+            </a:r>
+            <a:r>
+              <a:rPr lang="en-US" sz="2000" smtClean="0">
+                <a:latin typeface="+mj-lt"/>
+              </a:rPr>
+              <a:t>about </a:t>
+            </a:r>
+            <a:r>
+              <a:rPr lang="en-US" sz="2000" b="1" smtClean="0">
                 <a:solidFill>
                   <a:srgbClr val="C00000"/>
                 </a:solidFill>
                 <a:latin typeface="+mj-lt"/>
               </a:rPr>
-              <a:t>27% </a:t>
+              <a:t>26% </a:t>
             </a:r>
             <a:r>
               <a:rPr lang="en-US" sz="2000" dirty="0" smtClean="0">
@@ -3369,7 +3354,7 @@
           <p:nvPr>
             <p:extLst>
               <p:ext uri="{D42A27DB-BD31-4B8C-83A1-F6EECF244321}">
-                <p14:modId xmlns:p14="http://schemas.microsoft.com/office/powerpoint/2010/main" val="813018543"/>
+                <p14:modId xmlns:p14="http://schemas.microsoft.com/office/powerpoint/2010/main" val="1532043914"/>
               </p:ext>
             </p:extLst>
           </p:nvPr>
@@ -3600,7 +3585,7 @@
                       <a:pPr algn="ctr"/>
                       <a:r>
                         <a:rPr lang="en-US" sz="2000" dirty="0" smtClean="0"/>
-                        <a:t>135</a:t>
+                        <a:t>129</a:t>
                       </a:r>
                       <a:endParaRPr lang="en-US" sz="2000" dirty="0"/>
                     </a:p>
@@ -4503,19 +4488,7 @@
               <a:rPr lang="en-US" dirty="0" smtClean="0">
                 <a:latin typeface="+mj-lt"/>
               </a:rPr>
-              <a:t>Custom MapReduce </a:t>
-            </a:r>
-            <a:r>
-              <a:rPr lang="en-US" dirty="0" smtClean="0">
-                <a:latin typeface="+mj-lt"/>
-              </a:rPr>
-              <a:t>configurations are </a:t>
-            </a:r>
-            <a:r>
-              <a:rPr lang="en-US" dirty="0" smtClean="0">
-                <a:latin typeface="+mj-lt"/>
-              </a:rPr>
-              <a:t>very powerful.  Specific uses of them in our project include:</a:t>
+              <a:t>Custom MapReduce configurations are very powerful.  Specific uses of them in our project include:</a:t>
             </a:r>
           </a:p>
           <a:p>
@@ -4573,13 +4546,7 @@
               <a:rPr lang="en-US" dirty="0" smtClean="0">
                 <a:latin typeface="+mj-lt"/>
               </a:rPr>
-              <a:t>Custom </a:t>
-            </a:r>
-            <a:r>
-              <a:rPr lang="en-US" dirty="0" smtClean="0">
-                <a:latin typeface="+mj-lt"/>
-              </a:rPr>
-              <a:t>configurations can streamline implementation schemes and enable significant flexibility.</a:t>
+              <a:t>Custom configurations can streamline implementation schemes and enable significant flexibility.</a:t>
             </a:r>
           </a:p>
         </p:txBody>
@@ -4636,31 +4603,19 @@
               <a:rPr lang="en-US" sz="1600" b="1" dirty="0" smtClean="0">
                 <a:latin typeface="Palatino Linotype" panose="02040502050505030304" pitchFamily="18" charset="0"/>
               </a:rPr>
-              <a:t>	&lt;name</a:t>
+              <a:t>	&lt;name&gt; </a:t>
+            </a:r>
+            <a:r>
+              <a:rPr lang="en-US" sz="1600" b="1" dirty="0" err="1" smtClean="0">
+                <a:latin typeface="Palatino Linotype" panose="02040502050505030304" pitchFamily="18" charset="0"/>
+              </a:rPr>
+              <a:t>trainingFile</a:t>
             </a:r>
             <a:r>
               <a:rPr lang="en-US" sz="1600" b="1" dirty="0" smtClean="0">
                 <a:latin typeface="Palatino Linotype" panose="02040502050505030304" pitchFamily="18" charset="0"/>
               </a:rPr>
-              <a:t>&gt; </a:t>
-            </a:r>
-            <a:r>
-              <a:rPr lang="en-US" sz="1600" b="1" dirty="0" err="1" smtClean="0">
-                <a:latin typeface="Palatino Linotype" panose="02040502050505030304" pitchFamily="18" charset="0"/>
-              </a:rPr>
-              <a:t>trainingFile</a:t>
-            </a:r>
-            <a:r>
-              <a:rPr lang="en-US" sz="1600" b="1" dirty="0" smtClean="0">
-                <a:latin typeface="Palatino Linotype" panose="02040502050505030304" pitchFamily="18" charset="0"/>
-              </a:rPr>
-              <a:t> &lt;/</a:t>
-            </a:r>
-            <a:r>
-              <a:rPr lang="en-US" sz="1600" b="1" dirty="0" smtClean="0">
-                <a:latin typeface="Palatino Linotype" panose="02040502050505030304" pitchFamily="18" charset="0"/>
-              </a:rPr>
-              <a:t>name&gt;</a:t>
+              <a:t> &lt;/name&gt;</a:t>
             </a:r>
           </a:p>
           <a:p>
@@ -4674,31 +4629,19 @@
               <a:rPr lang="en-US" sz="1600" b="1" dirty="0" smtClean="0">
                 <a:latin typeface="Palatino Linotype" panose="02040502050505030304" pitchFamily="18" charset="0"/>
               </a:rPr>
-              <a:t>	&lt;value</a:t>
+              <a:t>	&lt;value&gt; ${</a:t>
+            </a:r>
+            <a:r>
+              <a:rPr lang="en-US" sz="1600" b="1" dirty="0" err="1" smtClean="0">
+                <a:latin typeface="Palatino Linotype" panose="02040502050505030304" pitchFamily="18" charset="0"/>
+              </a:rPr>
+              <a:t>trainingSetFile</a:t>
             </a:r>
             <a:r>
               <a:rPr lang="en-US" sz="1600" b="1" dirty="0" smtClean="0">
                 <a:latin typeface="Palatino Linotype" panose="02040502050505030304" pitchFamily="18" charset="0"/>
               </a:rPr>
-              <a:t>&gt; ${</a:t>
-            </a:r>
-            <a:r>
-              <a:rPr lang="en-US" sz="1600" b="1" dirty="0" err="1" smtClean="0">
-                <a:latin typeface="Palatino Linotype" panose="02040502050505030304" pitchFamily="18" charset="0"/>
-              </a:rPr>
-              <a:t>trainingSetFile</a:t>
-            </a:r>
-            <a:r>
-              <a:rPr lang="en-US" sz="1600" b="1" dirty="0" smtClean="0">
-                <a:latin typeface="Palatino Linotype" panose="02040502050505030304" pitchFamily="18" charset="0"/>
-              </a:rPr>
-              <a:t>} &lt;/</a:t>
-            </a:r>
-            <a:r>
-              <a:rPr lang="en-US" sz="1600" b="1" dirty="0" smtClean="0">
-                <a:latin typeface="Palatino Linotype" panose="02040502050505030304" pitchFamily="18" charset="0"/>
-              </a:rPr>
-              <a:t>value&gt;</a:t>
+              <a:t>} &lt;/value&gt;</a:t>
             </a:r>
           </a:p>
           <a:p>
@@ -4751,31 +4694,19 @@
               <a:rPr lang="en-US" sz="1600" b="1" dirty="0" smtClean="0">
                 <a:latin typeface="Palatino Linotype" panose="02040502050505030304" pitchFamily="18" charset="0"/>
               </a:rPr>
-              <a:t>	&lt;</a:t>
+              <a:t>	&lt;name&gt; </a:t>
+            </a:r>
+            <a:r>
+              <a:rPr lang="en-US" sz="1600" b="1" dirty="0" err="1" smtClean="0">
+                <a:latin typeface="Palatino Linotype" panose="02040502050505030304" pitchFamily="18" charset="0"/>
+              </a:rPr>
+              <a:t>NaiveBayesModel</a:t>
             </a:r>
             <a:r>
               <a:rPr lang="en-US" sz="1600" b="1" dirty="0" smtClean="0">
                 <a:latin typeface="Palatino Linotype" panose="02040502050505030304" pitchFamily="18" charset="0"/>
               </a:rPr>
-              <a:t>name&gt; </a:t>
-            </a:r>
-            <a:r>
-              <a:rPr lang="en-US" sz="1600" b="1" dirty="0" err="1" smtClean="0">
-                <a:latin typeface="Palatino Linotype" panose="02040502050505030304" pitchFamily="18" charset="0"/>
-              </a:rPr>
-              <a:t>NaiveBayesModel</a:t>
-            </a:r>
-            <a:r>
-              <a:rPr lang="en-US" sz="1600" b="1" dirty="0" smtClean="0">
-                <a:latin typeface="Palatino Linotype" panose="02040502050505030304" pitchFamily="18" charset="0"/>
-              </a:rPr>
-              <a:t> &lt;/</a:t>
-            </a:r>
-            <a:r>
-              <a:rPr lang="en-US" sz="1600" b="1" dirty="0" smtClean="0">
-                <a:latin typeface="Palatino Linotype" panose="02040502050505030304" pitchFamily="18" charset="0"/>
-              </a:rPr>
-              <a:t>name&gt;</a:t>
+              <a:t> &lt;/name&gt;</a:t>
             </a:r>
           </a:p>
           <a:p>
@@ -4789,31 +4720,19 @@
               <a:rPr lang="en-US" sz="1600" b="1" dirty="0" smtClean="0">
                 <a:latin typeface="Palatino Linotype" panose="02040502050505030304" pitchFamily="18" charset="0"/>
               </a:rPr>
-              <a:t>	&lt;value</a:t>
+              <a:t>	&lt;value&gt; </a:t>
+            </a:r>
+            <a:r>
+              <a:rPr lang="en-US" sz="1600" b="1" dirty="0" err="1" smtClean="0">
+                <a:latin typeface="Palatino Linotype" panose="02040502050505030304" pitchFamily="18" charset="0"/>
+              </a:rPr>
+              <a:t>bernoulli</a:t>
             </a:r>
             <a:r>
               <a:rPr lang="en-US" sz="1600" b="1" dirty="0" smtClean="0">
                 <a:latin typeface="Palatino Linotype" panose="02040502050505030304" pitchFamily="18" charset="0"/>
               </a:rPr>
-              <a:t>&gt; </a:t>
-            </a:r>
-            <a:r>
-              <a:rPr lang="en-US" sz="1600" b="1" dirty="0" err="1" smtClean="0">
-                <a:latin typeface="Palatino Linotype" panose="02040502050505030304" pitchFamily="18" charset="0"/>
-              </a:rPr>
-              <a:t>bernoulli</a:t>
-            </a:r>
-            <a:r>
-              <a:rPr lang="en-US" sz="1600" b="1" dirty="0" smtClean="0">
-                <a:latin typeface="Palatino Linotype" panose="02040502050505030304" pitchFamily="18" charset="0"/>
-              </a:rPr>
-              <a:t> &lt;/</a:t>
-            </a:r>
-            <a:r>
-              <a:rPr lang="en-US" sz="1600" b="1" dirty="0" smtClean="0">
-                <a:latin typeface="Palatino Linotype" panose="02040502050505030304" pitchFamily="18" charset="0"/>
-              </a:rPr>
-              <a:t>value&gt;</a:t>
+              <a:t> &lt;/value&gt;</a:t>
             </a:r>
           </a:p>
           <a:p>
@@ -4912,15 +4831,7 @@
                   <a:srgbClr val="008000"/>
                 </a:solidFill>
               </a:rPr>
-              <a:t> XML </a:t>
-            </a:r>
-            <a:r>
-              <a:rPr lang="en-US" sz="1600" dirty="0" smtClean="0">
-                <a:solidFill>
-                  <a:srgbClr val="008000"/>
-                </a:solidFill>
-              </a:rPr>
-              <a:t>Workflow</a:t>
+              <a:t> XML Workflow</a:t>
             </a:r>
             <a:endParaRPr lang="en-US" sz="1600" b="0" dirty="0"/>
           </a:p>
@@ -6365,19 +6276,7 @@
               <a:rPr lang="en-US" b="0" dirty="0" smtClean="0">
                 <a:latin typeface="+mn-lt"/>
               </a:rPr>
-              <a:t>KNN approaches #1 and #2 </a:t>
-            </a:r>
-            <a:r>
-              <a:rPr lang="en-US" b="0" dirty="0" smtClean="0">
-                <a:latin typeface="+mn-lt"/>
-              </a:rPr>
-              <a:t>above use </a:t>
-            </a:r>
-            <a:r>
-              <a:rPr lang="en-US" b="0" dirty="0" smtClean="0">
-                <a:latin typeface="+mn-lt"/>
-              </a:rPr>
-              <a:t>different distance metrics</a:t>
+              <a:t>KNN approaches #1 and #2 above use different distance metrics</a:t>
             </a:r>
             <a:endParaRPr lang="en-US" b="0" dirty="0">
               <a:latin typeface="+mn-lt"/>
@@ -6519,19 +6418,7 @@
               <a:rPr lang="en-US" b="0" dirty="0" smtClean="0">
                 <a:latin typeface="+mn-lt"/>
               </a:rPr>
-              <a:t>KNN approaches #1 and #2 </a:t>
-            </a:r>
-            <a:r>
-              <a:rPr lang="en-US" b="0" dirty="0" smtClean="0">
-                <a:latin typeface="+mn-lt"/>
-              </a:rPr>
-              <a:t>above use </a:t>
-            </a:r>
-            <a:r>
-              <a:rPr lang="en-US" b="0" dirty="0" smtClean="0">
-                <a:latin typeface="+mn-lt"/>
-              </a:rPr>
-              <a:t>different distance metrics</a:t>
+              <a:t>KNN approaches #1 and #2 above use different distance metrics</a:t>
             </a:r>
             <a:endParaRPr lang="en-US" b="0" dirty="0">
               <a:latin typeface="+mn-lt"/>
@@ -6990,19 +6877,7 @@
               <a:rPr lang="en-US" dirty="0" smtClean="0">
                 <a:latin typeface="+mj-lt"/>
               </a:rPr>
-              <a:t>Implemented </a:t>
-            </a:r>
-            <a:r>
-              <a:rPr lang="en-US" dirty="0" smtClean="0">
-                <a:latin typeface="+mj-lt"/>
-              </a:rPr>
-              <a:t>using standard </a:t>
-            </a:r>
-            <a:r>
-              <a:rPr lang="en-US" dirty="0" smtClean="0">
-                <a:latin typeface="+mj-lt"/>
-              </a:rPr>
-              <a:t>MapReduce</a:t>
+              <a:t>Implemented using standard MapReduce</a:t>
             </a:r>
           </a:p>
           <a:p>
@@ -7274,8 +7149,8 @@
           </a:p>
         </p:txBody>
       </p:sp>
-      <mc:AlternateContent xmlns:mc="http://schemas.openxmlformats.org/markup-compatibility/2006">
-        <mc:Choice xmlns:a14="http://schemas.microsoft.com/office/drawing/2010/main" Requires="a14">
+      <mc:AlternateContent xmlns:mc="http://schemas.openxmlformats.org/markup-compatibility/2006" xmlns:a14="http://schemas.microsoft.com/office/drawing/2010/main">
+        <mc:Choice Requires="a14">
           <p:sp>
             <p:nvSpPr>
               <p:cNvPr id="3" name="Content Placeholder 2"/>
@@ -7314,9 +7189,6 @@
                   </a:rPr>
                   <a:t>MapReduce</a:t>
                 </a:r>
-                <a:endParaRPr lang="en-US" dirty="0" smtClean="0">
-                  <a:latin typeface="+mj-lt"/>
-                </a:endParaRPr>
               </a:p>
               <a:p>
                 <a:pPr>
@@ -7497,7 +7369,7 @@
             </p:txBody>
           </p:sp>
         </mc:Choice>
-        <mc:Fallback>
+        <mc:Fallback xmlns="">
           <p:sp>
             <p:nvSpPr>
               <p:cNvPr id="3" name="Content Placeholder 2"/>

</xml_diff>

<commit_message>
Moveing one of the takeaways slides to an appendix.
</commit_message>
<xml_diff>
--- a/Presentation/CS286 - Ensemble Classifier on AWS.pptx
+++ b/Presentation/CS286 - Ensemble Classifier on AWS.pptx
@@ -5,7 +5,7 @@
     <p:sldMasterId id="2147483650" r:id="rId1"/>
   </p:sldMasterIdLst>
   <p:notesMasterIdLst>
-    <p:notesMasterId r:id="rId20"/>
+    <p:notesMasterId r:id="rId21"/>
   </p:notesMasterIdLst>
   <p:sldIdLst>
     <p:sldId id="256" r:id="rId2"/>
@@ -20,12 +20,13 @@
     <p:sldId id="299" r:id="rId11"/>
     <p:sldId id="300" r:id="rId12"/>
     <p:sldId id="301" r:id="rId13"/>
-    <p:sldId id="311" r:id="rId14"/>
-    <p:sldId id="302" r:id="rId15"/>
-    <p:sldId id="303" r:id="rId16"/>
-    <p:sldId id="296" r:id="rId17"/>
-    <p:sldId id="305" r:id="rId18"/>
-    <p:sldId id="291" r:id="rId19"/>
+    <p:sldId id="302" r:id="rId14"/>
+    <p:sldId id="303" r:id="rId15"/>
+    <p:sldId id="296" r:id="rId16"/>
+    <p:sldId id="305" r:id="rId17"/>
+    <p:sldId id="291" r:id="rId18"/>
+    <p:sldId id="313" r:id="rId19"/>
+    <p:sldId id="311" r:id="rId20"/>
   </p:sldIdLst>
   <p:sldSz cx="9144000" cy="6858000" type="screen4x3"/>
   <p:notesSz cx="6858000" cy="9144000"/>
@@ -966,10 +967,7 @@
           <a:bodyPr/>
           <a:lstStyle/>
           <a:p>
-            <a:r>
-              <a:rPr lang="en-US" smtClean="0"/>
-              <a:t>Tree can be very large</a:t>
-            </a:r>
+            <a:endParaRPr lang="en-US" dirty="0" smtClean="0"/>
           </a:p>
         </p:txBody>
       </p:sp>
@@ -1000,7 +998,7 @@
       </p:grpSpPr>
       <p:sp>
         <p:nvSpPr>
-          <p:cNvPr id="11265" name="Rectangle 2"/>
+          <p:cNvPr id="59393" name="Rectangle 2"/>
           <p:cNvSpPr>
             <a:spLocks noGrp="1" noRot="1" noChangeAspect="1" noChangeArrowheads="1" noTextEdit="1"/>
           </p:cNvSpPr>
@@ -1014,7 +1012,7 @@
       </p:sp>
       <p:sp>
         <p:nvSpPr>
-          <p:cNvPr id="11266" name="Rectangle 3"/>
+          <p:cNvPr id="59394" name="Rectangle 3"/>
           <p:cNvSpPr>
             <a:spLocks noGrp="1" noChangeArrowheads="1"/>
           </p:cNvSpPr>
@@ -1030,7 +1028,7 @@
           <a:bodyPr/>
           <a:lstStyle/>
           <a:p>
-            <a:endParaRPr lang="en-US" dirty="0" smtClean="0"/>
+            <a:endParaRPr lang="en-US" smtClean="0"/>
           </a:p>
         </p:txBody>
       </p:sp>
@@ -1092,6 +1090,70 @@
           <a:lstStyle/>
           <a:p>
             <a:endParaRPr lang="en-US" smtClean="0"/>
+          </a:p>
+        </p:txBody>
+      </p:sp>
+    </p:spTree>
+  </p:cSld>
+  <p:clrMapOvr>
+    <a:masterClrMapping/>
+  </p:clrMapOvr>
+</p:notes>
+</file>
+
+<file path=ppt/notesSlides/notesSlide9.xml><?xml version="1.0" encoding="utf-8"?>
+<p:notes xmlns:a="http://schemas.openxmlformats.org/drawingml/2006/main" xmlns:r="http://schemas.openxmlformats.org/officeDocument/2006/relationships" xmlns:p="http://schemas.openxmlformats.org/presentationml/2006/main">
+  <p:cSld>
+    <p:spTree>
+      <p:nvGrpSpPr>
+        <p:cNvPr id="1" name=""/>
+        <p:cNvGrpSpPr/>
+        <p:nvPr/>
+      </p:nvGrpSpPr>
+      <p:grpSpPr>
+        <a:xfrm>
+          <a:off x="0" y="0"/>
+          <a:ext cx="0" cy="0"/>
+          <a:chOff x="0" y="0"/>
+          <a:chExt cx="0" cy="0"/>
+        </a:xfrm>
+      </p:grpSpPr>
+      <p:sp>
+        <p:nvSpPr>
+          <p:cNvPr id="11265" name="Rectangle 2"/>
+          <p:cNvSpPr>
+            <a:spLocks noGrp="1" noRot="1" noChangeAspect="1" noChangeArrowheads="1" noTextEdit="1"/>
+          </p:cNvSpPr>
+          <p:nvPr>
+            <p:ph type="sldImg"/>
+          </p:nvPr>
+        </p:nvSpPr>
+        <p:spPr>
+          <a:ln/>
+        </p:spPr>
+      </p:sp>
+      <p:sp>
+        <p:nvSpPr>
+          <p:cNvPr id="11266" name="Rectangle 3"/>
+          <p:cNvSpPr>
+            <a:spLocks noGrp="1" noChangeArrowheads="1"/>
+          </p:cNvSpPr>
+          <p:nvPr>
+            <p:ph type="body" idx="1"/>
+          </p:nvPr>
+        </p:nvSpPr>
+        <p:spPr>
+          <a:noFill/>
+          <a:ln/>
+        </p:spPr>
+        <p:txBody>
+          <a:bodyPr/>
+          <a:lstStyle/>
+          <a:p>
+            <a:r>
+              <a:rPr lang="en-US" smtClean="0"/>
+              <a:t>Tree can be very large</a:t>
+            </a:r>
           </a:p>
         </p:txBody>
       </p:sp>
@@ -3870,10 +3932,16 @@
               <a:defRPr/>
             </a:pPr>
             <a:r>
+              <a:rPr lang="en-US" sz="2800" dirty="0" err="1" smtClean="0">
+                <a:latin typeface="+mj-lt"/>
+              </a:rPr>
+              <a:t>MapR</a:t>
+            </a:r>
+            <a:r>
               <a:rPr lang="en-US" sz="2800" dirty="0" smtClean="0">
                 <a:latin typeface="+mj-lt"/>
               </a:rPr>
-              <a:t>AWS Cluster Administration – Not So Easy</a:t>
+              <a:t>-FS – You Don’t Miss it Until Its Gone</a:t>
             </a:r>
             <a:endParaRPr lang="en-US" sz="2800" dirty="0">
               <a:latin typeface="+mj-lt"/>
@@ -3893,32 +3961,44 @@
         </p:nvSpPr>
         <p:spPr>
           <a:xfrm>
-            <a:off x="457199" y="989013"/>
-            <a:ext cx="8239126" cy="5404167"/>
+            <a:off x="457200" y="989013"/>
+            <a:ext cx="8186738" cy="5404167"/>
           </a:xfrm>
         </p:spPr>
         <p:txBody>
           <a:bodyPr>
-            <a:normAutofit fontScale="85000" lnSpcReduction="20000"/>
+            <a:normAutofit lnSpcReduction="10000"/>
           </a:bodyPr>
           <a:lstStyle/>
           <a:p>
             <a:pPr>
               <a:lnSpc>
-                <a:spcPct val="120000"/>
+                <a:spcPct val="110000"/>
               </a:lnSpc>
             </a:pPr>
             <a:r>
               <a:rPr lang="en-US" dirty="0" smtClean="0">
                 <a:latin typeface="+mj-lt"/>
               </a:rPr>
-              <a:t>Configuring an AWS cluster was more difficult than we had anticipated.</a:t>
+              <a:t>When originally debugging on AWS, we were not able to get </a:t>
+            </a:r>
+            <a:r>
+              <a:rPr lang="en-US" dirty="0" err="1" smtClean="0">
+                <a:latin typeface="+mj-lt"/>
+              </a:rPr>
+              <a:t>MapR</a:t>
+            </a:r>
+            <a:r>
+              <a:rPr lang="en-US" dirty="0" smtClean="0">
+                <a:latin typeface="+mj-lt"/>
+              </a:rPr>
+              <a:t>-FS running on our cluster so we used standard HDFS.</a:t>
             </a:r>
           </a:p>
           <a:p>
             <a:pPr>
               <a:lnSpc>
-                <a:spcPct val="120000"/>
+                <a:spcPct val="110000"/>
               </a:lnSpc>
             </a:pPr>
             <a:endParaRPr lang="en-US" dirty="0">
@@ -3928,60 +4008,45 @@
           <a:p>
             <a:pPr>
               <a:lnSpc>
-                <a:spcPct val="120000"/>
+                <a:spcPct val="110000"/>
               </a:lnSpc>
             </a:pPr>
             <a:r>
-              <a:rPr lang="en-US" dirty="0">
-                <a:latin typeface="+mj-lt"/>
-              </a:rPr>
-              <a:t>In our sandbox, we only setup a single instance (and some of use even struggled with that).  Bringing up and managing multiple, parallel instances is more complicated</a:t>
-            </a:r>
-            <a:r>
               <a:rPr lang="en-US" dirty="0" smtClean="0">
                 <a:latin typeface="+mj-lt"/>
               </a:rPr>
-              <a:t>.</a:t>
-            </a:r>
+              <a:t>Operations that just worked on </a:t>
+            </a:r>
+            <a:r>
+              <a:rPr lang="en-US" dirty="0" err="1" smtClean="0">
+                <a:latin typeface="+mj-lt"/>
+              </a:rPr>
+              <a:t>MapR</a:t>
+            </a:r>
+            <a:r>
+              <a:rPr lang="en-US" dirty="0" smtClean="0">
+                <a:latin typeface="+mj-lt"/>
+              </a:rPr>
+              <a:t>-FS required different, more complicated procedures on standard HDFS.</a:t>
+            </a:r>
+            <a:endParaRPr lang="en-US" b="1" dirty="0" smtClean="0">
+              <a:latin typeface="+mj-lt"/>
+            </a:endParaRPr>
           </a:p>
           <a:p>
             <a:pPr>
               <a:lnSpc>
-                <a:spcPct val="120000"/>
+                <a:spcPct val="110000"/>
               </a:lnSpc>
             </a:pPr>
-            <a:endParaRPr lang="en-US" dirty="0">
+            <a:endParaRPr lang="en-US" b="1" dirty="0">
               <a:latin typeface="+mj-lt"/>
             </a:endParaRPr>
           </a:p>
           <a:p>
             <a:pPr>
               <a:lnSpc>
-                <a:spcPct val="120000"/>
-              </a:lnSpc>
-            </a:pPr>
-            <a:r>
-              <a:rPr lang="en-US" dirty="0" smtClean="0">
-                <a:latin typeface="+mj-lt"/>
-              </a:rPr>
-              <a:t>Amazon’s Elastic MapReduce (EMR) service should make this process simpler, but we went with EC2 instances due to their lower cost</a:t>
-            </a:r>
-          </a:p>
-          <a:p>
-            <a:pPr marL="0" indent="0">
-              <a:lnSpc>
-                <a:spcPct val="120000"/>
-              </a:lnSpc>
-              <a:buNone/>
-            </a:pPr>
-            <a:endParaRPr lang="en-US" dirty="0">
-              <a:latin typeface="+mj-lt"/>
-            </a:endParaRPr>
-          </a:p>
-          <a:p>
-            <a:pPr>
-              <a:lnSpc>
-                <a:spcPct val="120000"/>
+                <a:spcPct val="110000"/>
               </a:lnSpc>
             </a:pPr>
             <a:r>
@@ -3991,44 +4056,61 @@
                 </a:solidFill>
                 <a:latin typeface="+mj-lt"/>
               </a:rPr>
-              <a:t>Takeaways:</a:t>
+              <a:t>Takeaways: </a:t>
             </a:r>
           </a:p>
           <a:p>
             <a:pPr lvl="1">
               <a:lnSpc>
-                <a:spcPct val="120000"/>
+                <a:spcPct val="110000"/>
               </a:lnSpc>
             </a:pPr>
             <a:r>
+              <a:rPr lang="en-US" dirty="0" err="1" smtClean="0">
+                <a:latin typeface="+mj-lt"/>
+              </a:rPr>
+              <a:t>MapR</a:t>
+            </a:r>
+            <a:r>
               <a:rPr lang="en-US" dirty="0" smtClean="0">
                 <a:latin typeface="+mj-lt"/>
               </a:rPr>
-              <a:t>If your future company has a system admin, become his/her friend as it is can be pain to figure out how to configure AWS yourself.</a:t>
-            </a:r>
-          </a:p>
-          <a:p>
-            <a:pPr marL="457200" lvl="1" indent="0">
+              <a:t>-FS is more useful than we knew since we have never worked with the alterative.</a:t>
+            </a:r>
+          </a:p>
+          <a:p>
+            <a:pPr lvl="1">
               <a:lnSpc>
-                <a:spcPct val="120000"/>
+                <a:spcPct val="110000"/>
               </a:lnSpc>
-              <a:buNone/>
-            </a:pPr>
-            <a:endParaRPr lang="en-US" dirty="0" smtClean="0">
+            </a:pPr>
+            <a:endParaRPr lang="en-US" dirty="0">
               <a:latin typeface="+mj-lt"/>
             </a:endParaRPr>
           </a:p>
           <a:p>
             <a:pPr lvl="1">
               <a:lnSpc>
-                <a:spcPct val="120000"/>
+                <a:spcPct val="110000"/>
               </a:lnSpc>
             </a:pPr>
             <a:r>
               <a:rPr lang="en-US" dirty="0" smtClean="0">
                 <a:latin typeface="+mj-lt"/>
               </a:rPr>
-              <a:t>If you need to do the system administration yourself, do not despair as you learn a lot of new (and unexpected) things along the way.</a:t>
+              <a:t>Consider getting experience with standard HDFS environments as many employers may not run </a:t>
+            </a:r>
+            <a:r>
+              <a:rPr lang="en-US" dirty="0" err="1" smtClean="0">
+                <a:latin typeface="+mj-lt"/>
+              </a:rPr>
+              <a:t>MapR</a:t>
+            </a:r>
+            <a:r>
+              <a:rPr lang="en-US" dirty="0" smtClean="0">
+                <a:latin typeface="+mj-lt"/>
+              </a:rPr>
+              <a:t>-FS, and you probably do not realize what you take for granted.</a:t>
             </a:r>
           </a:p>
         </p:txBody>
@@ -4065,7 +4147,7 @@
     </p:spTree>
     <p:extLst>
       <p:ext uri="{BB962C8B-B14F-4D97-AF65-F5344CB8AC3E}">
-        <p14:creationId xmlns:p14="http://schemas.microsoft.com/office/powerpoint/2010/main" val="648670633"/>
+        <p14:creationId xmlns:p14="http://schemas.microsoft.com/office/powerpoint/2010/main" val="817658699"/>
       </p:ext>
     </p:extLst>
   </p:cSld>
@@ -4117,12 +4199,7 @@
             <p:ph type="title"/>
           </p:nvPr>
         </p:nvSpPr>
-        <p:spPr>
-          <a:xfrm>
-            <a:off x="2162175" y="94672"/>
-            <a:ext cx="6838950" cy="550863"/>
-          </a:xfrm>
-        </p:spPr>
+        <p:spPr/>
         <p:txBody>
           <a:bodyPr>
             <a:noAutofit/>
@@ -4133,16 +4210,21 @@
               <a:defRPr/>
             </a:pPr>
             <a:r>
-              <a:rPr lang="en-US" sz="2800" dirty="0" err="1" smtClean="0">
-                <a:latin typeface="+mj-lt"/>
-              </a:rPr>
-              <a:t>MapR</a:t>
-            </a:r>
-            <a:r>
               <a:rPr lang="en-US" sz="2800" dirty="0" smtClean="0">
                 <a:latin typeface="+mj-lt"/>
               </a:rPr>
-              <a:t>-FS – You Don’t Miss it Until Its Gone</a:t>
+              <a:t>Fall-In Love with Custom </a:t>
+            </a:r>
+            <a:br>
+              <a:rPr lang="en-US" sz="2800" dirty="0" smtClean="0">
+                <a:latin typeface="+mj-lt"/>
+              </a:rPr>
+            </a:br>
+            <a:r>
+              <a:rPr lang="en-US" sz="2800" dirty="0" smtClean="0">
+                <a:latin typeface="+mj-lt"/>
+              </a:rPr>
+              <a:t>MapReduce Configurations</a:t>
             </a:r>
             <a:endParaRPr lang="en-US" sz="2800" dirty="0">
               <a:latin typeface="+mj-lt"/>
@@ -4157,49 +4239,38 @@
             <a:spLocks noGrp="1"/>
           </p:cNvSpPr>
           <p:nvPr>
-            <p:ph idx="1"/>
+            <p:ph sz="half" idx="1"/>
           </p:nvPr>
         </p:nvSpPr>
         <p:spPr>
           <a:xfrm>
-            <a:off x="457200" y="989013"/>
-            <a:ext cx="8186738" cy="5404167"/>
+            <a:off x="73890" y="1081373"/>
+            <a:ext cx="4608945" cy="5135562"/>
           </a:xfrm>
+          <a:noFill/>
         </p:spPr>
         <p:txBody>
           <a:bodyPr>
-            <a:normAutofit lnSpcReduction="10000"/>
+            <a:normAutofit fontScale="70000" lnSpcReduction="20000"/>
           </a:bodyPr>
           <a:lstStyle/>
           <a:p>
             <a:pPr>
               <a:lnSpc>
-                <a:spcPct val="110000"/>
+                <a:spcPct val="120000"/>
               </a:lnSpc>
             </a:pPr>
             <a:r>
               <a:rPr lang="en-US" dirty="0" smtClean="0">
                 <a:latin typeface="+mj-lt"/>
               </a:rPr>
-              <a:t>When originally debugging on AWS, we were not able to get </a:t>
-            </a:r>
-            <a:r>
-              <a:rPr lang="en-US" dirty="0" err="1" smtClean="0">
-                <a:latin typeface="+mj-lt"/>
-              </a:rPr>
-              <a:t>MapR</a:t>
-            </a:r>
-            <a:r>
-              <a:rPr lang="en-US" dirty="0" smtClean="0">
-                <a:latin typeface="+mj-lt"/>
-              </a:rPr>
-              <a:t>-FS running on our cluster so we used standard HDFS.</a:t>
+              <a:t>In our class lab exercises, we did not have to use custom MapReduce configurations.</a:t>
             </a:r>
           </a:p>
           <a:p>
             <a:pPr>
               <a:lnSpc>
-                <a:spcPct val="110000"/>
+                <a:spcPct val="120000"/>
               </a:lnSpc>
             </a:pPr>
             <a:endParaRPr lang="en-US" dirty="0">
@@ -4209,45 +4280,56 @@
           <a:p>
             <a:pPr>
               <a:lnSpc>
-                <a:spcPct val="110000"/>
+                <a:spcPct val="120000"/>
               </a:lnSpc>
             </a:pPr>
             <a:r>
               <a:rPr lang="en-US" dirty="0" smtClean="0">
                 <a:latin typeface="+mj-lt"/>
               </a:rPr>
-              <a:t>Operations that just worked on </a:t>
-            </a:r>
-            <a:r>
-              <a:rPr lang="en-US" dirty="0" err="1" smtClean="0">
-                <a:latin typeface="+mj-lt"/>
-              </a:rPr>
-              <a:t>MapR</a:t>
-            </a:r>
+              <a:t>Custom MapReduce configurations are very powerful.  Specific uses of them in our project include:</a:t>
+            </a:r>
+          </a:p>
+          <a:p>
+            <a:pPr lvl="1">
+              <a:lnSpc>
+                <a:spcPct val="120000"/>
+              </a:lnSpc>
+            </a:pPr>
             <a:r>
               <a:rPr lang="en-US" dirty="0" smtClean="0">
                 <a:latin typeface="+mj-lt"/>
               </a:rPr>
-              <a:t>-FS required different, more complicated procedures on standard HDFS.</a:t>
-            </a:r>
-            <a:endParaRPr lang="en-US" b="1" dirty="0" smtClean="0">
+              <a:t>Passing the training set file location</a:t>
+            </a:r>
+          </a:p>
+          <a:p>
+            <a:pPr lvl="1">
+              <a:lnSpc>
+                <a:spcPct val="120000"/>
+              </a:lnSpc>
+            </a:pPr>
+            <a:r>
+              <a:rPr lang="en-US" dirty="0" smtClean="0">
+                <a:latin typeface="+mj-lt"/>
+              </a:rPr>
+              <a:t>Strategy pattern selection of distance metric for KNN</a:t>
+            </a:r>
+          </a:p>
+          <a:p>
+            <a:pPr lvl="1">
+              <a:lnSpc>
+                <a:spcPct val="120000"/>
+              </a:lnSpc>
+            </a:pPr>
+            <a:endParaRPr lang="en-US" dirty="0">
               <a:latin typeface="+mj-lt"/>
             </a:endParaRPr>
           </a:p>
           <a:p>
             <a:pPr>
               <a:lnSpc>
-                <a:spcPct val="110000"/>
-              </a:lnSpc>
-            </a:pPr>
-            <a:endParaRPr lang="en-US" b="1" dirty="0">
-              <a:latin typeface="+mj-lt"/>
-            </a:endParaRPr>
-          </a:p>
-          <a:p>
-            <a:pPr>
-              <a:lnSpc>
-                <a:spcPct val="110000"/>
+                <a:spcPct val="120000"/>
               </a:lnSpc>
             </a:pPr>
             <a:r>
@@ -4257,62 +4339,217 @@
                 </a:solidFill>
                 <a:latin typeface="+mj-lt"/>
               </a:rPr>
-              <a:t>Takeaways: </a:t>
-            </a:r>
-          </a:p>
-          <a:p>
-            <a:pPr lvl="1">
-              <a:lnSpc>
-                <a:spcPct val="110000"/>
-              </a:lnSpc>
-            </a:pPr>
-            <a:r>
-              <a:rPr lang="en-US" dirty="0" err="1" smtClean="0">
-                <a:latin typeface="+mj-lt"/>
-              </a:rPr>
-              <a:t>MapR</a:t>
+              <a:t>Takeaway: </a:t>
             </a:r>
             <a:r>
               <a:rPr lang="en-US" dirty="0" smtClean="0">
                 <a:latin typeface="+mj-lt"/>
               </a:rPr>
-              <a:t>-FS is more useful than we knew since we have never worked with the alterative.</a:t>
-            </a:r>
-          </a:p>
-          <a:p>
-            <a:pPr lvl="1">
-              <a:lnSpc>
-                <a:spcPct val="110000"/>
-              </a:lnSpc>
-            </a:pPr>
-            <a:endParaRPr lang="en-US" dirty="0">
-              <a:latin typeface="+mj-lt"/>
+              <a:t>Custom configurations can streamline implementation schemes and enable significant flexibility.</a:t>
+            </a:r>
+          </a:p>
+        </p:txBody>
+      </p:sp>
+      <p:sp>
+        <p:nvSpPr>
+          <p:cNvPr id="5" name="Content Placeholder 4"/>
+          <p:cNvSpPr>
+            <a:spLocks noGrp="1"/>
+          </p:cNvSpPr>
+          <p:nvPr>
+            <p:ph sz="half" idx="2"/>
+          </p:nvPr>
+        </p:nvSpPr>
+        <p:spPr>
+          <a:xfrm>
+            <a:off x="4999183" y="1857230"/>
+            <a:ext cx="4038600" cy="2807132"/>
+          </a:xfrm>
+          <a:solidFill>
+            <a:schemeClr val="bg1"/>
+          </a:solidFill>
+          <a:ln w="25400">
+            <a:solidFill>
+              <a:srgbClr val="008000"/>
+            </a:solidFill>
+          </a:ln>
+        </p:spPr>
+        <p:txBody>
+          <a:bodyPr/>
+          <a:lstStyle/>
+          <a:p>
+            <a:pPr marL="0" indent="0">
+              <a:buNone/>
+              <a:tabLst>
+                <a:tab pos="461963" algn="l"/>
+              </a:tabLst>
+            </a:pPr>
+            <a:r>
+              <a:rPr lang="en-US" sz="1600" b="1" dirty="0" smtClean="0">
+                <a:latin typeface="Palatino Linotype" panose="02040502050505030304" pitchFamily="18" charset="0"/>
+              </a:rPr>
+              <a:t>&lt;property&gt;</a:t>
+            </a:r>
+          </a:p>
+          <a:p>
+            <a:pPr marL="0" indent="0">
+              <a:buNone/>
+              <a:tabLst>
+                <a:tab pos="461963" algn="l"/>
+              </a:tabLst>
+            </a:pPr>
+            <a:r>
+              <a:rPr lang="en-US" sz="1600" b="1" dirty="0" smtClean="0">
+                <a:latin typeface="Palatino Linotype" panose="02040502050505030304" pitchFamily="18" charset="0"/>
+              </a:rPr>
+              <a:t>	&lt;name&gt; </a:t>
+            </a:r>
+            <a:r>
+              <a:rPr lang="en-US" sz="1600" b="1" dirty="0" err="1" smtClean="0">
+                <a:latin typeface="Palatino Linotype" panose="02040502050505030304" pitchFamily="18" charset="0"/>
+              </a:rPr>
+              <a:t>trainingFile</a:t>
+            </a:r>
+            <a:r>
+              <a:rPr lang="en-US" sz="1600" b="1" dirty="0" smtClean="0">
+                <a:latin typeface="Palatino Linotype" panose="02040502050505030304" pitchFamily="18" charset="0"/>
+              </a:rPr>
+              <a:t> &lt;/name&gt;</a:t>
+            </a:r>
+          </a:p>
+          <a:p>
+            <a:pPr marL="0" indent="0">
+              <a:buNone/>
+              <a:tabLst>
+                <a:tab pos="461963" algn="l"/>
+              </a:tabLst>
+            </a:pPr>
+            <a:r>
+              <a:rPr lang="en-US" sz="1600" b="1" dirty="0" smtClean="0">
+                <a:latin typeface="Palatino Linotype" panose="02040502050505030304" pitchFamily="18" charset="0"/>
+              </a:rPr>
+              <a:t>	&lt;value&gt; ${</a:t>
+            </a:r>
+            <a:r>
+              <a:rPr lang="en-US" sz="1600" b="1" dirty="0" err="1" smtClean="0">
+                <a:latin typeface="Palatino Linotype" panose="02040502050505030304" pitchFamily="18" charset="0"/>
+              </a:rPr>
+              <a:t>trainingSetFile</a:t>
+            </a:r>
+            <a:r>
+              <a:rPr lang="en-US" sz="1600" b="1" dirty="0" smtClean="0">
+                <a:latin typeface="Palatino Linotype" panose="02040502050505030304" pitchFamily="18" charset="0"/>
+              </a:rPr>
+              <a:t>} &lt;/value&gt;</a:t>
+            </a:r>
+          </a:p>
+          <a:p>
+            <a:pPr marL="0" indent="0">
+              <a:buNone/>
+              <a:tabLst>
+                <a:tab pos="461963" algn="l"/>
+              </a:tabLst>
+            </a:pPr>
+            <a:r>
+              <a:rPr lang="en-US" sz="1600" b="1" dirty="0" smtClean="0">
+                <a:latin typeface="Palatino Linotype" panose="02040502050505030304" pitchFamily="18" charset="0"/>
+              </a:rPr>
+              <a:t>&lt;/property&gt;</a:t>
+            </a:r>
+          </a:p>
+          <a:p>
+            <a:pPr marL="0" indent="0">
+              <a:buNone/>
+              <a:tabLst>
+                <a:tab pos="461963" algn="l"/>
+              </a:tabLst>
+            </a:pPr>
+            <a:endParaRPr lang="en-US" sz="1600" b="1" dirty="0" smtClean="0">
+              <a:latin typeface="Palatino Linotype" panose="02040502050505030304" pitchFamily="18" charset="0"/>
             </a:endParaRPr>
           </a:p>
           <a:p>
-            <a:pPr lvl="1">
-              <a:lnSpc>
-                <a:spcPct val="110000"/>
-              </a:lnSpc>
-            </a:pPr>
-            <a:r>
-              <a:rPr lang="en-US" dirty="0" smtClean="0">
-                <a:latin typeface="+mj-lt"/>
-              </a:rPr>
-              <a:t>Consider getting experience with standard HDFS environments as many employers may not run </a:t>
-            </a:r>
-            <a:r>
-              <a:rPr lang="en-US" dirty="0" err="1" smtClean="0">
-                <a:latin typeface="+mj-lt"/>
-              </a:rPr>
-              <a:t>MapR</a:t>
-            </a:r>
-            <a:r>
-              <a:rPr lang="en-US" dirty="0" smtClean="0">
-                <a:latin typeface="+mj-lt"/>
-              </a:rPr>
-              <a:t>-FS, and you probably do not realize what you take for granted.</a:t>
-            </a:r>
+            <a:pPr marL="0" indent="0">
+              <a:buNone/>
+              <a:tabLst>
+                <a:tab pos="461963" algn="l"/>
+              </a:tabLst>
+            </a:pPr>
+            <a:r>
+              <a:rPr lang="en-US" sz="1600" b="1" dirty="0" smtClean="0">
+                <a:latin typeface="Palatino Linotype" panose="02040502050505030304" pitchFamily="18" charset="0"/>
+              </a:rPr>
+              <a:t>&lt;property&gt;</a:t>
+            </a:r>
+          </a:p>
+          <a:p>
+            <a:pPr marL="0" indent="0">
+              <a:buNone/>
+              <a:tabLst>
+                <a:tab pos="461963" algn="l"/>
+              </a:tabLst>
+            </a:pPr>
+            <a:r>
+              <a:rPr lang="en-US" sz="1600" b="1" dirty="0" smtClean="0">
+                <a:latin typeface="Palatino Linotype" panose="02040502050505030304" pitchFamily="18" charset="0"/>
+              </a:rPr>
+              <a:t>	&lt;name&gt; </a:t>
+            </a:r>
+            <a:r>
+              <a:rPr lang="en-US" sz="1600" b="1" dirty="0" err="1" smtClean="0">
+                <a:latin typeface="Palatino Linotype" panose="02040502050505030304" pitchFamily="18" charset="0"/>
+              </a:rPr>
+              <a:t>NaiveBayesModel</a:t>
+            </a:r>
+            <a:r>
+              <a:rPr lang="en-US" sz="1600" b="1" dirty="0" smtClean="0">
+                <a:latin typeface="Palatino Linotype" panose="02040502050505030304" pitchFamily="18" charset="0"/>
+              </a:rPr>
+              <a:t> &lt;/name&gt;</a:t>
+            </a:r>
+          </a:p>
+          <a:p>
+            <a:pPr marL="0" indent="0">
+              <a:buNone/>
+              <a:tabLst>
+                <a:tab pos="461963" algn="l"/>
+              </a:tabLst>
+            </a:pPr>
+            <a:r>
+              <a:rPr lang="en-US" sz="1600" b="1" dirty="0" smtClean="0">
+                <a:latin typeface="Palatino Linotype" panose="02040502050505030304" pitchFamily="18" charset="0"/>
+              </a:rPr>
+              <a:t>	&lt;value&gt; </a:t>
+            </a:r>
+            <a:r>
+              <a:rPr lang="en-US" sz="1600" b="1" dirty="0" err="1" smtClean="0">
+                <a:latin typeface="Palatino Linotype" panose="02040502050505030304" pitchFamily="18" charset="0"/>
+              </a:rPr>
+              <a:t>bernoulli</a:t>
+            </a:r>
+            <a:r>
+              <a:rPr lang="en-US" sz="1600" b="1" dirty="0" smtClean="0">
+                <a:latin typeface="Palatino Linotype" panose="02040502050505030304" pitchFamily="18" charset="0"/>
+              </a:rPr>
+              <a:t> &lt;/value&gt;</a:t>
+            </a:r>
+          </a:p>
+          <a:p>
+            <a:pPr marL="0" indent="0">
+              <a:buNone/>
+              <a:tabLst>
+                <a:tab pos="461963" algn="l"/>
+              </a:tabLst>
+            </a:pPr>
+            <a:r>
+              <a:rPr lang="en-US" sz="1600" b="1" dirty="0" smtClean="0">
+                <a:latin typeface="Palatino Linotype" panose="02040502050505030304" pitchFamily="18" charset="0"/>
+              </a:rPr>
+              <a:t>&lt;/property&gt;</a:t>
+            </a:r>
+            <a:endParaRPr lang="en-US" sz="1600" b="1" dirty="0">
+              <a:latin typeface="Palatino Linotype" panose="02040502050505030304" pitchFamily="18" charset="0"/>
+            </a:endParaRPr>
           </a:p>
         </p:txBody>
       </p:sp>
@@ -4341,14 +4578,68 @@
               </a:pPr>
               <a:t>14</a:t>
             </a:fld>
-            <a:endParaRPr lang="en-US"/>
+            <a:endParaRPr lang="en-US" dirty="0"/>
+          </a:p>
+        </p:txBody>
+      </p:sp>
+      <p:sp>
+        <p:nvSpPr>
+          <p:cNvPr id="6" name="TextBox 5"/>
+          <p:cNvSpPr txBox="1"/>
+          <p:nvPr/>
+        </p:nvSpPr>
+        <p:spPr>
+          <a:xfrm>
+            <a:off x="4986845" y="4881465"/>
+            <a:ext cx="4025180" cy="584775"/>
+          </a:xfrm>
+          <a:prstGeom prst="rect">
+            <a:avLst/>
+          </a:prstGeom>
+          <a:noFill/>
+        </p:spPr>
+        <p:txBody>
+          <a:bodyPr wrap="square" rtlCol="0">
+            <a:spAutoFit/>
+          </a:bodyPr>
+          <a:lstStyle/>
+          <a:p>
+            <a:pPr algn="ctr"/>
+            <a:r>
+              <a:rPr lang="en-US" sz="1600" b="0" dirty="0" smtClean="0"/>
+              <a:t>Custom MapReduce Configuration</a:t>
+            </a:r>
+          </a:p>
+          <a:p>
+            <a:pPr algn="ctr"/>
+            <a:r>
+              <a:rPr lang="en-US" sz="1600" b="0" dirty="0" smtClean="0"/>
+              <a:t>from our </a:t>
+            </a:r>
+            <a:r>
+              <a:rPr lang="en-US" sz="1600" dirty="0" err="1" smtClean="0">
+                <a:solidFill>
+                  <a:srgbClr val="008000"/>
+                </a:solidFill>
+              </a:rPr>
+              <a:t>Oozie</a:t>
+            </a:r>
+            <a:r>
+              <a:rPr lang="en-US" sz="1600" dirty="0" smtClean="0">
+                <a:solidFill>
+                  <a:srgbClr val="008000"/>
+                </a:solidFill>
+              </a:rPr>
+              <a:t> XML Workflow</a:t>
+            </a:r>
+            <a:endParaRPr lang="en-US" sz="1600" b="0" dirty="0"/>
           </a:p>
         </p:txBody>
       </p:sp>
     </p:spTree>
     <p:extLst>
       <p:ext uri="{BB962C8B-B14F-4D97-AF65-F5344CB8AC3E}">
-        <p14:creationId xmlns:p14="http://schemas.microsoft.com/office/powerpoint/2010/main" val="817658699"/>
+        <p14:creationId xmlns:p14="http://schemas.microsoft.com/office/powerpoint/2010/main" val="382780341"/>
       </p:ext>
     </p:extLst>
   </p:cSld>
@@ -4403,444 +4694,412 @@
         <p:spPr/>
         <p:txBody>
           <a:bodyPr>
-            <a:noAutofit/>
+            <a:normAutofit fontScale="90000"/>
           </a:bodyPr>
           <a:lstStyle/>
           <a:p>
-            <a:pPr>
-              <a:defRPr/>
-            </a:pPr>
-            <a:r>
-              <a:rPr lang="en-US" sz="2800" dirty="0" smtClean="0">
-                <a:latin typeface="+mj-lt"/>
-              </a:rPr>
-              <a:t>Fall-In Love with Custom </a:t>
-            </a:r>
-            <a:br>
-              <a:rPr lang="en-US" sz="2800" dirty="0" smtClean="0">
-                <a:latin typeface="+mj-lt"/>
-              </a:rPr>
-            </a:br>
-            <a:r>
-              <a:rPr lang="en-US" sz="2800" dirty="0" smtClean="0">
-                <a:latin typeface="+mj-lt"/>
-              </a:rPr>
-              <a:t>MapReduce Configurations</a:t>
-            </a:r>
-            <a:endParaRPr lang="en-US" sz="2800" dirty="0">
-              <a:latin typeface="+mj-lt"/>
-            </a:endParaRPr>
-          </a:p>
-        </p:txBody>
-      </p:sp>
-      <p:sp>
-        <p:nvSpPr>
-          <p:cNvPr id="10242" name="Content Placeholder 2"/>
-          <p:cNvSpPr>
-            <a:spLocks noGrp="1"/>
-          </p:cNvSpPr>
-          <p:nvPr>
-            <p:ph sz="half" idx="1"/>
-          </p:nvPr>
-        </p:nvSpPr>
-        <p:spPr>
-          <a:xfrm>
-            <a:off x="73890" y="1081373"/>
-            <a:ext cx="4608945" cy="5135562"/>
-          </a:xfrm>
-          <a:noFill/>
-        </p:spPr>
-        <p:txBody>
-          <a:bodyPr>
-            <a:normAutofit fontScale="70000" lnSpcReduction="20000"/>
-          </a:bodyPr>
-          <a:lstStyle/>
-          <a:p>
-            <a:pPr>
-              <a:lnSpc>
-                <a:spcPct val="120000"/>
-              </a:lnSpc>
-            </a:pPr>
             <a:r>
               <a:rPr lang="en-US" dirty="0" smtClean="0">
                 <a:latin typeface="+mj-lt"/>
               </a:rPr>
-              <a:t>In our class lab exercises, we did not have to use custom MapReduce configurations.</a:t>
-            </a:r>
-          </a:p>
-          <a:p>
-            <a:pPr>
-              <a:lnSpc>
-                <a:spcPct val="120000"/>
-              </a:lnSpc>
-            </a:pPr>
+              <a:t>List of References</a:t>
+            </a:r>
             <a:endParaRPr lang="en-US" dirty="0">
               <a:latin typeface="+mj-lt"/>
             </a:endParaRPr>
           </a:p>
-          <a:p>
-            <a:pPr>
-              <a:lnSpc>
-                <a:spcPct val="120000"/>
-              </a:lnSpc>
-            </a:pPr>
-            <a:r>
-              <a:rPr lang="en-US" dirty="0" smtClean="0">
-                <a:latin typeface="+mj-lt"/>
-              </a:rPr>
-              <a:t>Custom MapReduce configurations are very powerful.  Specific uses of them in our project include:</a:t>
-            </a:r>
-          </a:p>
-          <a:p>
-            <a:pPr lvl="1">
-              <a:lnSpc>
-                <a:spcPct val="120000"/>
-              </a:lnSpc>
-            </a:pPr>
-            <a:r>
-              <a:rPr lang="en-US" dirty="0" smtClean="0">
-                <a:latin typeface="+mj-lt"/>
-              </a:rPr>
-              <a:t>Passing the training set file location</a:t>
-            </a:r>
-          </a:p>
-          <a:p>
-            <a:pPr lvl="1">
-              <a:lnSpc>
-                <a:spcPct val="120000"/>
-              </a:lnSpc>
-            </a:pPr>
-            <a:r>
-              <a:rPr lang="en-US" dirty="0" smtClean="0">
-                <a:latin typeface="+mj-lt"/>
-              </a:rPr>
-              <a:t>Strategy pattern selection of distance metric for KNN</a:t>
-            </a:r>
-          </a:p>
-          <a:p>
-            <a:pPr lvl="1">
-              <a:lnSpc>
-                <a:spcPct val="120000"/>
-              </a:lnSpc>
-            </a:pPr>
-            <a:endParaRPr lang="en-US" dirty="0">
+        </p:txBody>
+      </p:sp>
+      <p:sp>
+        <p:nvSpPr>
+          <p:cNvPr id="3" name="Content Placeholder 2"/>
+          <p:cNvSpPr>
+            <a:spLocks noGrp="1"/>
+          </p:cNvSpPr>
+          <p:nvPr>
+            <p:ph idx="1"/>
+          </p:nvPr>
+        </p:nvSpPr>
+        <p:spPr/>
+        <p:txBody>
+          <a:bodyPr>
+            <a:normAutofit fontScale="92500" lnSpcReduction="10000"/>
+          </a:bodyPr>
+          <a:lstStyle/>
+          <a:p>
+            <a:r>
+              <a:rPr lang="en-US" sz="1800" dirty="0" smtClean="0">
+                <a:latin typeface="+mj-lt"/>
+              </a:rPr>
+              <a:t>“</a:t>
+            </a:r>
+            <a:r>
+              <a:rPr lang="en-US" sz="1800" dirty="0">
+                <a:latin typeface="+mj-lt"/>
+              </a:rPr>
+              <a:t>What's Cooking?,”. [Online]. Available at: </a:t>
+            </a:r>
+            <a:r>
+              <a:rPr lang="en-US" sz="1800" u="sng" dirty="0">
+                <a:latin typeface="+mj-lt"/>
+                <a:hlinkClick r:id="rId2"/>
+              </a:rPr>
+              <a:t>https://www.kaggle.com/c/whats-cooking</a:t>
+            </a:r>
+            <a:r>
+              <a:rPr lang="en-US" sz="1800" dirty="0">
+                <a:latin typeface="+mj-lt"/>
+              </a:rPr>
+              <a:t>. [Accessed: </a:t>
+            </a:r>
+            <a:r>
+              <a:rPr lang="en-US" sz="1800" dirty="0" smtClean="0">
+                <a:latin typeface="+mj-lt"/>
+              </a:rPr>
+              <a:t>2015].</a:t>
+            </a:r>
+          </a:p>
+          <a:p>
+            <a:endParaRPr lang="en-US" sz="1800" dirty="0">
               <a:latin typeface="+mj-lt"/>
             </a:endParaRPr>
           </a:p>
           <a:p>
-            <a:pPr>
-              <a:lnSpc>
-                <a:spcPct val="120000"/>
-              </a:lnSpc>
-            </a:pPr>
-            <a:r>
-              <a:rPr lang="en-US" b="1" dirty="0" smtClean="0">
-                <a:solidFill>
-                  <a:srgbClr val="008000"/>
-                </a:solidFill>
-                <a:latin typeface="+mj-lt"/>
-              </a:rPr>
-              <a:t>Takeaway: </a:t>
-            </a:r>
-            <a:r>
-              <a:rPr lang="en-US" dirty="0" smtClean="0">
-                <a:latin typeface="+mj-lt"/>
-              </a:rPr>
-              <a:t>Custom configurations can streamline implementation schemes and enable significant flexibility.</a:t>
-            </a:r>
-          </a:p>
-        </p:txBody>
-      </p:sp>
-      <p:sp>
-        <p:nvSpPr>
-          <p:cNvPr id="5" name="Content Placeholder 4"/>
+            <a:r>
+              <a:rPr lang="en-US" sz="1800" dirty="0">
+                <a:latin typeface="+mj-lt"/>
+              </a:rPr>
+              <a:t>“</a:t>
+            </a:r>
+            <a:r>
+              <a:rPr lang="en-US" sz="1800" dirty="0" err="1">
+                <a:latin typeface="+mj-lt"/>
+              </a:rPr>
+              <a:t>Jaccard</a:t>
+            </a:r>
+            <a:r>
+              <a:rPr lang="en-US" sz="1800" dirty="0">
+                <a:latin typeface="+mj-lt"/>
+              </a:rPr>
+              <a:t> index,” </a:t>
+            </a:r>
+            <a:r>
+              <a:rPr lang="en-US" sz="1800" i="1" dirty="0">
+                <a:latin typeface="+mj-lt"/>
+              </a:rPr>
+              <a:t>Wikipedia</a:t>
+            </a:r>
+            <a:r>
+              <a:rPr lang="en-US" sz="1800" dirty="0">
+                <a:latin typeface="+mj-lt"/>
+              </a:rPr>
+              <a:t>. [Online]. Available at: </a:t>
+            </a:r>
+            <a:r>
+              <a:rPr lang="en-US" sz="1800" dirty="0">
+                <a:latin typeface="+mj-lt"/>
+                <a:hlinkClick r:id="rId3"/>
+              </a:rPr>
+              <a:t>https://en.wikipedia.org/wiki/jaccard_index</a:t>
+            </a:r>
+            <a:r>
+              <a:rPr lang="en-US" sz="1800" dirty="0">
+                <a:latin typeface="+mj-lt"/>
+              </a:rPr>
+              <a:t>. [Accessed: </a:t>
+            </a:r>
+            <a:r>
+              <a:rPr lang="en-US" sz="1800" dirty="0" smtClean="0">
+                <a:latin typeface="+mj-lt"/>
+              </a:rPr>
+              <a:t>2015].</a:t>
+            </a:r>
+          </a:p>
+          <a:p>
+            <a:endParaRPr lang="en-US" sz="1800" dirty="0">
+              <a:latin typeface="+mj-lt"/>
+            </a:endParaRPr>
+          </a:p>
+          <a:p>
+            <a:r>
+              <a:rPr lang="en-US" sz="1800" dirty="0">
+                <a:latin typeface="+mj-lt"/>
+              </a:rPr>
+              <a:t>P. Tan and M. Steinbach, </a:t>
+            </a:r>
+            <a:r>
+              <a:rPr lang="en-US" sz="1800" i="1" dirty="0">
+                <a:latin typeface="+mj-lt"/>
+              </a:rPr>
+              <a:t>Introduction to </a:t>
+            </a:r>
+            <a:r>
+              <a:rPr lang="en-US" sz="1800" i="1" dirty="0" smtClean="0">
+                <a:latin typeface="+mj-lt"/>
+              </a:rPr>
+              <a:t>Data Mining</a:t>
+            </a:r>
+            <a:r>
+              <a:rPr lang="en-US" sz="1800" dirty="0">
+                <a:latin typeface="+mj-lt"/>
+              </a:rPr>
+              <a:t>. Boston: Pearson Addison Wesley, 2005</a:t>
+            </a:r>
+            <a:r>
+              <a:rPr lang="en-US" sz="1800" dirty="0" smtClean="0">
+                <a:latin typeface="+mj-lt"/>
+              </a:rPr>
+              <a:t>.</a:t>
+            </a:r>
+          </a:p>
+          <a:p>
+            <a:endParaRPr lang="en-US" sz="1800" dirty="0">
+              <a:latin typeface="+mj-lt"/>
+            </a:endParaRPr>
+          </a:p>
+          <a:p>
+            <a:r>
+              <a:rPr lang="en-US" sz="1800" dirty="0">
+                <a:latin typeface="+mj-lt"/>
+              </a:rPr>
+              <a:t>“google-</a:t>
+            </a:r>
+            <a:r>
+              <a:rPr lang="en-US" sz="1800" dirty="0" err="1">
+                <a:latin typeface="+mj-lt"/>
+              </a:rPr>
+              <a:t>gson</a:t>
+            </a:r>
+            <a:r>
+              <a:rPr lang="en-US" sz="1800" dirty="0">
+                <a:latin typeface="+mj-lt"/>
+              </a:rPr>
+              <a:t>,” </a:t>
+            </a:r>
+            <a:r>
+              <a:rPr lang="en-US" sz="1800" i="1" dirty="0">
+                <a:latin typeface="+mj-lt"/>
+              </a:rPr>
+              <a:t>GitHub</a:t>
+            </a:r>
+            <a:r>
+              <a:rPr lang="en-US" sz="1800" dirty="0">
+                <a:latin typeface="+mj-lt"/>
+              </a:rPr>
+              <a:t>. [Online]. Available at: </a:t>
+            </a:r>
+            <a:r>
+              <a:rPr lang="en-US" sz="1800" dirty="0">
+                <a:latin typeface="+mj-lt"/>
+                <a:hlinkClick r:id="rId4"/>
+              </a:rPr>
+              <a:t>https://</a:t>
+            </a:r>
+            <a:r>
+              <a:rPr lang="en-US" sz="1800" dirty="0" smtClean="0">
+                <a:latin typeface="+mj-lt"/>
+                <a:hlinkClick r:id="rId4"/>
+              </a:rPr>
+              <a:t>github.com/google/gson</a:t>
+            </a:r>
+            <a:r>
+              <a:rPr lang="en-US" sz="1800" dirty="0" smtClean="0">
+                <a:latin typeface="+mj-lt"/>
+              </a:rPr>
+              <a:t>. </a:t>
+            </a:r>
+            <a:r>
+              <a:rPr lang="en-US" sz="1800" dirty="0">
+                <a:latin typeface="+mj-lt"/>
+              </a:rPr>
+              <a:t>[Accessed: 2015</a:t>
+            </a:r>
+            <a:r>
+              <a:rPr lang="en-US" sz="1800" dirty="0" smtClean="0">
+                <a:latin typeface="+mj-lt"/>
+              </a:rPr>
+              <a:t>].</a:t>
+            </a:r>
+          </a:p>
+          <a:p>
+            <a:endParaRPr lang="en-US" sz="1800" dirty="0">
+              <a:latin typeface="+mj-lt"/>
+            </a:endParaRPr>
+          </a:p>
+          <a:p>
+            <a:r>
+              <a:rPr lang="en-US" sz="1800" dirty="0">
+                <a:latin typeface="+mj-lt"/>
+              </a:rPr>
+              <a:t>W. </a:t>
+            </a:r>
+            <a:r>
+              <a:rPr lang="en-US" sz="1800" dirty="0" err="1">
+                <a:latin typeface="+mj-lt"/>
+              </a:rPr>
+              <a:t>Ochandarena</a:t>
+            </a:r>
+            <a:r>
+              <a:rPr lang="en-US" sz="1800" dirty="0">
+                <a:latin typeface="+mj-lt"/>
+              </a:rPr>
+              <a:t>, “Spinning Up a Hadoop Cluster in the Cloud | </a:t>
+            </a:r>
+            <a:r>
+              <a:rPr lang="en-US" sz="1800" dirty="0" err="1">
+                <a:latin typeface="+mj-lt"/>
+              </a:rPr>
+              <a:t>MapR</a:t>
+            </a:r>
+            <a:r>
+              <a:rPr lang="en-US" sz="1800" dirty="0" smtClean="0">
+                <a:latin typeface="+mj-lt"/>
+              </a:rPr>
+              <a:t>,” </a:t>
+            </a:r>
+            <a:r>
+              <a:rPr lang="en-US" sz="1800" i="1" dirty="0" err="1" smtClean="0">
+                <a:latin typeface="+mj-lt"/>
+              </a:rPr>
+              <a:t>MapR</a:t>
+            </a:r>
+            <a:r>
+              <a:rPr lang="en-US" sz="1800" i="1" dirty="0" smtClean="0">
+                <a:latin typeface="+mj-lt"/>
+              </a:rPr>
+              <a:t> </a:t>
+            </a:r>
+            <a:r>
+              <a:rPr lang="en-US" sz="1800" i="1" dirty="0">
+                <a:latin typeface="+mj-lt"/>
+              </a:rPr>
+              <a:t>Blog</a:t>
+            </a:r>
+            <a:r>
+              <a:rPr lang="en-US" sz="1800" dirty="0">
+                <a:latin typeface="+mj-lt"/>
+              </a:rPr>
+              <a:t>. [Online]. Available at: </a:t>
+            </a:r>
+            <a:r>
+              <a:rPr lang="en-US" sz="1800" dirty="0">
+                <a:latin typeface="+mj-lt"/>
+                <a:hlinkClick r:id="rId5"/>
+              </a:rPr>
+              <a:t>https://</a:t>
+            </a:r>
+            <a:r>
+              <a:rPr lang="en-US" sz="1800" dirty="0" smtClean="0">
+                <a:latin typeface="+mj-lt"/>
+                <a:hlinkClick r:id="rId5"/>
+              </a:rPr>
+              <a:t>www.mapr.com/blog/spinning-hadoop-cluster-cloud</a:t>
+            </a:r>
+            <a:r>
+              <a:rPr lang="en-US" sz="1800" dirty="0" smtClean="0">
+                <a:latin typeface="+mj-lt"/>
+              </a:rPr>
+              <a:t>. </a:t>
+            </a:r>
+            <a:r>
+              <a:rPr lang="en-US" sz="1800" dirty="0">
+                <a:latin typeface="+mj-lt"/>
+              </a:rPr>
+              <a:t>[Accessed: 2015</a:t>
+            </a:r>
+            <a:r>
+              <a:rPr lang="en-US" sz="1800" dirty="0" smtClean="0">
+                <a:latin typeface="+mj-lt"/>
+              </a:rPr>
+              <a:t>].</a:t>
+            </a:r>
+          </a:p>
+          <a:p>
+            <a:endParaRPr lang="en-US" sz="1800" dirty="0">
+              <a:latin typeface="+mj-lt"/>
+            </a:endParaRPr>
+          </a:p>
+          <a:p>
+            <a:r>
+              <a:rPr lang="en-US" sz="1800" dirty="0">
+                <a:latin typeface="+mj-lt"/>
+              </a:rPr>
+              <a:t>“Maven in 5 Minutes,” </a:t>
+            </a:r>
+            <a:r>
+              <a:rPr lang="en-US" sz="1800" i="1" dirty="0">
+                <a:latin typeface="+mj-lt"/>
+              </a:rPr>
+              <a:t>Apache Maven Project</a:t>
+            </a:r>
+            <a:r>
+              <a:rPr lang="en-US" sz="1800" dirty="0">
+                <a:latin typeface="+mj-lt"/>
+              </a:rPr>
+              <a:t>. [Online]. Available at: </a:t>
+            </a:r>
+            <a:r>
+              <a:rPr lang="en-US" sz="1800" dirty="0">
+                <a:latin typeface="+mj-lt"/>
+                <a:hlinkClick r:id="rId6"/>
+              </a:rPr>
+              <a:t>https://</a:t>
+            </a:r>
+            <a:r>
+              <a:rPr lang="en-US" sz="1800" dirty="0" smtClean="0">
+                <a:latin typeface="+mj-lt"/>
+                <a:hlinkClick r:id="rId6"/>
+              </a:rPr>
+              <a:t>maven.apache.org/guides/getting-started/maven-in-five-minutes.html</a:t>
+            </a:r>
+            <a:r>
+              <a:rPr lang="en-US" sz="1800" dirty="0" smtClean="0">
+                <a:latin typeface="+mj-lt"/>
+              </a:rPr>
+              <a:t>. </a:t>
+            </a:r>
+            <a:r>
+              <a:rPr lang="en-US" sz="1800" dirty="0">
+                <a:latin typeface="+mj-lt"/>
+              </a:rPr>
+              <a:t>[Accessed: 2015].</a:t>
+            </a:r>
+          </a:p>
+        </p:txBody>
+      </p:sp>
+      <p:sp>
+        <p:nvSpPr>
+          <p:cNvPr id="4" name="Slide Number Placeholder 3"/>
           <p:cNvSpPr>
             <a:spLocks noGrp="1"/>
           </p:cNvSpPr>
           <p:nvPr>
-            <p:ph sz="half" idx="2"/>
-          </p:nvPr>
-        </p:nvSpPr>
-        <p:spPr>
-          <a:xfrm>
-            <a:off x="4999183" y="1857230"/>
-            <a:ext cx="4038600" cy="2807132"/>
-          </a:xfrm>
-          <a:solidFill>
-            <a:schemeClr val="bg1"/>
-          </a:solidFill>
-          <a:ln w="25400">
-            <a:solidFill>
-              <a:srgbClr val="008000"/>
-            </a:solidFill>
-          </a:ln>
-        </p:spPr>
+            <p:ph type="sldNum" sz="quarter" idx="11"/>
+          </p:nvPr>
+        </p:nvSpPr>
+        <p:spPr/>
         <p:txBody>
           <a:bodyPr/>
           <a:lstStyle/>
           <a:p>
-            <a:pPr marL="0" indent="0">
-              <a:buNone/>
-              <a:tabLst>
-                <a:tab pos="461963" algn="l"/>
-              </a:tabLst>
-            </a:pPr>
-            <a:r>
-              <a:rPr lang="en-US" sz="1600" b="1" dirty="0" smtClean="0">
-                <a:latin typeface="Palatino Linotype" panose="02040502050505030304" pitchFamily="18" charset="0"/>
-              </a:rPr>
-              <a:t>&lt;property&gt;</a:t>
-            </a:r>
-          </a:p>
-          <a:p>
-            <a:pPr marL="0" indent="0">
-              <a:buNone/>
-              <a:tabLst>
-                <a:tab pos="461963" algn="l"/>
-              </a:tabLst>
-            </a:pPr>
-            <a:r>
-              <a:rPr lang="en-US" sz="1600" b="1" dirty="0" smtClean="0">
-                <a:latin typeface="Palatino Linotype" panose="02040502050505030304" pitchFamily="18" charset="0"/>
-              </a:rPr>
-              <a:t>	&lt;name&gt; </a:t>
-            </a:r>
-            <a:r>
-              <a:rPr lang="en-US" sz="1600" b="1" dirty="0" err="1" smtClean="0">
-                <a:latin typeface="Palatino Linotype" panose="02040502050505030304" pitchFamily="18" charset="0"/>
-              </a:rPr>
-              <a:t>trainingFile</a:t>
-            </a:r>
-            <a:r>
-              <a:rPr lang="en-US" sz="1600" b="1" dirty="0" smtClean="0">
-                <a:latin typeface="Palatino Linotype" panose="02040502050505030304" pitchFamily="18" charset="0"/>
-              </a:rPr>
-              <a:t> &lt;/name&gt;</a:t>
-            </a:r>
-          </a:p>
-          <a:p>
-            <a:pPr marL="0" indent="0">
-              <a:buNone/>
-              <a:tabLst>
-                <a:tab pos="461963" algn="l"/>
-              </a:tabLst>
-            </a:pPr>
-            <a:r>
-              <a:rPr lang="en-US" sz="1600" b="1" dirty="0" smtClean="0">
-                <a:latin typeface="Palatino Linotype" panose="02040502050505030304" pitchFamily="18" charset="0"/>
-              </a:rPr>
-              <a:t>	&lt;value&gt; ${</a:t>
-            </a:r>
-            <a:r>
-              <a:rPr lang="en-US" sz="1600" b="1" dirty="0" err="1" smtClean="0">
-                <a:latin typeface="Palatino Linotype" panose="02040502050505030304" pitchFamily="18" charset="0"/>
-              </a:rPr>
-              <a:t>trainingSetFile</a:t>
-            </a:r>
-            <a:r>
-              <a:rPr lang="en-US" sz="1600" b="1" dirty="0" smtClean="0">
-                <a:latin typeface="Palatino Linotype" panose="02040502050505030304" pitchFamily="18" charset="0"/>
-              </a:rPr>
-              <a:t>} &lt;/value&gt;</a:t>
-            </a:r>
-          </a:p>
-          <a:p>
-            <a:pPr marL="0" indent="0">
-              <a:buNone/>
-              <a:tabLst>
-                <a:tab pos="461963" algn="l"/>
-              </a:tabLst>
-            </a:pPr>
-            <a:r>
-              <a:rPr lang="en-US" sz="1600" b="1" dirty="0" smtClean="0">
-                <a:latin typeface="Palatino Linotype" panose="02040502050505030304" pitchFamily="18" charset="0"/>
-              </a:rPr>
-              <a:t>&lt;/property&gt;</a:t>
-            </a:r>
-          </a:p>
-          <a:p>
-            <a:pPr marL="0" indent="0">
-              <a:buNone/>
-              <a:tabLst>
-                <a:tab pos="461963" algn="l"/>
-              </a:tabLst>
-            </a:pPr>
-            <a:endParaRPr lang="en-US" sz="1600" b="1" dirty="0" smtClean="0">
-              <a:latin typeface="Palatino Linotype" panose="02040502050505030304" pitchFamily="18" charset="0"/>
-            </a:endParaRPr>
-          </a:p>
-          <a:p>
-            <a:pPr marL="0" indent="0">
-              <a:buNone/>
-              <a:tabLst>
-                <a:tab pos="461963" algn="l"/>
-              </a:tabLst>
-            </a:pPr>
-            <a:r>
-              <a:rPr lang="en-US" sz="1600" b="1" dirty="0" smtClean="0">
-                <a:latin typeface="Palatino Linotype" panose="02040502050505030304" pitchFamily="18" charset="0"/>
-              </a:rPr>
-              <a:t>&lt;property&gt;</a:t>
-            </a:r>
-          </a:p>
-          <a:p>
-            <a:pPr marL="0" indent="0">
-              <a:buNone/>
-              <a:tabLst>
-                <a:tab pos="461963" algn="l"/>
-              </a:tabLst>
-            </a:pPr>
-            <a:r>
-              <a:rPr lang="en-US" sz="1600" b="1" dirty="0" smtClean="0">
-                <a:latin typeface="Palatino Linotype" panose="02040502050505030304" pitchFamily="18" charset="0"/>
-              </a:rPr>
-              <a:t>	&lt;name&gt; </a:t>
-            </a:r>
-            <a:r>
-              <a:rPr lang="en-US" sz="1600" b="1" dirty="0" err="1" smtClean="0">
-                <a:latin typeface="Palatino Linotype" panose="02040502050505030304" pitchFamily="18" charset="0"/>
-              </a:rPr>
-              <a:t>NaiveBayesModel</a:t>
-            </a:r>
-            <a:r>
-              <a:rPr lang="en-US" sz="1600" b="1" dirty="0" smtClean="0">
-                <a:latin typeface="Palatino Linotype" panose="02040502050505030304" pitchFamily="18" charset="0"/>
-              </a:rPr>
-              <a:t> &lt;/name&gt;</a:t>
-            </a:r>
-          </a:p>
-          <a:p>
-            <a:pPr marL="0" indent="0">
-              <a:buNone/>
-              <a:tabLst>
-                <a:tab pos="461963" algn="l"/>
-              </a:tabLst>
-            </a:pPr>
-            <a:r>
-              <a:rPr lang="en-US" sz="1600" b="1" dirty="0" smtClean="0">
-                <a:latin typeface="Palatino Linotype" panose="02040502050505030304" pitchFamily="18" charset="0"/>
-              </a:rPr>
-              <a:t>	&lt;value&gt; </a:t>
-            </a:r>
-            <a:r>
-              <a:rPr lang="en-US" sz="1600" b="1" dirty="0" err="1" smtClean="0">
-                <a:latin typeface="Palatino Linotype" panose="02040502050505030304" pitchFamily="18" charset="0"/>
-              </a:rPr>
-              <a:t>bernoulli</a:t>
-            </a:r>
-            <a:r>
-              <a:rPr lang="en-US" sz="1600" b="1" dirty="0" smtClean="0">
-                <a:latin typeface="Palatino Linotype" panose="02040502050505030304" pitchFamily="18" charset="0"/>
-              </a:rPr>
-              <a:t> &lt;/value&gt;</a:t>
-            </a:r>
-          </a:p>
-          <a:p>
-            <a:pPr marL="0" indent="0">
-              <a:buNone/>
-              <a:tabLst>
-                <a:tab pos="461963" algn="l"/>
-              </a:tabLst>
-            </a:pPr>
-            <a:r>
-              <a:rPr lang="en-US" sz="1600" b="1" dirty="0" smtClean="0">
-                <a:latin typeface="Palatino Linotype" panose="02040502050505030304" pitchFamily="18" charset="0"/>
-              </a:rPr>
-              <a:t>&lt;/property&gt;</a:t>
-            </a:r>
-            <a:endParaRPr lang="en-US" sz="1600" b="1" dirty="0">
-              <a:latin typeface="Palatino Linotype" panose="02040502050505030304" pitchFamily="18" charset="0"/>
-            </a:endParaRPr>
-          </a:p>
-        </p:txBody>
-      </p:sp>
-      <p:sp>
-        <p:nvSpPr>
-          <p:cNvPr id="4" name="Slide Number Placeholder 3"/>
-          <p:cNvSpPr>
-            <a:spLocks noGrp="1"/>
-          </p:cNvSpPr>
-          <p:nvPr>
-            <p:ph type="sldNum" sz="quarter" idx="11"/>
-          </p:nvPr>
-        </p:nvSpPr>
-        <p:spPr/>
-        <p:txBody>
-          <a:bodyPr/>
-          <a:lstStyle/>
-          <a:p>
             <a:pPr>
               <a:defRPr/>
             </a:pPr>
-            <a:fld id="{93CE8203-E40A-46AD-9381-6C8CB0064A1B}" type="slidenum">
+            <a:fld id="{57CAE338-3B6A-4037-90D8-94F2438351D8}" type="slidenum">
               <a:rPr lang="en-US" smtClean="0"/>
               <a:pPr>
                 <a:defRPr/>
               </a:pPr>
               <a:t>15</a:t>
             </a:fld>
-            <a:endParaRPr lang="en-US" dirty="0"/>
-          </a:p>
-        </p:txBody>
-      </p:sp>
-      <p:sp>
-        <p:nvSpPr>
-          <p:cNvPr id="6" name="TextBox 5"/>
-          <p:cNvSpPr txBox="1"/>
-          <p:nvPr/>
-        </p:nvSpPr>
-        <p:spPr>
-          <a:xfrm>
-            <a:off x="4986845" y="4881465"/>
-            <a:ext cx="4025180" cy="584775"/>
-          </a:xfrm>
-          <a:prstGeom prst="rect">
-            <a:avLst/>
-          </a:prstGeom>
-          <a:noFill/>
-        </p:spPr>
-        <p:txBody>
-          <a:bodyPr wrap="square" rtlCol="0">
-            <a:spAutoFit/>
-          </a:bodyPr>
-          <a:lstStyle/>
-          <a:p>
-            <a:pPr algn="ctr"/>
-            <a:r>
-              <a:rPr lang="en-US" sz="1600" b="0" dirty="0" smtClean="0"/>
-              <a:t>Custom MapReduce Configuration</a:t>
-            </a:r>
-          </a:p>
-          <a:p>
-            <a:pPr algn="ctr"/>
-            <a:r>
-              <a:rPr lang="en-US" sz="1600" b="0" dirty="0" smtClean="0"/>
-              <a:t>from our </a:t>
-            </a:r>
-            <a:r>
-              <a:rPr lang="en-US" sz="1600" dirty="0" err="1" smtClean="0">
-                <a:solidFill>
-                  <a:srgbClr val="008000"/>
-                </a:solidFill>
-              </a:rPr>
-              <a:t>Oozie</a:t>
-            </a:r>
-            <a:r>
-              <a:rPr lang="en-US" sz="1600" dirty="0" smtClean="0">
-                <a:solidFill>
-                  <a:srgbClr val="008000"/>
-                </a:solidFill>
-              </a:rPr>
-              <a:t> XML Workflow</a:t>
-            </a:r>
-            <a:endParaRPr lang="en-US" sz="1600" b="0" dirty="0"/>
+            <a:endParaRPr lang="en-US"/>
           </a:p>
         </p:txBody>
       </p:sp>
     </p:spTree>
     <p:extLst>
       <p:ext uri="{BB962C8B-B14F-4D97-AF65-F5344CB8AC3E}">
-        <p14:creationId xmlns:p14="http://schemas.microsoft.com/office/powerpoint/2010/main" val="382780341"/>
+        <p14:creationId xmlns:p14="http://schemas.microsoft.com/office/powerpoint/2010/main" val="1011437234"/>
       </p:ext>
     </p:extLst>
   </p:cSld>
@@ -4903,7 +5162,7 @@
               <a:rPr lang="en-US" dirty="0" smtClean="0">
                 <a:latin typeface="+mj-lt"/>
               </a:rPr>
-              <a:t>List of References</a:t>
+              <a:t>Updated Division of Responsibilities</a:t>
             </a:r>
             <a:endParaRPr lang="en-US" dirty="0">
               <a:latin typeface="+mj-lt"/>
@@ -4923,347 +5182,198 @@
         </p:nvSpPr>
         <p:spPr/>
         <p:txBody>
-          <a:bodyPr>
-            <a:normAutofit fontScale="92500" lnSpcReduction="10000"/>
-          </a:bodyPr>
+          <a:bodyPr/>
           <a:lstStyle/>
           <a:p>
             <a:r>
-              <a:rPr lang="en-US" sz="1800" dirty="0" smtClean="0">
-                <a:latin typeface="+mj-lt"/>
-              </a:rPr>
-              <a:t>“</a:t>
-            </a:r>
-            <a:r>
-              <a:rPr lang="en-US" sz="1800" dirty="0">
-                <a:latin typeface="+mj-lt"/>
-              </a:rPr>
-              <a:t>What's Cooking?,”. [Online]. Available at: </a:t>
-            </a:r>
-            <a:r>
-              <a:rPr lang="en-US" sz="1800" u="sng" dirty="0">
-                <a:latin typeface="+mj-lt"/>
-                <a:hlinkClick r:id="rId2"/>
-              </a:rPr>
-              <a:t>https://www.kaggle.com/c/whats-cooking</a:t>
-            </a:r>
-            <a:r>
-              <a:rPr lang="en-US" sz="1800" dirty="0">
-                <a:latin typeface="+mj-lt"/>
-              </a:rPr>
-              <a:t>. [Accessed: </a:t>
-            </a:r>
-            <a:r>
-              <a:rPr lang="en-US" sz="1800" dirty="0" smtClean="0">
-                <a:latin typeface="+mj-lt"/>
-              </a:rPr>
-              <a:t>2015].</a:t>
-            </a:r>
-          </a:p>
-          <a:p>
-            <a:endParaRPr lang="en-US" sz="1800" dirty="0">
+              <a:rPr lang="en-US" sz="2000" b="1" dirty="0">
+                <a:solidFill>
+                  <a:srgbClr val="008000"/>
+                </a:solidFill>
+                <a:latin typeface="+mj-lt"/>
+              </a:rPr>
+              <a:t>Preprocessor: </a:t>
+            </a:r>
+            <a:r>
+              <a:rPr lang="en-US" sz="2000" dirty="0" smtClean="0">
+                <a:latin typeface="+mj-lt"/>
+              </a:rPr>
+              <a:t>Zayd Hammoudeh</a:t>
+            </a:r>
+          </a:p>
+          <a:p>
+            <a:endParaRPr lang="en-US" sz="2000" b="1" dirty="0" smtClean="0">
+              <a:solidFill>
+                <a:srgbClr val="008000"/>
+              </a:solidFill>
               <a:latin typeface="+mj-lt"/>
             </a:endParaRPr>
           </a:p>
           <a:p>
             <a:r>
-              <a:rPr lang="en-US" sz="1800" dirty="0">
-                <a:latin typeface="+mj-lt"/>
-              </a:rPr>
-              <a:t>“</a:t>
-            </a:r>
-            <a:r>
-              <a:rPr lang="en-US" sz="1800" dirty="0" err="1">
-                <a:latin typeface="+mj-lt"/>
-              </a:rPr>
-              <a:t>Jaccard</a:t>
-            </a:r>
-            <a:r>
-              <a:rPr lang="en-US" sz="1800" dirty="0">
-                <a:latin typeface="+mj-lt"/>
-              </a:rPr>
-              <a:t> index,” </a:t>
-            </a:r>
-            <a:r>
-              <a:rPr lang="en-US" sz="1800" i="1" dirty="0">
-                <a:latin typeface="+mj-lt"/>
-              </a:rPr>
-              <a:t>Wikipedia</a:t>
-            </a:r>
-            <a:r>
-              <a:rPr lang="en-US" sz="1800" dirty="0">
-                <a:latin typeface="+mj-lt"/>
-              </a:rPr>
-              <a:t>. [Online]. Available at: </a:t>
-            </a:r>
-            <a:r>
-              <a:rPr lang="en-US" sz="1800" dirty="0">
-                <a:latin typeface="+mj-lt"/>
-                <a:hlinkClick r:id="rId3"/>
-              </a:rPr>
-              <a:t>https://en.wikipedia.org/wiki/jaccard_index</a:t>
-            </a:r>
-            <a:r>
-              <a:rPr lang="en-US" sz="1800" dirty="0">
-                <a:latin typeface="+mj-lt"/>
-              </a:rPr>
-              <a:t>. [Accessed: </a:t>
-            </a:r>
-            <a:r>
-              <a:rPr lang="en-US" sz="1800" dirty="0" smtClean="0">
-                <a:latin typeface="+mj-lt"/>
-              </a:rPr>
-              <a:t>2015].</a:t>
-            </a:r>
-          </a:p>
-          <a:p>
-            <a:endParaRPr lang="en-US" sz="1800" dirty="0">
+              <a:rPr lang="en-US" sz="2000" b="1" dirty="0" smtClean="0">
+                <a:solidFill>
+                  <a:srgbClr val="008000"/>
+                </a:solidFill>
+                <a:latin typeface="+mj-lt"/>
+              </a:rPr>
+              <a:t>Naïve </a:t>
+            </a:r>
+            <a:r>
+              <a:rPr lang="en-US" sz="2000" b="1" dirty="0">
+                <a:solidFill>
+                  <a:srgbClr val="008000"/>
+                </a:solidFill>
+                <a:latin typeface="+mj-lt"/>
+              </a:rPr>
+              <a:t>Bayes: </a:t>
+            </a:r>
+            <a:r>
+              <a:rPr lang="en-US" sz="2000" dirty="0" smtClean="0">
+                <a:latin typeface="+mj-lt"/>
+              </a:rPr>
+              <a:t>Shubhangi Rakhonde</a:t>
+            </a:r>
+          </a:p>
+          <a:p>
+            <a:r>
+              <a:rPr lang="en-US" sz="2000" b="1" dirty="0" smtClean="0">
+                <a:solidFill>
+                  <a:srgbClr val="008000"/>
+                </a:solidFill>
+                <a:latin typeface="+mj-lt"/>
+              </a:rPr>
+              <a:t>KNN: </a:t>
+            </a:r>
+            <a:r>
+              <a:rPr lang="en-US" sz="2000" dirty="0" smtClean="0">
+                <a:latin typeface="+mj-lt"/>
+              </a:rPr>
+              <a:t>Yashi Kamboj, Shubhangi Rakhonde</a:t>
+            </a:r>
+          </a:p>
+          <a:p>
+            <a:endParaRPr lang="en-US" sz="2000" b="1" dirty="0" smtClean="0">
+              <a:solidFill>
+                <a:srgbClr val="008000"/>
+              </a:solidFill>
               <a:latin typeface="+mj-lt"/>
             </a:endParaRPr>
           </a:p>
           <a:p>
             <a:r>
-              <a:rPr lang="en-US" sz="1800" dirty="0">
-                <a:latin typeface="+mj-lt"/>
-              </a:rPr>
-              <a:t>P. Tan and M. Steinbach, </a:t>
-            </a:r>
-            <a:r>
-              <a:rPr lang="en-US" sz="1800" i="1" dirty="0">
-                <a:latin typeface="+mj-lt"/>
-              </a:rPr>
-              <a:t>Introduction to </a:t>
-            </a:r>
-            <a:r>
-              <a:rPr lang="en-US" sz="1800" i="1" dirty="0" smtClean="0">
-                <a:latin typeface="+mj-lt"/>
-              </a:rPr>
-              <a:t>Data Mining</a:t>
-            </a:r>
-            <a:r>
-              <a:rPr lang="en-US" sz="1800" dirty="0">
-                <a:latin typeface="+mj-lt"/>
-              </a:rPr>
-              <a:t>. Boston: Pearson Addison Wesley, 2005</a:t>
-            </a:r>
-            <a:r>
-              <a:rPr lang="en-US" sz="1800" dirty="0" smtClean="0">
-                <a:latin typeface="+mj-lt"/>
-              </a:rPr>
-              <a:t>.</a:t>
-            </a:r>
-          </a:p>
-          <a:p>
-            <a:endParaRPr lang="en-US" sz="1800" dirty="0">
+              <a:rPr lang="en-US" sz="2000" b="1" dirty="0" smtClean="0">
+                <a:solidFill>
+                  <a:srgbClr val="008000"/>
+                </a:solidFill>
+                <a:latin typeface="+mj-lt"/>
+              </a:rPr>
+              <a:t>Ensemble Classifier/Accuracy Calculator: </a:t>
+            </a:r>
+            <a:r>
+              <a:rPr lang="en-US" sz="2000" dirty="0">
+                <a:latin typeface="+mj-lt"/>
+              </a:rPr>
+              <a:t>Zayd Hammoudeh</a:t>
+            </a:r>
+          </a:p>
+          <a:p>
+            <a:endParaRPr lang="en-US" sz="2000" b="1" dirty="0" smtClean="0">
+              <a:solidFill>
+                <a:srgbClr val="008000"/>
+              </a:solidFill>
               <a:latin typeface="+mj-lt"/>
             </a:endParaRPr>
           </a:p>
           <a:p>
             <a:r>
-              <a:rPr lang="en-US" sz="1800" dirty="0">
-                <a:latin typeface="+mj-lt"/>
-              </a:rPr>
-              <a:t>“google-</a:t>
-            </a:r>
-            <a:r>
-              <a:rPr lang="en-US" sz="1800" dirty="0" err="1">
-                <a:latin typeface="+mj-lt"/>
-              </a:rPr>
-              <a:t>gson</a:t>
-            </a:r>
-            <a:r>
-              <a:rPr lang="en-US" sz="1800" dirty="0">
-                <a:latin typeface="+mj-lt"/>
-              </a:rPr>
-              <a:t>,” </a:t>
-            </a:r>
-            <a:r>
-              <a:rPr lang="en-US" sz="1800" i="1" dirty="0">
-                <a:latin typeface="+mj-lt"/>
-              </a:rPr>
-              <a:t>GitHub</a:t>
-            </a:r>
-            <a:r>
-              <a:rPr lang="en-US" sz="1800" dirty="0">
-                <a:latin typeface="+mj-lt"/>
-              </a:rPr>
-              <a:t>. [Online]. Available at: </a:t>
-            </a:r>
-            <a:r>
-              <a:rPr lang="en-US" sz="1800" dirty="0">
-                <a:latin typeface="+mj-lt"/>
-                <a:hlinkClick r:id="rId4"/>
-              </a:rPr>
-              <a:t>https://</a:t>
-            </a:r>
-            <a:r>
-              <a:rPr lang="en-US" sz="1800" dirty="0" smtClean="0">
-                <a:latin typeface="+mj-lt"/>
-                <a:hlinkClick r:id="rId4"/>
-              </a:rPr>
-              <a:t>github.com/google/gson</a:t>
-            </a:r>
-            <a:r>
-              <a:rPr lang="en-US" sz="1800" dirty="0" smtClean="0">
-                <a:latin typeface="+mj-lt"/>
-              </a:rPr>
-              <a:t>. </a:t>
-            </a:r>
-            <a:r>
-              <a:rPr lang="en-US" sz="1800" dirty="0">
-                <a:latin typeface="+mj-lt"/>
-              </a:rPr>
-              <a:t>[Accessed: 2015</a:t>
-            </a:r>
-            <a:r>
-              <a:rPr lang="en-US" sz="1800" dirty="0" smtClean="0">
-                <a:latin typeface="+mj-lt"/>
-              </a:rPr>
-              <a:t>].</a:t>
-            </a:r>
-          </a:p>
-          <a:p>
-            <a:endParaRPr lang="en-US" sz="1800" dirty="0">
+              <a:rPr lang="en-US" sz="2000" b="1" dirty="0" err="1" smtClean="0">
+                <a:solidFill>
+                  <a:srgbClr val="008000"/>
+                </a:solidFill>
+                <a:latin typeface="+mj-lt"/>
+              </a:rPr>
+              <a:t>Oozie</a:t>
+            </a:r>
+            <a:r>
+              <a:rPr lang="en-US" sz="2000" b="1" dirty="0" smtClean="0">
+                <a:solidFill>
+                  <a:srgbClr val="008000"/>
+                </a:solidFill>
+                <a:latin typeface="+mj-lt"/>
+              </a:rPr>
+              <a:t> </a:t>
+            </a:r>
+            <a:r>
+              <a:rPr lang="en-US" sz="2000" b="1" dirty="0">
+                <a:solidFill>
+                  <a:srgbClr val="008000"/>
+                </a:solidFill>
+                <a:latin typeface="+mj-lt"/>
+              </a:rPr>
+              <a:t>Debug: </a:t>
+            </a:r>
+            <a:r>
+              <a:rPr lang="en-US" sz="2000" dirty="0" smtClean="0">
+                <a:latin typeface="+mj-lt"/>
+              </a:rPr>
+              <a:t>Zayd Hammoudeh, Shubhangi Rakhonde</a:t>
+            </a:r>
+          </a:p>
+          <a:p>
+            <a:endParaRPr lang="en-US" sz="2000" dirty="0">
               <a:latin typeface="+mj-lt"/>
             </a:endParaRPr>
           </a:p>
           <a:p>
             <a:r>
-              <a:rPr lang="en-US" sz="1800" dirty="0">
-                <a:latin typeface="+mj-lt"/>
-              </a:rPr>
-              <a:t>W. </a:t>
-            </a:r>
-            <a:r>
-              <a:rPr lang="en-US" sz="1800" dirty="0" err="1">
-                <a:latin typeface="+mj-lt"/>
-              </a:rPr>
-              <a:t>Ochandarena</a:t>
-            </a:r>
-            <a:r>
-              <a:rPr lang="en-US" sz="1800" dirty="0">
-                <a:latin typeface="+mj-lt"/>
-              </a:rPr>
-              <a:t>, “Spinning Up a Hadoop Cluster in the Cloud | </a:t>
-            </a:r>
-            <a:r>
-              <a:rPr lang="en-US" sz="1800" dirty="0" err="1">
-                <a:latin typeface="+mj-lt"/>
-              </a:rPr>
-              <a:t>MapR</a:t>
-            </a:r>
-            <a:r>
-              <a:rPr lang="en-US" sz="1800" dirty="0" smtClean="0">
-                <a:latin typeface="+mj-lt"/>
-              </a:rPr>
-              <a:t>,” </a:t>
-            </a:r>
-            <a:r>
-              <a:rPr lang="en-US" sz="1800" i="1" dirty="0" err="1" smtClean="0">
-                <a:latin typeface="+mj-lt"/>
-              </a:rPr>
-              <a:t>MapR</a:t>
-            </a:r>
-            <a:r>
-              <a:rPr lang="en-US" sz="1800" i="1" dirty="0" smtClean="0">
-                <a:latin typeface="+mj-lt"/>
-              </a:rPr>
-              <a:t> </a:t>
-            </a:r>
-            <a:r>
-              <a:rPr lang="en-US" sz="1800" i="1" dirty="0">
-                <a:latin typeface="+mj-lt"/>
-              </a:rPr>
-              <a:t>Blog</a:t>
-            </a:r>
-            <a:r>
-              <a:rPr lang="en-US" sz="1800" dirty="0">
-                <a:latin typeface="+mj-lt"/>
-              </a:rPr>
-              <a:t>. [Online]. Available at: </a:t>
-            </a:r>
-            <a:r>
-              <a:rPr lang="en-US" sz="1800" dirty="0">
-                <a:latin typeface="+mj-lt"/>
-                <a:hlinkClick r:id="rId5"/>
-              </a:rPr>
-              <a:t>https://</a:t>
-            </a:r>
-            <a:r>
-              <a:rPr lang="en-US" sz="1800" dirty="0" smtClean="0">
-                <a:latin typeface="+mj-lt"/>
-                <a:hlinkClick r:id="rId5"/>
-              </a:rPr>
-              <a:t>www.mapr.com/blog/spinning-hadoop-cluster-cloud</a:t>
-            </a:r>
-            <a:r>
-              <a:rPr lang="en-US" sz="1800" dirty="0" smtClean="0">
-                <a:latin typeface="+mj-lt"/>
-              </a:rPr>
-              <a:t>. </a:t>
-            </a:r>
-            <a:r>
-              <a:rPr lang="en-US" sz="1800" dirty="0">
-                <a:latin typeface="+mj-lt"/>
-              </a:rPr>
-              <a:t>[Accessed: 2015</a:t>
-            </a:r>
-            <a:r>
-              <a:rPr lang="en-US" sz="1800" dirty="0" smtClean="0">
-                <a:latin typeface="+mj-lt"/>
-              </a:rPr>
-              <a:t>].</a:t>
-            </a:r>
-          </a:p>
-          <a:p>
-            <a:endParaRPr lang="en-US" sz="1800" dirty="0">
-              <a:latin typeface="+mj-lt"/>
-            </a:endParaRPr>
-          </a:p>
-          <a:p>
-            <a:r>
-              <a:rPr lang="en-US" sz="1800" dirty="0">
-                <a:latin typeface="+mj-lt"/>
-              </a:rPr>
-              <a:t>“Maven in 5 Minutes,” </a:t>
-            </a:r>
-            <a:r>
-              <a:rPr lang="en-US" sz="1800" i="1" dirty="0">
-                <a:latin typeface="+mj-lt"/>
-              </a:rPr>
-              <a:t>Apache Maven Project</a:t>
-            </a:r>
-            <a:r>
-              <a:rPr lang="en-US" sz="1800" dirty="0">
-                <a:latin typeface="+mj-lt"/>
-              </a:rPr>
-              <a:t>. [Online]. Available at: </a:t>
-            </a:r>
-            <a:r>
-              <a:rPr lang="en-US" sz="1800" dirty="0">
-                <a:latin typeface="+mj-lt"/>
-                <a:hlinkClick r:id="rId6"/>
-              </a:rPr>
-              <a:t>https://</a:t>
-            </a:r>
-            <a:r>
-              <a:rPr lang="en-US" sz="1800" dirty="0" smtClean="0">
-                <a:latin typeface="+mj-lt"/>
-                <a:hlinkClick r:id="rId6"/>
-              </a:rPr>
-              <a:t>maven.apache.org/guides/getting-started/maven-in-five-minutes.html</a:t>
-            </a:r>
-            <a:r>
-              <a:rPr lang="en-US" sz="1800" dirty="0" smtClean="0">
-                <a:latin typeface="+mj-lt"/>
-              </a:rPr>
-              <a:t>. </a:t>
-            </a:r>
-            <a:r>
-              <a:rPr lang="en-US" sz="1800" dirty="0">
-                <a:latin typeface="+mj-lt"/>
-              </a:rPr>
-              <a:t>[Accessed: 2015].</a:t>
+              <a:rPr lang="en-US" sz="2000" b="1" dirty="0">
+                <a:solidFill>
+                  <a:srgbClr val="008000"/>
+                </a:solidFill>
+                <a:latin typeface="+mj-lt"/>
+              </a:rPr>
+              <a:t>Training File Distribution Paradigm: </a:t>
+            </a:r>
+            <a:r>
+              <a:rPr lang="en-US" sz="2000" dirty="0">
+                <a:latin typeface="+mj-lt"/>
+              </a:rPr>
+              <a:t>Shubhangi Rakhonde</a:t>
+            </a:r>
+          </a:p>
+          <a:p>
+            <a:r>
+              <a:rPr lang="en-US" sz="2000" b="1" dirty="0">
+                <a:solidFill>
+                  <a:srgbClr val="008000"/>
+                </a:solidFill>
+                <a:latin typeface="+mj-lt"/>
+              </a:rPr>
+              <a:t>HDFS Debug: </a:t>
+            </a:r>
+            <a:r>
+              <a:rPr lang="en-US" sz="2000" dirty="0" smtClean="0">
+                <a:latin typeface="+mj-lt"/>
+              </a:rPr>
+              <a:t>Zayd Hammoudeh</a:t>
+            </a:r>
+          </a:p>
+          <a:p>
+            <a:r>
+              <a:rPr lang="en-US" sz="2000" b="1" dirty="0">
+                <a:solidFill>
+                  <a:srgbClr val="008000"/>
+                </a:solidFill>
+                <a:latin typeface="+mj-lt"/>
+              </a:rPr>
+              <a:t>Amazon AWS: </a:t>
+            </a:r>
+            <a:r>
+              <a:rPr lang="en-US" sz="2000" dirty="0" smtClean="0">
+                <a:latin typeface="+mj-lt"/>
+              </a:rPr>
+              <a:t>Zayd Hammoudeh, Yashi Kamboj</a:t>
             </a:r>
           </a:p>
         </p:txBody>
@@ -5300,21 +5410,13 @@
     </p:spTree>
     <p:extLst>
       <p:ext uri="{BB962C8B-B14F-4D97-AF65-F5344CB8AC3E}">
-        <p14:creationId xmlns:p14="http://schemas.microsoft.com/office/powerpoint/2010/main" val="1011437234"/>
+        <p14:creationId xmlns:p14="http://schemas.microsoft.com/office/powerpoint/2010/main" val="811602814"/>
       </p:ext>
     </p:extLst>
   </p:cSld>
   <p:clrMapOvr>
     <a:masterClrMapping/>
   </p:clrMapOvr>
-  <mc:AlternateContent xmlns:mc="http://schemas.openxmlformats.org/markup-compatibility/2006" xmlns:p14="http://schemas.microsoft.com/office/powerpoint/2010/main">
-    <mc:Choice Requires="p14">
-      <p:transition spd="slow" p14:dur="2000"/>
-    </mc:Choice>
-    <mc:Fallback xmlns="">
-      <p:transition spd="slow"/>
-    </mc:Fallback>
-  </mc:AlternateContent>
   <p:timing>
     <p:tnLst>
       <p:par>
@@ -5344,280 +5446,108 @@
       </p:grpSpPr>
       <p:sp>
         <p:nvSpPr>
-          <p:cNvPr id="2" name="Title 1"/>
-          <p:cNvSpPr>
+          <p:cNvPr id="4" name="Slide Number Placeholder 5"/>
+          <p:cNvSpPr txBox="1">
             <a:spLocks noGrp="1"/>
           </p:cNvSpPr>
-          <p:nvPr>
-            <p:ph type="title"/>
-          </p:nvPr>
-        </p:nvSpPr>
-        <p:spPr/>
-        <p:txBody>
-          <a:bodyPr>
-            <a:normAutofit fontScale="90000"/>
+          <p:nvPr/>
+        </p:nvSpPr>
+        <p:spPr>
+          <a:xfrm>
+            <a:off x="6553200" y="6243638"/>
+            <a:ext cx="2133600" cy="476250"/>
+          </a:xfrm>
+          <a:prstGeom prst="rect">
+            <a:avLst/>
+          </a:prstGeom>
+          <a:noFill/>
+        </p:spPr>
+        <p:txBody>
+          <a:bodyPr anchor="ctr">
+            <a:normAutofit/>
           </a:bodyPr>
           <a:lstStyle/>
           <a:p>
-            <a:r>
-              <a:rPr lang="en-US" dirty="0" smtClean="0">
-                <a:latin typeface="+mj-lt"/>
-              </a:rPr>
-              <a:t>Updated Division of Responsibilities</a:t>
-            </a:r>
-            <a:endParaRPr lang="en-US" dirty="0">
-              <a:latin typeface="+mj-lt"/>
-            </a:endParaRPr>
-          </a:p>
-        </p:txBody>
-      </p:sp>
-      <p:sp>
-        <p:nvSpPr>
-          <p:cNvPr id="3" name="Content Placeholder 2"/>
-          <p:cNvSpPr>
-            <a:spLocks noGrp="1"/>
-          </p:cNvSpPr>
-          <p:nvPr>
-            <p:ph idx="1"/>
-          </p:nvPr>
-        </p:nvSpPr>
-        <p:spPr/>
-        <p:txBody>
-          <a:bodyPr/>
-          <a:lstStyle/>
-          <a:p>
-            <a:r>
-              <a:rPr lang="en-US" sz="2000" b="1" dirty="0">
+            <a:pPr algn="r">
+              <a:defRPr/>
+            </a:pPr>
+            <a:fld id="{461A371C-171F-4E20-B0FF-839288CBD4F9}" type="slidenum">
+              <a:rPr lang="en-US" sz="1200" b="0">
                 <a:solidFill>
-                  <a:srgbClr val="008000"/>
+                  <a:srgbClr val="898989"/>
                 </a:solidFill>
-                <a:latin typeface="+mj-lt"/>
-              </a:rPr>
-              <a:t>Preprocessor: </a:t>
-            </a:r>
-            <a:r>
-              <a:rPr lang="en-US" sz="2000" dirty="0" smtClean="0">
-                <a:latin typeface="+mj-lt"/>
-              </a:rPr>
-              <a:t>Zayd Hammoudeh</a:t>
-            </a:r>
-          </a:p>
-          <a:p>
-            <a:endParaRPr lang="en-US" sz="2000" b="1" dirty="0" smtClean="0">
-              <a:solidFill>
-                <a:srgbClr val="008000"/>
-              </a:solidFill>
-              <a:latin typeface="+mj-lt"/>
-            </a:endParaRPr>
-          </a:p>
-          <a:p>
-            <a:r>
-              <a:rPr lang="en-US" sz="2000" b="1" dirty="0" smtClean="0">
-                <a:solidFill>
-                  <a:srgbClr val="008000"/>
-                </a:solidFill>
-                <a:latin typeface="+mj-lt"/>
-              </a:rPr>
-              <a:t>Naïve </a:t>
-            </a:r>
-            <a:r>
-              <a:rPr lang="en-US" sz="2000" b="1" dirty="0">
-                <a:solidFill>
-                  <a:srgbClr val="008000"/>
-                </a:solidFill>
-                <a:latin typeface="+mj-lt"/>
-              </a:rPr>
-              <a:t>Bayes: </a:t>
-            </a:r>
-            <a:r>
-              <a:rPr lang="en-US" sz="2000" dirty="0" smtClean="0">
-                <a:latin typeface="+mj-lt"/>
-              </a:rPr>
-              <a:t>Shubhangi Rakhonde</a:t>
-            </a:r>
-          </a:p>
-          <a:p>
-            <a:r>
-              <a:rPr lang="en-US" sz="2000" b="1" dirty="0" smtClean="0">
-                <a:solidFill>
-                  <a:srgbClr val="008000"/>
-                </a:solidFill>
-                <a:latin typeface="+mj-lt"/>
-              </a:rPr>
-              <a:t>KNN: </a:t>
-            </a:r>
-            <a:r>
-              <a:rPr lang="en-US" sz="2000" dirty="0" smtClean="0">
-                <a:latin typeface="+mj-lt"/>
-              </a:rPr>
-              <a:t>Yashi Kamboj, Shubhangi Rakhonde</a:t>
-            </a:r>
-          </a:p>
-          <a:p>
-            <a:endParaRPr lang="en-US" sz="2000" b="1" dirty="0" smtClean="0">
-              <a:solidFill>
-                <a:srgbClr val="008000"/>
-              </a:solidFill>
-              <a:latin typeface="+mj-lt"/>
-            </a:endParaRPr>
-          </a:p>
-          <a:p>
-            <a:r>
-              <a:rPr lang="en-US" sz="2000" b="1" dirty="0" smtClean="0">
-                <a:solidFill>
-                  <a:srgbClr val="008000"/>
-                </a:solidFill>
-                <a:latin typeface="+mj-lt"/>
-              </a:rPr>
-              <a:t>Ensemble Classifier/Accuracy Calculator: </a:t>
-            </a:r>
-            <a:r>
-              <a:rPr lang="en-US" sz="2000" dirty="0">
-                <a:latin typeface="+mj-lt"/>
-              </a:rPr>
-              <a:t>Zayd Hammoudeh</a:t>
-            </a:r>
-          </a:p>
-          <a:p>
-            <a:endParaRPr lang="en-US" sz="2000" b="1" dirty="0" smtClean="0">
-              <a:solidFill>
-                <a:srgbClr val="008000"/>
-              </a:solidFill>
-              <a:latin typeface="+mj-lt"/>
-            </a:endParaRPr>
-          </a:p>
-          <a:p>
-            <a:r>
-              <a:rPr lang="en-US" sz="2000" b="1" dirty="0" err="1" smtClean="0">
-                <a:solidFill>
-                  <a:srgbClr val="008000"/>
-                </a:solidFill>
-                <a:latin typeface="+mj-lt"/>
-              </a:rPr>
-              <a:t>Oozie</a:t>
-            </a:r>
-            <a:r>
-              <a:rPr lang="en-US" sz="2000" b="1" dirty="0" smtClean="0">
-                <a:solidFill>
-                  <a:srgbClr val="008000"/>
-                </a:solidFill>
-                <a:latin typeface="+mj-lt"/>
-              </a:rPr>
-              <a:t> </a:t>
-            </a:r>
-            <a:r>
-              <a:rPr lang="en-US" sz="2000" b="1" dirty="0">
-                <a:solidFill>
-                  <a:srgbClr val="008000"/>
-                </a:solidFill>
-                <a:latin typeface="+mj-lt"/>
-              </a:rPr>
-              <a:t>Debug: </a:t>
-            </a:r>
-            <a:r>
-              <a:rPr lang="en-US" sz="2000" dirty="0" smtClean="0">
-                <a:latin typeface="+mj-lt"/>
-              </a:rPr>
-              <a:t>Zayd Hammoudeh, Shubhangi Rakhonde</a:t>
-            </a:r>
-          </a:p>
-          <a:p>
-            <a:endParaRPr lang="en-US" sz="2000" dirty="0">
-              <a:latin typeface="+mj-lt"/>
-            </a:endParaRPr>
-          </a:p>
-          <a:p>
-            <a:r>
-              <a:rPr lang="en-US" sz="2000" b="1" dirty="0">
-                <a:solidFill>
-                  <a:srgbClr val="008000"/>
-                </a:solidFill>
-                <a:latin typeface="+mj-lt"/>
-              </a:rPr>
-              <a:t>Training File Distribution Paradigm: </a:t>
-            </a:r>
-            <a:r>
-              <a:rPr lang="en-US" sz="2000" dirty="0">
-                <a:latin typeface="+mj-lt"/>
-              </a:rPr>
-              <a:t>Shubhangi Rakhonde</a:t>
-            </a:r>
-          </a:p>
-          <a:p>
-            <a:r>
-              <a:rPr lang="en-US" sz="2000" b="1" dirty="0">
-                <a:solidFill>
-                  <a:srgbClr val="008000"/>
-                </a:solidFill>
-                <a:latin typeface="+mj-lt"/>
-              </a:rPr>
-              <a:t>HDFS Debug: </a:t>
-            </a:r>
-            <a:r>
-              <a:rPr lang="en-US" sz="2000" dirty="0" smtClean="0">
-                <a:latin typeface="+mj-lt"/>
-              </a:rPr>
-              <a:t>Zayd Hammoudeh</a:t>
-            </a:r>
-          </a:p>
-          <a:p>
-            <a:r>
-              <a:rPr lang="en-US" sz="2000" b="1" dirty="0">
-                <a:solidFill>
-                  <a:srgbClr val="008000"/>
-                </a:solidFill>
-                <a:latin typeface="+mj-lt"/>
-              </a:rPr>
-              <a:t>Amazon AWS: </a:t>
-            </a:r>
-            <a:r>
-              <a:rPr lang="en-US" sz="2000" dirty="0" smtClean="0">
-                <a:latin typeface="+mj-lt"/>
-              </a:rPr>
-              <a:t>Zayd Hammoudeh, Yashi Kamboj</a:t>
-            </a:r>
-          </a:p>
-        </p:txBody>
-      </p:sp>
-      <p:sp>
-        <p:nvSpPr>
-          <p:cNvPr id="4" name="Slide Number Placeholder 3"/>
-          <p:cNvSpPr>
-            <a:spLocks noGrp="1"/>
-          </p:cNvSpPr>
-          <p:nvPr>
-            <p:ph type="sldNum" sz="quarter" idx="11"/>
-          </p:nvPr>
-        </p:nvSpPr>
-        <p:spPr/>
-        <p:txBody>
-          <a:bodyPr/>
-          <a:lstStyle/>
-          <a:p>
-            <a:pPr>
-              <a:defRPr/>
-            </a:pPr>
-            <a:fld id="{57CAE338-3B6A-4037-90D8-94F2438351D8}" type="slidenum">
-              <a:rPr lang="en-US" smtClean="0"/>
-              <a:pPr>
+                <a:latin typeface="+mn-lt"/>
+              </a:rPr>
+              <a:pPr algn="r">
                 <a:defRPr/>
               </a:pPr>
               <a:t>17</a:t>
             </a:fld>
-            <a:endParaRPr lang="en-US"/>
+            <a:endParaRPr lang="en-US" sz="1200" b="0" dirty="0">
+              <a:solidFill>
+                <a:srgbClr val="898989"/>
+              </a:solidFill>
+              <a:latin typeface="+mn-lt"/>
+            </a:endParaRPr>
+          </a:p>
+        </p:txBody>
+      </p:sp>
+      <p:sp>
+        <p:nvSpPr>
+          <p:cNvPr id="58370" name="Rectangle 4"/>
+          <p:cNvSpPr>
+            <a:spLocks/>
+          </p:cNvSpPr>
+          <p:nvPr/>
+        </p:nvSpPr>
+        <p:spPr bwMode="auto">
+          <a:xfrm>
+            <a:off x="1246188" y="4527550"/>
+            <a:ext cx="6845300" cy="1311275"/>
+          </a:xfrm>
+          <a:prstGeom prst="rect">
+            <a:avLst/>
+          </a:prstGeom>
+          <a:noFill/>
+          <a:ln w="9525">
+            <a:noFill/>
+            <a:miter lim="800000"/>
+            <a:headEnd/>
+            <a:tailEnd/>
+          </a:ln>
+        </p:spPr>
+        <p:txBody>
+          <a:bodyPr anchor="ctr"/>
+          <a:lstStyle/>
+          <a:p>
+            <a:pPr algn="ctr"/>
+            <a:r>
+              <a:rPr lang="en-US" sz="5400" dirty="0" smtClean="0">
+                <a:latin typeface="Times New Roman" pitchFamily="18" charset="0"/>
+                <a:cs typeface="Times New Roman" pitchFamily="18" charset="0"/>
+              </a:rPr>
+              <a:t>Questions?</a:t>
+            </a:r>
+            <a:endParaRPr lang="en-US" sz="5400" dirty="0">
+              <a:latin typeface="Times New Roman" pitchFamily="18" charset="0"/>
+              <a:cs typeface="Times New Roman" pitchFamily="18" charset="0"/>
+            </a:endParaRPr>
           </a:p>
         </p:txBody>
       </p:sp>
     </p:spTree>
-    <p:extLst>
-      <p:ext uri="{BB962C8B-B14F-4D97-AF65-F5344CB8AC3E}">
-        <p14:creationId xmlns:p14="http://schemas.microsoft.com/office/powerpoint/2010/main" val="811602814"/>
-      </p:ext>
-    </p:extLst>
   </p:cSld>
   <p:clrMapOvr>
     <a:masterClrMapping/>
   </p:clrMapOvr>
+  <mc:AlternateContent xmlns:mc="http://schemas.openxmlformats.org/markup-compatibility/2006" xmlns:p14="http://schemas.microsoft.com/office/powerpoint/2010/main">
+    <mc:Choice Requires="p14">
+      <p:transition spd="slow" p14:dur="2000"/>
+    </mc:Choice>
+    <mc:Fallback xmlns="">
+      <p:transition spd="slow"/>
+    </mc:Fallback>
+  </mc:AlternateContent>
   <p:timing>
     <p:tnLst>
       <p:par>
@@ -5723,11 +5653,11 @@
           <a:p>
             <a:pPr algn="ctr"/>
             <a:r>
-              <a:rPr lang="en-US" sz="5400" dirty="0" smtClean="0">
+              <a:rPr lang="en-US" sz="5400" smtClean="0">
                 <a:latin typeface="Times New Roman" pitchFamily="18" charset="0"/>
                 <a:cs typeface="Times New Roman" pitchFamily="18" charset="0"/>
               </a:rPr>
-              <a:t>Questions?</a:t>
+              <a:t>Appendix</a:t>
             </a:r>
             <a:endParaRPr lang="en-US" sz="5400" dirty="0">
               <a:latin typeface="Times New Roman" pitchFamily="18" charset="0"/>
@@ -5737,6 +5667,274 @@
         </p:txBody>
       </p:sp>
     </p:spTree>
+    <p:extLst>
+      <p:ext uri="{BB962C8B-B14F-4D97-AF65-F5344CB8AC3E}">
+        <p14:creationId xmlns:p14="http://schemas.microsoft.com/office/powerpoint/2010/main" val="3981329248"/>
+      </p:ext>
+    </p:extLst>
+  </p:cSld>
+  <p:clrMapOvr>
+    <a:masterClrMapping/>
+  </p:clrMapOvr>
+  <mc:AlternateContent xmlns:mc="http://schemas.openxmlformats.org/markup-compatibility/2006" xmlns:p14="http://schemas.microsoft.com/office/powerpoint/2010/main">
+    <mc:Choice Requires="p14">
+      <p:transition spd="slow" p14:dur="2000"/>
+    </mc:Choice>
+    <mc:Fallback xmlns="">
+      <p:transition spd="slow"/>
+    </mc:Fallback>
+  </mc:AlternateContent>
+  <p:timing>
+    <p:tnLst>
+      <p:par>
+        <p:cTn id="1" dur="indefinite" restart="never" nodeType="tmRoot"/>
+      </p:par>
+    </p:tnLst>
+  </p:timing>
+</p:sld>
+</file>
+
+<file path=ppt/slides/slide19.xml><?xml version="1.0" encoding="utf-8"?>
+<p:sld xmlns:a="http://schemas.openxmlformats.org/drawingml/2006/main" xmlns:r="http://schemas.openxmlformats.org/officeDocument/2006/relationships" xmlns:p="http://schemas.openxmlformats.org/presentationml/2006/main">
+  <p:cSld>
+    <p:spTree>
+      <p:nvGrpSpPr>
+        <p:cNvPr id="1" name=""/>
+        <p:cNvGrpSpPr/>
+        <p:nvPr/>
+      </p:nvGrpSpPr>
+      <p:grpSpPr>
+        <a:xfrm>
+          <a:off x="0" y="0"/>
+          <a:ext cx="0" cy="0"/>
+          <a:chOff x="0" y="0"/>
+          <a:chExt cx="0" cy="0"/>
+        </a:xfrm>
+      </p:grpSpPr>
+      <p:sp>
+        <p:nvSpPr>
+          <p:cNvPr id="2" name="Title 1"/>
+          <p:cNvSpPr>
+            <a:spLocks noGrp="1"/>
+          </p:cNvSpPr>
+          <p:nvPr>
+            <p:ph type="title"/>
+          </p:nvPr>
+        </p:nvSpPr>
+        <p:spPr>
+          <a:xfrm>
+            <a:off x="2162175" y="94672"/>
+            <a:ext cx="6838950" cy="550863"/>
+          </a:xfrm>
+        </p:spPr>
+        <p:txBody>
+          <a:bodyPr>
+            <a:noAutofit/>
+          </a:bodyPr>
+          <a:lstStyle/>
+          <a:p>
+            <a:pPr>
+              <a:defRPr/>
+            </a:pPr>
+            <a:r>
+              <a:rPr lang="en-US" sz="2800" dirty="0" smtClean="0">
+                <a:latin typeface="+mj-lt"/>
+              </a:rPr>
+              <a:t>AWS Cluster Administration – Not So Easy</a:t>
+            </a:r>
+            <a:endParaRPr lang="en-US" sz="2800" dirty="0">
+              <a:latin typeface="+mj-lt"/>
+            </a:endParaRPr>
+          </a:p>
+        </p:txBody>
+      </p:sp>
+      <p:sp>
+        <p:nvSpPr>
+          <p:cNvPr id="10242" name="Content Placeholder 2"/>
+          <p:cNvSpPr>
+            <a:spLocks noGrp="1"/>
+          </p:cNvSpPr>
+          <p:nvPr>
+            <p:ph idx="1"/>
+          </p:nvPr>
+        </p:nvSpPr>
+        <p:spPr>
+          <a:xfrm>
+            <a:off x="457199" y="989013"/>
+            <a:ext cx="8239126" cy="5404167"/>
+          </a:xfrm>
+        </p:spPr>
+        <p:txBody>
+          <a:bodyPr>
+            <a:normAutofit fontScale="85000" lnSpcReduction="20000"/>
+          </a:bodyPr>
+          <a:lstStyle/>
+          <a:p>
+            <a:pPr>
+              <a:lnSpc>
+                <a:spcPct val="120000"/>
+              </a:lnSpc>
+            </a:pPr>
+            <a:r>
+              <a:rPr lang="en-US" dirty="0" smtClean="0">
+                <a:latin typeface="+mj-lt"/>
+              </a:rPr>
+              <a:t>Configuring an AWS cluster was more difficult than we had anticipated.</a:t>
+            </a:r>
+          </a:p>
+          <a:p>
+            <a:pPr>
+              <a:lnSpc>
+                <a:spcPct val="120000"/>
+              </a:lnSpc>
+            </a:pPr>
+            <a:endParaRPr lang="en-US" dirty="0">
+              <a:latin typeface="+mj-lt"/>
+            </a:endParaRPr>
+          </a:p>
+          <a:p>
+            <a:pPr>
+              <a:lnSpc>
+                <a:spcPct val="120000"/>
+              </a:lnSpc>
+            </a:pPr>
+            <a:r>
+              <a:rPr lang="en-US" dirty="0">
+                <a:latin typeface="+mj-lt"/>
+              </a:rPr>
+              <a:t>In our sandbox, we only setup a single instance (and some of use even struggled with that).  Bringing up and managing multiple, parallel instances is more complicated</a:t>
+            </a:r>
+            <a:r>
+              <a:rPr lang="en-US" dirty="0" smtClean="0">
+                <a:latin typeface="+mj-lt"/>
+              </a:rPr>
+              <a:t>.</a:t>
+            </a:r>
+          </a:p>
+          <a:p>
+            <a:pPr>
+              <a:lnSpc>
+                <a:spcPct val="120000"/>
+              </a:lnSpc>
+            </a:pPr>
+            <a:endParaRPr lang="en-US" dirty="0">
+              <a:latin typeface="+mj-lt"/>
+            </a:endParaRPr>
+          </a:p>
+          <a:p>
+            <a:pPr>
+              <a:lnSpc>
+                <a:spcPct val="120000"/>
+              </a:lnSpc>
+            </a:pPr>
+            <a:r>
+              <a:rPr lang="en-US" dirty="0" smtClean="0">
+                <a:latin typeface="+mj-lt"/>
+              </a:rPr>
+              <a:t>Amazon’s Elastic MapReduce (EMR) service should make this process simpler, but we went with EC2 instances due to their lower cost</a:t>
+            </a:r>
+          </a:p>
+          <a:p>
+            <a:pPr marL="0" indent="0">
+              <a:lnSpc>
+                <a:spcPct val="120000"/>
+              </a:lnSpc>
+              <a:buNone/>
+            </a:pPr>
+            <a:endParaRPr lang="en-US" dirty="0">
+              <a:latin typeface="+mj-lt"/>
+            </a:endParaRPr>
+          </a:p>
+          <a:p>
+            <a:pPr>
+              <a:lnSpc>
+                <a:spcPct val="120000"/>
+              </a:lnSpc>
+            </a:pPr>
+            <a:r>
+              <a:rPr lang="en-US" b="1" dirty="0" smtClean="0">
+                <a:solidFill>
+                  <a:srgbClr val="008000"/>
+                </a:solidFill>
+                <a:latin typeface="+mj-lt"/>
+              </a:rPr>
+              <a:t>Takeaways:</a:t>
+            </a:r>
+          </a:p>
+          <a:p>
+            <a:pPr lvl="1">
+              <a:lnSpc>
+                <a:spcPct val="120000"/>
+              </a:lnSpc>
+            </a:pPr>
+            <a:r>
+              <a:rPr lang="en-US" dirty="0" smtClean="0">
+                <a:latin typeface="+mj-lt"/>
+              </a:rPr>
+              <a:t>If your future company has a system admin, become his/her friend as it is can be pain to figure out how to configure AWS yourself.</a:t>
+            </a:r>
+          </a:p>
+          <a:p>
+            <a:pPr marL="457200" lvl="1" indent="0">
+              <a:lnSpc>
+                <a:spcPct val="120000"/>
+              </a:lnSpc>
+              <a:buNone/>
+            </a:pPr>
+            <a:endParaRPr lang="en-US" dirty="0" smtClean="0">
+              <a:latin typeface="+mj-lt"/>
+            </a:endParaRPr>
+          </a:p>
+          <a:p>
+            <a:pPr lvl="1">
+              <a:lnSpc>
+                <a:spcPct val="120000"/>
+              </a:lnSpc>
+            </a:pPr>
+            <a:r>
+              <a:rPr lang="en-US" dirty="0" smtClean="0">
+                <a:latin typeface="+mj-lt"/>
+              </a:rPr>
+              <a:t>If you need to do the system administration yourself, do not despair as you learn a lot of new (and unexpected) things along the way.</a:t>
+            </a:r>
+          </a:p>
+        </p:txBody>
+      </p:sp>
+      <p:sp>
+        <p:nvSpPr>
+          <p:cNvPr id="4" name="Slide Number Placeholder 3"/>
+          <p:cNvSpPr>
+            <a:spLocks noGrp="1"/>
+          </p:cNvSpPr>
+          <p:nvPr>
+            <p:ph type="sldNum" sz="quarter" idx="11"/>
+          </p:nvPr>
+        </p:nvSpPr>
+        <p:spPr/>
+        <p:txBody>
+          <a:bodyPr/>
+          <a:lstStyle/>
+          <a:p>
+            <a:pPr>
+              <a:defRPr/>
+            </a:pPr>
+            <a:fld id="{93CE8203-E40A-46AD-9381-6C8CB0064A1B}" type="slidenum">
+              <a:rPr lang="en-US" smtClean="0"/>
+              <a:pPr>
+                <a:defRPr/>
+              </a:pPr>
+              <a:t>19</a:t>
+            </a:fld>
+            <a:endParaRPr lang="en-US"/>
+          </a:p>
+        </p:txBody>
+      </p:sp>
+    </p:spTree>
+    <p:extLst>
+      <p:ext uri="{BB962C8B-B14F-4D97-AF65-F5344CB8AC3E}">
+        <p14:creationId xmlns:p14="http://schemas.microsoft.com/office/powerpoint/2010/main" val="648670633"/>
+      </p:ext>
+    </p:extLst>
   </p:cSld>
   <p:clrMapOvr>
     <a:masterClrMapping/>

</xml_diff>

<commit_message>
Fixing the CS286 presentation graphics that was calling the NB steps in the oozie flow as "Ensemble."  Also changing successive execution to serial execution.
</commit_message>
<xml_diff>
--- a/Presentation/CS286 - Ensemble Classifier on AWS.pptx
+++ b/Presentation/CS286 - Ensemble Classifier on AWS.pptx
@@ -385,6 +385,11 @@
         </p:txBody>
       </p:sp>
     </p:spTree>
+    <p:extLst>
+      <p:ext uri="{BB962C8B-B14F-4D97-AF65-F5344CB8AC3E}">
+        <p14:creationId xmlns:p14="http://schemas.microsoft.com/office/powerpoint/2010/main" val="940796336"/>
+      </p:ext>
+    </p:extLst>
   </p:cSld>
   <p:clrMap bg1="lt1" tx1="dk1" bg2="lt2" tx2="dk2" accent1="accent1" accent2="accent2" accent3="accent3" accent4="accent4" accent5="accent5" accent6="accent6" hlink="hlink" folHlink="folHlink"/>
 </p:handoutMaster>
@@ -707,6 +712,11 @@
         </p:txBody>
       </p:sp>
     </p:spTree>
+    <p:extLst>
+      <p:ext uri="{BB962C8B-B14F-4D97-AF65-F5344CB8AC3E}">
+        <p14:creationId xmlns:p14="http://schemas.microsoft.com/office/powerpoint/2010/main" val="3005958946"/>
+      </p:ext>
+    </p:extLst>
   </p:cSld>
   <p:clrMap bg1="lt1" tx1="dk1" bg2="lt2" tx2="dk2" accent1="accent1" accent2="accent2" accent3="accent3" accent4="accent4" accent5="accent5" accent6="accent6" hlink="hlink" folHlink="folHlink"/>
   <p:notesStyle>
@@ -4069,8 +4079,29 @@
               <a:rPr lang="en-US" sz="1800" dirty="0" smtClean="0">
                 <a:latin typeface="+mj-lt"/>
               </a:rPr>
-              <a:t>On a cluster with more nodes, we expect we could reduce the execution time an additional 15-20%.</a:t>
-            </a:r>
+              <a:t>On a cluster with more nodes, we expect we could reduce the execution time an additional </a:t>
+            </a:r>
+            <a:r>
+              <a:rPr lang="en-US" sz="1800" dirty="0">
+                <a:latin typeface="+mj-lt"/>
+              </a:rPr>
+              <a:t> </a:t>
+            </a:r>
+            <a:r>
+              <a:rPr lang="en-US" sz="1800" dirty="0" smtClean="0">
+                <a:latin typeface="+mj-lt"/>
+              </a:rPr>
+              <a:t>10%-15% or more</a:t>
+            </a:r>
+            <a:r>
+              <a:rPr lang="en-US" sz="1800" dirty="0" smtClean="0">
+                <a:latin typeface="+mj-lt"/>
+              </a:rPr>
+              <a:t>.</a:t>
+            </a:r>
+            <a:endParaRPr lang="en-US" sz="1800" dirty="0" smtClean="0">
+              <a:latin typeface="+mj-lt"/>
+            </a:endParaRPr>
           </a:p>
           <a:p>
             <a:pPr>
@@ -4100,16 +4131,10 @@
               <a:rPr lang="en-US" sz="2000" dirty="0" smtClean="0">
                 <a:latin typeface="+mj-lt"/>
               </a:rPr>
-              <a:t> fork was </a:t>
-            </a:r>
-            <a:r>
-              <a:rPr lang="en-US" sz="2000" smtClean="0">
-                <a:latin typeface="+mj-lt"/>
-              </a:rPr>
-              <a:t>about </a:t>
-            </a:r>
-            <a:r>
-              <a:rPr lang="en-US" sz="2000" b="1" smtClean="0">
+              <a:t> fork was about </a:t>
+            </a:r>
+            <a:r>
+              <a:rPr lang="en-US" sz="2000" b="1" dirty="0" smtClean="0">
                 <a:solidFill>
                   <a:srgbClr val="C00000"/>
                 </a:solidFill>
@@ -4121,7 +4146,19 @@
               <a:rPr lang="en-US" sz="2000" dirty="0" smtClean="0">
                 <a:latin typeface="+mj-lt"/>
               </a:rPr>
-              <a:t>slower than using successive execution.</a:t>
+              <a:t>slower than using </a:t>
+            </a:r>
+            <a:r>
+              <a:rPr lang="en-US" sz="2000" dirty="0" smtClean="0">
+                <a:latin typeface="+mj-lt"/>
+              </a:rPr>
+              <a:t>serial execution</a:t>
+            </a:r>
+            <a:r>
+              <a:rPr lang="en-US" sz="2000" dirty="0" smtClean="0">
+                <a:latin typeface="+mj-lt"/>
+              </a:rPr>
+              <a:t>.</a:t>
             </a:r>
           </a:p>
           <a:p>
@@ -4132,22 +4169,15 @@
               <a:rPr lang="en-US" sz="1800" dirty="0" smtClean="0">
                 <a:latin typeface="+mj-lt"/>
               </a:rPr>
-              <a:t>We believe this slowdown was caused by the limited resources in our debug cluster.</a:t>
-            </a:r>
-          </a:p>
-          <a:p>
-            <a:pPr>
-              <a:defRPr/>
-            </a:pPr>
-            <a:endParaRPr lang="en-US" sz="2400" dirty="0">
-              <a:latin typeface="+mj-lt"/>
-            </a:endParaRPr>
-          </a:p>
-          <a:p>
-            <a:pPr>
-              <a:defRPr/>
-            </a:pPr>
-            <a:endParaRPr lang="en-US" sz="2400" dirty="0">
+              <a:t>We believe this slowdown was caused by the limited resources in our debug cluster</a:t>
+            </a:r>
+            <a:r>
+              <a:rPr lang="en-US" sz="1800" dirty="0" smtClean="0">
+                <a:latin typeface="+mj-lt"/>
+              </a:rPr>
+              <a:t>.</a:t>
+            </a:r>
+            <a:endParaRPr lang="en-US" sz="1800" dirty="0" smtClean="0">
               <a:latin typeface="+mj-lt"/>
             </a:endParaRPr>
           </a:p>
@@ -4190,11 +4220,17 @@
           <p:cNvGraphicFramePr>
             <a:graphicFrameLocks noGrp="1"/>
           </p:cNvGraphicFramePr>
-          <p:nvPr/>
+          <p:nvPr>
+            <p:extLst>
+              <p:ext uri="{D42A27DB-BD31-4B8C-83A1-F6EECF244321}">
+                <p14:modId xmlns:p14="http://schemas.microsoft.com/office/powerpoint/2010/main" val="1403133547"/>
+              </p:ext>
+            </p:extLst>
+          </p:nvPr>
         </p:nvGraphicFramePr>
         <p:xfrm>
           <a:off x="133350" y="1730375"/>
-          <a:ext cx="4257675" cy="3597275"/>
+          <a:ext cx="4257675" cy="3291840"/>
         </p:xfrm>
         <a:graphic>
           <a:graphicData uri="http://schemas.openxmlformats.org/drawingml/2006/table">
@@ -4356,7 +4392,7 @@
                       <a:pPr algn="ctr"/>
                       <a:r>
                         <a:rPr lang="en-US" sz="2000" dirty="0" smtClean="0"/>
-                        <a:t>Successive Execution</a:t>
+                        <a:t>Serial Execution</a:t>
                       </a:r>
                       <a:endParaRPr lang="en-US" sz="2000" dirty="0"/>
                     </a:p>
@@ -4439,7 +4475,15 @@
                             <a:srgbClr val="C00000"/>
                           </a:solidFill>
                         </a:rPr>
-                        <a:t>AWS Successive</a:t>
+                        <a:t>AWS </a:t>
+                      </a:r>
+                      <a:r>
+                        <a:rPr lang="en-US" sz="2000" b="1" dirty="0" smtClean="0">
+                          <a:solidFill>
+                            <a:srgbClr val="C00000"/>
+                          </a:solidFill>
+                        </a:rPr>
+                        <a:t>Serial</a:t>
                       </a:r>
                       <a:r>
                         <a:rPr lang="en-US" sz="2000" b="1" baseline="0" dirty="0" smtClean="0">
@@ -5270,7 +5314,7 @@
         <p:spPr bwMode="auto">
           <a:xfrm>
             <a:off x="4986338" y="4881563"/>
-            <a:ext cx="4025900" cy="581025"/>
+            <a:ext cx="4025900" cy="584775"/>
           </a:xfrm>
           <a:prstGeom prst="rect">
             <a:avLst/>
@@ -5291,28 +5335,42 @@
           <a:p>
             <a:pPr algn="ctr"/>
             <a:r>
-              <a:rPr lang="en-US" sz="1600" b="0"/>
+              <a:rPr lang="en-US" sz="1600" b="0" dirty="0"/>
               <a:t>Custom MapReduce Configuration</a:t>
             </a:r>
           </a:p>
           <a:p>
             <a:pPr algn="ctr"/>
             <a:r>
-              <a:rPr lang="en-US" sz="1600" b="0"/>
+              <a:rPr lang="en-US" sz="1600" b="0" dirty="0"/>
               <a:t>from our </a:t>
             </a:r>
             <a:r>
-              <a:rPr lang="en-US" sz="1600">
+              <a:rPr lang="en-US" sz="1600" dirty="0" err="1">
                 <a:solidFill>
-                  <a:srgbClr val="B71D11"/>
+                  <a:srgbClr val="C00000"/>
                 </a:solidFill>
-              </a:rPr>
-              <a:t>Oozie XML Workflow</a:t>
-            </a:r>
-            <a:endParaRPr lang="en-US" sz="1600" b="0">
+                <a:latin typeface="+mn-lt"/>
+                <a:cs typeface="+mn-cs"/>
+              </a:rPr>
+              <a:t>Oozie</a:t>
+            </a:r>
+            <a:r>
+              <a:rPr lang="en-US" sz="1600" dirty="0">
+                <a:solidFill>
+                  <a:srgbClr val="C00000"/>
+                </a:solidFill>
+                <a:latin typeface="+mn-lt"/>
+                <a:cs typeface="+mn-cs"/>
+              </a:rPr>
+              <a:t> XML Workflow</a:t>
+            </a:r>
+            <a:endParaRPr lang="en-US" sz="2000" dirty="0">
               <a:solidFill>
-                <a:srgbClr val="B71D11"/>
+                <a:srgbClr val="C00000"/>
               </a:solidFill>
+              <a:latin typeface="+mn-lt"/>
+              <a:cs typeface="+mn-cs"/>
             </a:endParaRPr>
           </a:p>
         </p:txBody>
@@ -6582,7 +6640,9 @@
         </p:nvSpPr>
         <p:spPr/>
         <p:txBody>
-          <a:bodyPr/>
+          <a:bodyPr>
+            <a:normAutofit fontScale="90000"/>
+          </a:bodyPr>
           <a:lstStyle/>
           <a:p>
             <a:r>
@@ -6613,29 +6673,29 @@
           <a:lstStyle/>
           <a:p>
             <a:r>
-              <a:rPr lang="en-US" sz="2800" b="1" smtClean="0"/>
+              <a:rPr lang="en-US" sz="2800" b="1" dirty="0" smtClean="0"/>
               <a:t>Kaggle Competition:</a:t>
             </a:r>
             <a:r>
-              <a:rPr lang="en-US" sz="2800" smtClean="0"/>
+              <a:rPr lang="en-US" sz="2800" dirty="0" smtClean="0"/>
               <a:t> Classify recipes into different cuisine types [1] based solely off the recipe’s ingredient list.</a:t>
             </a:r>
           </a:p>
           <a:p>
-            <a:endParaRPr lang="en-US" sz="2800" smtClean="0"/>
-          </a:p>
-          <a:p>
-            <a:r>
-              <a:rPr lang="en-US" sz="2800" smtClean="0"/>
+            <a:endParaRPr lang="en-US" sz="2800" dirty="0" smtClean="0"/>
+          </a:p>
+          <a:p>
+            <a:r>
+              <a:rPr lang="en-US" sz="2800" dirty="0" smtClean="0"/>
               <a:t>An ensemble classifier for this dataset already exists, but its execution time is long.  </a:t>
             </a:r>
           </a:p>
           <a:p>
-            <a:endParaRPr lang="en-US" sz="2800" smtClean="0"/>
-          </a:p>
-          <a:p>
-            <a:r>
-              <a:rPr lang="en-US" sz="2800" b="1" smtClean="0">
+            <a:endParaRPr lang="en-US" sz="2800" dirty="0" smtClean="0"/>
+          </a:p>
+          <a:p>
+            <a:r>
+              <a:rPr lang="en-US" sz="2800" b="1" dirty="0" smtClean="0">
                 <a:solidFill>
                   <a:srgbClr val="008000"/>
                 </a:solidFill>
@@ -6643,31 +6703,31 @@
               <a:t>Goal: </a:t>
             </a:r>
             <a:r>
-              <a:rPr lang="en-US" sz="2800" smtClean="0"/>
+              <a:rPr lang="en-US" sz="2800" dirty="0" smtClean="0"/>
               <a:t>Develop a </a:t>
             </a:r>
             <a:r>
-              <a:rPr lang="en-US" sz="2800" b="1" smtClean="0">
+              <a:rPr lang="en-US" sz="2800" b="1" dirty="0">
                 <a:solidFill>
-                  <a:schemeClr val="accent2"/>
+                  <a:srgbClr val="C00000"/>
                 </a:solidFill>
               </a:rPr>
               <a:t>faster</a:t>
             </a:r>
             <a:r>
-              <a:rPr lang="en-US" sz="2800" smtClean="0"/>
+              <a:rPr lang="en-US" sz="2800" dirty="0" smtClean="0"/>
               <a:t>, Hadoop-based version of the original classifier and </a:t>
             </a:r>
             <a:r>
-              <a:rPr lang="en-US" sz="2800" b="1" smtClean="0">
+              <a:rPr lang="en-US" sz="2800" b="1" dirty="0" smtClean="0">
                 <a:solidFill>
-                  <a:schemeClr val="accent2"/>
+                  <a:srgbClr val="C00000"/>
                 </a:solidFill>
               </a:rPr>
               <a:t>deploy it to Amazon AWS</a:t>
             </a:r>
             <a:r>
-              <a:rPr lang="en-US" sz="2800" smtClean="0"/>
+              <a:rPr lang="en-US" sz="2800" dirty="0" smtClean="0"/>
               <a:t>.</a:t>
             </a:r>
           </a:p>
@@ -6929,7 +6989,9 @@
         </p:nvSpPr>
         <p:spPr/>
         <p:txBody>
-          <a:bodyPr/>
+          <a:bodyPr>
+            <a:normAutofit fontScale="90000"/>
+          </a:bodyPr>
           <a:lstStyle/>
           <a:p>
             <a:r>
@@ -6970,38 +7032,6 @@
           </a:p>
         </p:txBody>
       </p:sp>
-      <p:pic>
-        <p:nvPicPr>
-          <p:cNvPr id="14339" name="Picture 2"/>
-          <p:cNvPicPr>
-            <a:picLocks noChangeAspect="1" noChangeArrowheads="1"/>
-          </p:cNvPicPr>
-          <p:nvPr/>
-        </p:nvPicPr>
-        <p:blipFill>
-          <a:blip r:embed="rId3"/>
-          <a:srcRect/>
-          <a:stretch>
-            <a:fillRect/>
-          </a:stretch>
-        </p:blipFill>
-        <p:spPr bwMode="auto">
-          <a:xfrm>
-            <a:off x="47625" y="1514475"/>
-            <a:ext cx="9072563" cy="4048125"/>
-          </a:xfrm>
-          <a:prstGeom prst="rect">
-            <a:avLst/>
-          </a:prstGeom>
-          <a:noFill/>
-          <a:ln w="9525">
-            <a:noFill/>
-            <a:miter lim="800000"/>
-            <a:headEnd/>
-            <a:tailEnd/>
-          </a:ln>
-        </p:spPr>
-      </p:pic>
       <p:sp>
         <p:nvSpPr>
           <p:cNvPr id="6" name="TextBox 5"/>
@@ -7042,6 +7072,60 @@
           </a:p>
         </p:txBody>
       </p:sp>
+      <p:pic>
+        <p:nvPicPr>
+          <p:cNvPr id="1026" name="Picture 2"/>
+          <p:cNvPicPr>
+            <a:picLocks noChangeAspect="1" noChangeArrowheads="1"/>
+          </p:cNvPicPr>
+          <p:nvPr/>
+        </p:nvPicPr>
+        <p:blipFill>
+          <a:blip r:embed="rId3">
+            <a:extLst>
+              <a:ext uri="{28A0092B-C50C-407E-A947-70E740481C1C}">
+                <a14:useLocalDpi xmlns:a14="http://schemas.microsoft.com/office/drawing/2010/main" val="0"/>
+              </a:ext>
+            </a:extLst>
+          </a:blip>
+          <a:srcRect/>
+          <a:stretch>
+            <a:fillRect/>
+          </a:stretch>
+        </p:blipFill>
+        <p:spPr bwMode="auto">
+          <a:xfrm>
+            <a:off x="57150" y="1609837"/>
+            <a:ext cx="9029699" cy="4028962"/>
+          </a:xfrm>
+          <a:prstGeom prst="rect">
+            <a:avLst/>
+          </a:prstGeom>
+          <a:noFill/>
+          <a:ln>
+            <a:noFill/>
+          </a:ln>
+          <a:extLst>
+            <a:ext uri="{909E8E84-426E-40DD-AFC4-6F175D3DCCD1}">
+              <a14:hiddenFill xmlns:a14="http://schemas.microsoft.com/office/drawing/2010/main">
+                <a:solidFill>
+                  <a:schemeClr val="accent1"/>
+                </a:solidFill>
+              </a14:hiddenFill>
+            </a:ext>
+            <a:ext uri="{91240B29-F687-4F45-9708-019B960494DF}">
+              <a14:hiddenLine xmlns:a14="http://schemas.microsoft.com/office/drawing/2010/main" w="9525">
+                <a:solidFill>
+                  <a:schemeClr val="tx1"/>
+                </a:solidFill>
+                <a:miter lim="800000"/>
+                <a:headEnd/>
+                <a:tailEnd/>
+              </a14:hiddenLine>
+            </a:ext>
+          </a:extLst>
+        </p:spPr>
+      </p:pic>
     </p:spTree>
   </p:cSld>
   <p:clrMapOvr>
@@ -7086,13 +7170,24 @@
         </p:nvSpPr>
         <p:spPr/>
         <p:txBody>
-          <a:bodyPr/>
+          <a:bodyPr>
+            <a:normAutofit fontScale="90000"/>
+          </a:bodyPr>
           <a:lstStyle/>
           <a:p>
             <a:r>
-              <a:rPr lang="en-US" smtClean="0"/>
-              <a:t>Oozie Flow with Successive Execution</a:t>
-            </a:r>
+              <a:rPr lang="en-US" dirty="0" err="1" smtClean="0"/>
+              <a:t>Oozie</a:t>
+            </a:r>
+            <a:r>
+              <a:rPr lang="en-US" dirty="0" smtClean="0"/>
+              <a:t> Flow with </a:t>
+            </a:r>
+            <a:r>
+              <a:rPr lang="en-US" dirty="0" smtClean="0"/>
+              <a:t>Serial Execution</a:t>
+            </a:r>
+            <a:endParaRPr lang="en-US" dirty="0" smtClean="0"/>
           </a:p>
         </p:txBody>
       </p:sp>
@@ -7169,14 +7264,20 @@
       </p:sp>
       <p:pic>
         <p:nvPicPr>
-          <p:cNvPr id="16388" name="Picture 2"/>
+          <p:cNvPr id="2050" name="Picture 2"/>
           <p:cNvPicPr>
             <a:picLocks noChangeAspect="1" noChangeArrowheads="1"/>
           </p:cNvPicPr>
           <p:nvPr/>
         </p:nvPicPr>
         <p:blipFill>
-          <a:blip r:embed="rId3"/>
+          <a:blip r:embed="rId3">
+            <a:extLst>
+              <a:ext uri="{28A0092B-C50C-407E-A947-70E740481C1C}">
+                <a14:useLocalDpi xmlns:a14="http://schemas.microsoft.com/office/drawing/2010/main" val="0"/>
+              </a:ext>
+            </a:extLst>
+          </a:blip>
           <a:srcRect/>
           <a:stretch>
             <a:fillRect/>
@@ -7184,19 +7285,35 @@
         </p:blipFill>
         <p:spPr bwMode="auto">
           <a:xfrm>
-            <a:off x="76200" y="1562100"/>
-            <a:ext cx="8961438" cy="3810000"/>
+            <a:off x="38100" y="1648851"/>
+            <a:ext cx="9048750" cy="3847073"/>
           </a:xfrm>
           <a:prstGeom prst="rect">
             <a:avLst/>
           </a:prstGeom>
           <a:noFill/>
-          <a:ln w="9525">
+          <a:ln>
             <a:noFill/>
-            <a:miter lim="800000"/>
-            <a:headEnd/>
-            <a:tailEnd/>
           </a:ln>
+          <a:extLst>
+            <a:ext uri="{909E8E84-426E-40DD-AFC4-6F175D3DCCD1}">
+              <a14:hiddenFill xmlns:a14="http://schemas.microsoft.com/office/drawing/2010/main">
+                <a:solidFill>
+                  <a:schemeClr val="accent1"/>
+                </a:solidFill>
+              </a14:hiddenFill>
+            </a:ext>
+            <a:ext uri="{91240B29-F687-4F45-9708-019B960494DF}">
+              <a14:hiddenLine xmlns:a14="http://schemas.microsoft.com/office/drawing/2010/main" w="9525">
+                <a:solidFill>
+                  <a:schemeClr val="tx1"/>
+                </a:solidFill>
+                <a:miter lim="800000"/>
+                <a:headEnd/>
+                <a:tailEnd/>
+              </a14:hiddenLine>
+            </a:ext>
+          </a:extLst>
         </p:spPr>
       </p:pic>
     </p:spTree>

</xml_diff>